<commit_message>
texte 3 premières diapos
</commit_message>
<xml_diff>
--- a/Oral/RV_PhD_defense.pptx
+++ b/Oral/RV_PhD_defense.pptx
@@ -6,20 +6,21 @@
     <p:sldMasterId id="2147483684" r:id="rId2"/>
   </p:sldMasterIdLst>
   <p:notesMasterIdLst>
-    <p:notesMasterId r:id="rId14"/>
+    <p:notesMasterId r:id="rId15"/>
   </p:notesMasterIdLst>
   <p:sldIdLst>
     <p:sldId id="256" r:id="rId3"/>
-    <p:sldId id="269" r:id="rId4"/>
-    <p:sldId id="262" r:id="rId5"/>
-    <p:sldId id="268" r:id="rId6"/>
-    <p:sldId id="271" r:id="rId7"/>
-    <p:sldId id="270" r:id="rId8"/>
-    <p:sldId id="263" r:id="rId9"/>
-    <p:sldId id="264" r:id="rId10"/>
-    <p:sldId id="267" r:id="rId11"/>
-    <p:sldId id="266" r:id="rId12"/>
-    <p:sldId id="265" r:id="rId13"/>
+    <p:sldId id="272" r:id="rId4"/>
+    <p:sldId id="269" r:id="rId5"/>
+    <p:sldId id="262" r:id="rId6"/>
+    <p:sldId id="268" r:id="rId7"/>
+    <p:sldId id="271" r:id="rId8"/>
+    <p:sldId id="270" r:id="rId9"/>
+    <p:sldId id="263" r:id="rId10"/>
+    <p:sldId id="264" r:id="rId11"/>
+    <p:sldId id="267" r:id="rId12"/>
+    <p:sldId id="266" r:id="rId13"/>
+    <p:sldId id="265" r:id="rId14"/>
   </p:sldIdLst>
   <p:sldSz cx="9144000" cy="6858000" type="screen4x3"/>
   <p:notesSz cx="6858000" cy="9144000"/>
@@ -141,6 +142,16 @@
             <a:srgbClr val="A4A3A4"/>
           </p15:clr>
         </p15:guide>
+        <p15:guide id="15" orient="horz" pos="2160" userDrawn="1">
+          <p15:clr>
+            <a:srgbClr val="A4A3A4"/>
+          </p15:clr>
+        </p15:guide>
+        <p15:guide id="16" orient="horz" pos="3974" userDrawn="1">
+          <p15:clr>
+            <a:srgbClr val="A4A3A4"/>
+          </p15:clr>
+        </p15:guide>
       </p15:sldGuideLst>
     </p:ext>
   </p:extLst>
@@ -229,7 +240,7 @@
           <a:p>
             <a:fld id="{E5E32354-32FA-4E6A-B814-26266AE6F353}" type="datetimeFigureOut">
               <a:rPr lang="en-US" smtClean="0"/>
-              <a:t>11/2/2017</a:t>
+              <a:t>11/13/2017</a:t>
             </a:fld>
             <a:endParaRPr lang="en-US"/>
           </a:p>
@@ -646,7 +657,7 @@
           <a:p>
             <a:fld id="{4F99528B-31E4-4315-AFFE-E46C62513355}" type="slidenum">
               <a:rPr lang="en-US" smtClean="0"/>
-              <a:t>4</a:t>
+              <a:t>5</a:t>
             </a:fld>
             <a:endParaRPr lang="en-US"/>
           </a:p>
@@ -730,7 +741,7 @@
           <a:p>
             <a:fld id="{4F99528B-31E4-4315-AFFE-E46C62513355}" type="slidenum">
               <a:rPr lang="en-US" smtClean="0"/>
-              <a:t>5</a:t>
+              <a:t>6</a:t>
             </a:fld>
             <a:endParaRPr lang="en-US"/>
           </a:p>
@@ -814,7 +825,7 @@
           <a:p>
             <a:fld id="{4F99528B-31E4-4315-AFFE-E46C62513355}" type="slidenum">
               <a:rPr lang="en-US" smtClean="0"/>
-              <a:t>6</a:t>
+              <a:t>7</a:t>
             </a:fld>
             <a:endParaRPr lang="en-US"/>
           </a:p>
@@ -975,7 +986,7 @@
           <a:p>
             <a:fld id="{8036C585-A983-4D29-A701-9EF3CFE70FBF}" type="datetime1">
               <a:rPr lang="en-US" smtClean="0"/>
-              <a:t>11/2/2017</a:t>
+              <a:t>11/13/2017</a:t>
             </a:fld>
             <a:endParaRPr lang="en-US"/>
           </a:p>
@@ -1149,7 +1160,7 @@
           <a:p>
             <a:fld id="{AD1D5203-BC7C-42C2-89E4-02366F891280}" type="datetime1">
               <a:rPr lang="en-US" smtClean="0"/>
-              <a:t>11/2/2017</a:t>
+              <a:t>11/13/2017</a:t>
             </a:fld>
             <a:endParaRPr lang="en-US"/>
           </a:p>
@@ -1333,7 +1344,7 @@
           <a:p>
             <a:fld id="{FE6A3051-F935-4999-BFBE-212236356A8A}" type="datetime1">
               <a:rPr lang="en-US" smtClean="0"/>
-              <a:t>11/2/2017</a:t>
+              <a:t>11/13/2017</a:t>
             </a:fld>
             <a:endParaRPr lang="en-US"/>
           </a:p>
@@ -1529,7 +1540,7 @@
           <a:p>
             <a:fld id="{1E985461-1E70-4229-80DB-853BCB51875B}" type="datetime1">
               <a:rPr lang="en-US" smtClean="0"/>
-              <a:t>11/2/2017</a:t>
+              <a:t>11/13/2017</a:t>
             </a:fld>
             <a:endParaRPr lang="en-US"/>
           </a:p>
@@ -1703,7 +1714,7 @@
           <a:p>
             <a:fld id="{1479ADC5-FB6A-4DCC-AB51-D77886120822}" type="datetime1">
               <a:rPr lang="en-US" smtClean="0"/>
-              <a:t>11/2/2017</a:t>
+              <a:t>11/13/2017</a:t>
             </a:fld>
             <a:endParaRPr lang="en-US"/>
           </a:p>
@@ -1953,7 +1964,7 @@
           <a:p>
             <a:fld id="{796F4621-15DA-4B45-88C5-BECF2E40AC9B}" type="datetime1">
               <a:rPr lang="en-US" smtClean="0"/>
-              <a:t>11/2/2017</a:t>
+              <a:t>11/13/2017</a:t>
             </a:fld>
             <a:endParaRPr lang="en-US"/>
           </a:p>
@@ -2189,7 +2200,7 @@
           <a:p>
             <a:fld id="{B46B4746-6956-4EA4-991F-9D1531476F93}" type="datetime1">
               <a:rPr lang="en-US" smtClean="0"/>
-              <a:t>11/2/2017</a:t>
+              <a:t>11/13/2017</a:t>
             </a:fld>
             <a:endParaRPr lang="en-US"/>
           </a:p>
@@ -2560,7 +2571,7 @@
           <a:p>
             <a:fld id="{31180A16-EB34-4043-B83D-499281663695}" type="datetime1">
               <a:rPr lang="en-US" smtClean="0"/>
-              <a:t>11/2/2017</a:t>
+              <a:t>11/13/2017</a:t>
             </a:fld>
             <a:endParaRPr lang="en-US"/>
           </a:p>
@@ -2682,7 +2693,7 @@
           <a:p>
             <a:fld id="{5CBB39BD-9303-492F-A561-94B0326944D4}" type="datetime1">
               <a:rPr lang="en-US" smtClean="0"/>
-              <a:t>11/2/2017</a:t>
+              <a:t>11/13/2017</a:t>
             </a:fld>
             <a:endParaRPr lang="en-US"/>
           </a:p>
@@ -2781,7 +2792,7 @@
           <a:p>
             <a:fld id="{965B9AAD-3125-47FF-B1D7-D42B954F5039}" type="datetime1">
               <a:rPr lang="en-US" smtClean="0"/>
-              <a:t>11/2/2017</a:t>
+              <a:t>11/13/2017</a:t>
             </a:fld>
             <a:endParaRPr lang="en-US"/>
           </a:p>
@@ -3062,7 +3073,7 @@
           <a:p>
             <a:fld id="{73E65BEB-1141-4F9F-908C-BD8E737F9C5F}" type="datetime1">
               <a:rPr lang="en-US" smtClean="0"/>
-              <a:t>11/2/2017</a:t>
+              <a:t>11/13/2017</a:t>
             </a:fld>
             <a:endParaRPr lang="en-US"/>
           </a:p>
@@ -3236,7 +3247,7 @@
           <a:p>
             <a:fld id="{B51E5FD6-B3F0-4913-AF4E-91B2558E2D08}" type="datetime1">
               <a:rPr lang="en-US" smtClean="0"/>
-              <a:t>11/2/2017</a:t>
+              <a:t>11/13/2017</a:t>
             </a:fld>
             <a:endParaRPr lang="en-US"/>
           </a:p>
@@ -3493,7 +3504,7 @@
           <a:p>
             <a:fld id="{7B41DB24-2C19-44F1-A737-961FAAE5907A}" type="datetime1">
               <a:rPr lang="en-US" smtClean="0"/>
-              <a:t>11/2/2017</a:t>
+              <a:t>11/13/2017</a:t>
             </a:fld>
             <a:endParaRPr lang="en-US"/>
           </a:p>
@@ -3667,7 +3678,7 @@
           <a:p>
             <a:fld id="{F9ED351E-CFBA-488B-ADA5-28317BCE17F6}" type="datetime1">
               <a:rPr lang="en-US" smtClean="0"/>
-              <a:t>11/2/2017</a:t>
+              <a:t>11/13/2017</a:t>
             </a:fld>
             <a:endParaRPr lang="en-US"/>
           </a:p>
@@ -3851,7 +3862,7 @@
           <a:p>
             <a:fld id="{D1DFA93E-67A5-4629-9ACE-4E7AE6772B60}" type="datetime1">
               <a:rPr lang="en-US" smtClean="0"/>
-              <a:t>11/2/2017</a:t>
+              <a:t>11/13/2017</a:t>
             </a:fld>
             <a:endParaRPr lang="en-US"/>
           </a:p>
@@ -4106,7 +4117,7 @@
           <a:p>
             <a:fld id="{7E94A088-F3ED-45FD-9B60-6A8E24D4BDA9}" type="datetime1">
               <a:rPr lang="en-US" smtClean="0"/>
-              <a:t>11/2/2017</a:t>
+              <a:t>11/13/2017</a:t>
             </a:fld>
             <a:endParaRPr lang="en-US"/>
           </a:p>
@@ -4342,7 +4353,7 @@
           <a:p>
             <a:fld id="{5485EAEB-10C1-49D0-A5DC-442D745E8FED}" type="datetime1">
               <a:rPr lang="en-US" smtClean="0"/>
-              <a:t>11/2/2017</a:t>
+              <a:t>11/13/2017</a:t>
             </a:fld>
             <a:endParaRPr lang="en-US"/>
           </a:p>
@@ -4693,7 +4704,7 @@
           <a:p>
             <a:fld id="{C1ED6B4D-0C06-4066-BE55-C5DC19397E83}" type="datetime1">
               <a:rPr lang="en-US" smtClean="0"/>
-              <a:t>11/2/2017</a:t>
+              <a:t>11/13/2017</a:t>
             </a:fld>
             <a:endParaRPr lang="en-US"/>
           </a:p>
@@ -4815,7 +4826,7 @@
           <a:p>
             <a:fld id="{DA7F24C4-47F4-4F0B-B861-24178AF4F882}" type="datetime1">
               <a:rPr lang="en-US" smtClean="0"/>
-              <a:t>11/2/2017</a:t>
+              <a:t>11/13/2017</a:t>
             </a:fld>
             <a:endParaRPr lang="en-US"/>
           </a:p>
@@ -4937,7 +4948,7 @@
           <a:p>
             <a:fld id="{166C1A3D-B811-45A7-AE31-D8748560452F}" type="datetime1">
               <a:rPr lang="en-US" smtClean="0"/>
-              <a:t>11/2/2017</a:t>
+              <a:t>11/13/2017</a:t>
             </a:fld>
             <a:endParaRPr lang="en-US"/>
           </a:p>
@@ -5225,7 +5236,7 @@
           <a:p>
             <a:fld id="{816142D6-16DD-4A95-80C3-F6FBF97DD9B4}" type="datetime1">
               <a:rPr lang="en-US" smtClean="0"/>
-              <a:t>11/2/2017</a:t>
+              <a:t>11/13/2017</a:t>
             </a:fld>
             <a:endParaRPr lang="en-US"/>
           </a:p>
@@ -5493,7 +5504,7 @@
           <a:p>
             <a:fld id="{3BF0FADF-0E41-41CE-BA51-5C4EDEC3FC01}" type="datetime1">
               <a:rPr lang="en-US" smtClean="0"/>
-              <a:t>11/2/2017</a:t>
+              <a:t>11/13/2017</a:t>
             </a:fld>
             <a:endParaRPr lang="en-US"/>
           </a:p>
@@ -5711,7 +5722,7 @@
           <a:p>
             <a:fld id="{A148A423-D151-4948-9C16-2DC5199FF080}" type="datetime1">
               <a:rPr lang="en-US" smtClean="0"/>
-              <a:t>11/2/2017</a:t>
+              <a:t>11/13/2017</a:t>
             </a:fld>
             <a:endParaRPr lang="en-US"/>
           </a:p>
@@ -6245,7 +6256,7 @@
           <a:p>
             <a:fld id="{CD387425-1F8A-4A62-90D5-DC2B7946C9CD}" type="datetime1">
               <a:rPr lang="en-US" smtClean="0"/>
-              <a:t>11/2/2017</a:t>
+              <a:t>11/13/2017</a:t>
             </a:fld>
             <a:endParaRPr lang="en-US"/>
           </a:p>
@@ -6963,109 +6974,577 @@
           <a:p>
             <a:pPr>
               <a:spcAft>
-                <a:spcPts val="1200"/>
+                <a:spcPts val="1800"/>
               </a:spcAft>
             </a:pPr>
             <a:r>
               <a:rPr lang="en-US" b="1" dirty="0" smtClean="0">
                 <a:solidFill>
-                  <a:srgbClr val="2C3E50"/>
+                  <a:srgbClr val="34495E"/>
                 </a:solidFill>
                 <a:latin typeface="+mj-lt"/>
-              </a:rPr>
-              <a:t>EEG-fMRI Paradigm</a:t>
-            </a:r>
-          </a:p>
-          <a:p>
-            <a:pPr algn="just">
+                <a:ea typeface="Open Sans" panose="020B0606030504020204" pitchFamily="34" charset="0"/>
+                <a:cs typeface="Open Sans" panose="020B0606030504020204" pitchFamily="34" charset="0"/>
+              </a:rPr>
+              <a:t>Outline</a:t>
+            </a:r>
+            <a:endParaRPr lang="en-US" b="1" dirty="0">
+              <a:solidFill>
+                <a:srgbClr val="34495E"/>
+              </a:solidFill>
+              <a:latin typeface="+mj-lt"/>
+              <a:ea typeface="Open Sans" panose="020B0606030504020204" pitchFamily="34" charset="0"/>
+              <a:cs typeface="Open Sans" panose="020B0606030504020204" pitchFamily="34" charset="0"/>
+            </a:endParaRPr>
+          </a:p>
+          <a:p>
+            <a:pPr marL="857250" lvl="1" indent="-400050">
+              <a:spcAft>
+                <a:spcPts val="1800"/>
+              </a:spcAft>
+              <a:buFont typeface="+mj-lt"/>
+              <a:buAutoNum type="romanUcPeriod"/>
+            </a:pPr>
+            <a:r>
+              <a:rPr lang="en-US" sz="1600" dirty="0" smtClean="0">
+                <a:solidFill>
+                  <a:srgbClr val="95A5A6"/>
+                </a:solidFill>
+                <a:ea typeface="Open Sans" panose="020B0606030504020204" pitchFamily="34" charset="0"/>
+                <a:cs typeface="Open Sans" panose="020B0606030504020204" pitchFamily="34" charset="0"/>
+              </a:rPr>
+              <a:t>General introduction</a:t>
+            </a:r>
+          </a:p>
+          <a:p>
+            <a:pPr marL="857250" lvl="1" indent="-400050">
+              <a:spcAft>
+                <a:spcPts val="600"/>
+              </a:spcAft>
+              <a:buFont typeface="+mj-lt"/>
+              <a:buAutoNum type="romanUcPeriod"/>
+            </a:pPr>
+            <a:r>
+              <a:rPr lang="en-US" sz="1600" b="1" dirty="0" smtClean="0">
+                <a:solidFill>
+                  <a:srgbClr val="34495E"/>
+                </a:solidFill>
+                <a:ea typeface="Open Sans" panose="020B0606030504020204" pitchFamily="34" charset="0"/>
+                <a:cs typeface="Open Sans" panose="020B0606030504020204" pitchFamily="34" charset="0"/>
+              </a:rPr>
+              <a:t>Mechanisms of dream recall frequency (DRF)</a:t>
+            </a:r>
+          </a:p>
+          <a:p>
+            <a:pPr marL="1200150" lvl="2" indent="-285750">
+              <a:spcAft>
+                <a:spcPts val="600"/>
+              </a:spcAft>
+              <a:buFont typeface="Arial" panose="020B0604020202020204" pitchFamily="34" charset="0"/>
+              <a:buChar char="•"/>
+            </a:pPr>
+            <a:r>
+              <a:rPr lang="en-US" sz="1600" dirty="0" smtClean="0">
+                <a:solidFill>
+                  <a:srgbClr val="95A5A6"/>
+                </a:solidFill>
+                <a:ea typeface="Open Sans" panose="020B0606030504020204" pitchFamily="34" charset="0"/>
+                <a:cs typeface="Open Sans" panose="020B0606030504020204" pitchFamily="34" charset="0"/>
+              </a:rPr>
+              <a:t>Study 1: DRF and arousals	</a:t>
+            </a:r>
+          </a:p>
+          <a:p>
+            <a:pPr marL="1200150" lvl="2" indent="-285750">
+              <a:spcAft>
+                <a:spcPts val="600"/>
+              </a:spcAft>
+              <a:buFont typeface="Arial" panose="020B0604020202020204" pitchFamily="34" charset="0"/>
+              <a:buChar char="•"/>
+            </a:pPr>
+            <a:r>
+              <a:rPr lang="en-US" sz="1600" b="1" dirty="0" smtClean="0">
+                <a:solidFill>
+                  <a:srgbClr val="34495E"/>
+                </a:solidFill>
+                <a:ea typeface="Open Sans" panose="020B0606030504020204" pitchFamily="34" charset="0"/>
+                <a:cs typeface="Open Sans" panose="020B0606030504020204" pitchFamily="34" charset="0"/>
+              </a:rPr>
+              <a:t>Study 2: DRF and sleep inertia</a:t>
+            </a:r>
+            <a:r>
+              <a:rPr lang="en-US" sz="1600" dirty="0" smtClean="0">
+                <a:solidFill>
+                  <a:srgbClr val="34495E"/>
+                </a:solidFill>
+                <a:ea typeface="Open Sans" panose="020B0606030504020204" pitchFamily="34" charset="0"/>
+                <a:cs typeface="Open Sans" panose="020B0606030504020204" pitchFamily="34" charset="0"/>
+              </a:rPr>
+              <a:t>		</a:t>
+            </a:r>
+            <a:r>
+              <a:rPr lang="en-US" sz="1600" i="1" dirty="0" smtClean="0">
+                <a:solidFill>
+                  <a:srgbClr val="34495E"/>
+                </a:solidFill>
+                <a:latin typeface="HelveticaNeueLT Std Lt" panose="020B0403020202020204" pitchFamily="34" charset="0"/>
+                <a:ea typeface="Open Sans" panose="020B0606030504020204" pitchFamily="34" charset="0"/>
+                <a:cs typeface="Open Sans" panose="020B0606030504020204" pitchFamily="34" charset="0"/>
+              </a:rPr>
+              <a:t>        </a:t>
+            </a:r>
+          </a:p>
+          <a:p>
+            <a:pPr marL="1200150" lvl="2" indent="-285750">
+              <a:spcAft>
+                <a:spcPts val="600"/>
+              </a:spcAft>
+              <a:buFont typeface="Arial" panose="020B0604020202020204" pitchFamily="34" charset="0"/>
+              <a:buChar char="•"/>
+            </a:pPr>
+            <a:r>
+              <a:rPr lang="en-US" sz="1600" dirty="0" smtClean="0">
+                <a:solidFill>
+                  <a:srgbClr val="95A5A6"/>
+                </a:solidFill>
+                <a:ea typeface="Open Sans" panose="020B0606030504020204" pitchFamily="34" charset="0"/>
+                <a:cs typeface="Open Sans" panose="020B0606030504020204" pitchFamily="34" charset="0"/>
+              </a:rPr>
+              <a:t>Study 3: DRF and the default mode network			</a:t>
+            </a:r>
+          </a:p>
+          <a:p>
+            <a:pPr marL="1200150" lvl="2" indent="-285750">
+              <a:spcAft>
+                <a:spcPts val="600"/>
+              </a:spcAft>
+              <a:buFont typeface="Arial" panose="020B0604020202020204" pitchFamily="34" charset="0"/>
+              <a:buChar char="•"/>
+            </a:pPr>
+            <a:r>
+              <a:rPr lang="en-US" sz="1600" dirty="0" smtClean="0">
+                <a:solidFill>
+                  <a:srgbClr val="95A5A6"/>
+                </a:solidFill>
+                <a:ea typeface="Open Sans" panose="020B0606030504020204" pitchFamily="34" charset="0"/>
+                <a:cs typeface="Open Sans" panose="020B0606030504020204" pitchFamily="34" charset="0"/>
+              </a:rPr>
+              <a:t>Study 4: DRF in the student population </a:t>
+            </a:r>
+          </a:p>
+          <a:p>
+            <a:pPr marL="1200150" lvl="2" indent="-285750">
+              <a:spcAft>
+                <a:spcPts val="1800"/>
+              </a:spcAft>
+              <a:buFont typeface="Arial" panose="020B0604020202020204" pitchFamily="34" charset="0"/>
+              <a:buChar char="•"/>
+            </a:pPr>
+            <a:r>
+              <a:rPr lang="en-US" sz="1600" dirty="0" smtClean="0">
+                <a:solidFill>
+                  <a:srgbClr val="95A5A6"/>
+                </a:solidFill>
+                <a:ea typeface="Open Sans" panose="020B0606030504020204" pitchFamily="34" charset="0"/>
+                <a:cs typeface="Open Sans" panose="020B0606030504020204" pitchFamily="34" charset="0"/>
+              </a:rPr>
+              <a:t>Conclusion		</a:t>
+            </a:r>
+          </a:p>
+          <a:p>
+            <a:pPr marL="857250" lvl="1" indent="-400050">
+              <a:spcAft>
+                <a:spcPts val="600"/>
+              </a:spcAft>
+              <a:buFont typeface="+mj-lt"/>
+              <a:buAutoNum type="romanUcPeriod"/>
+            </a:pPr>
+            <a:r>
+              <a:rPr lang="en-US" sz="1600" dirty="0" smtClean="0">
+                <a:solidFill>
+                  <a:srgbClr val="95A5A6"/>
+                </a:solidFill>
+                <a:ea typeface="Open Sans" panose="020B0606030504020204" pitchFamily="34" charset="0"/>
+                <a:cs typeface="Open Sans" panose="020B0606030504020204" pitchFamily="34" charset="0"/>
+              </a:rPr>
+              <a:t>Dream content and dream function</a:t>
+            </a:r>
+          </a:p>
+          <a:p>
+            <a:pPr marL="1200150" lvl="2" indent="-285750">
+              <a:spcAft>
+                <a:spcPts val="1800"/>
+              </a:spcAft>
+              <a:buFont typeface="Arial" panose="020B0604020202020204" pitchFamily="34" charset="0"/>
+              <a:buChar char="•"/>
+            </a:pPr>
+            <a:r>
+              <a:rPr lang="en-US" sz="1600" dirty="0" smtClean="0">
+                <a:solidFill>
+                  <a:srgbClr val="95A5A6"/>
+                </a:solidFill>
+                <a:ea typeface="Open Sans" panose="020B0606030504020204" pitchFamily="34" charset="0"/>
+                <a:cs typeface="Open Sans" panose="020B0606030504020204" pitchFamily="34" charset="0"/>
+              </a:rPr>
+              <a:t>Study 5: The link between waking-life and dream content </a:t>
+            </a:r>
+          </a:p>
+          <a:p>
+            <a:pPr marL="857250" lvl="1" indent="-400050">
+              <a:spcAft>
+                <a:spcPts val="600"/>
+              </a:spcAft>
+              <a:buFont typeface="+mj-lt"/>
+              <a:buAutoNum type="romanUcPeriod"/>
+            </a:pPr>
+            <a:r>
+              <a:rPr lang="en-US" sz="1600" dirty="0" smtClean="0">
+                <a:solidFill>
+                  <a:srgbClr val="95A5A6"/>
+                </a:solidFill>
+                <a:ea typeface="Open Sans" panose="020B0606030504020204" pitchFamily="34" charset="0"/>
+                <a:cs typeface="Open Sans" panose="020B0606030504020204" pitchFamily="34" charset="0"/>
+              </a:rPr>
+              <a:t>Methodological development</a:t>
+            </a:r>
+          </a:p>
+          <a:p>
+            <a:pPr marL="1200150" lvl="2" indent="-285750">
+              <a:spcAft>
+                <a:spcPts val="1800"/>
+              </a:spcAft>
+              <a:buFont typeface="Arial" panose="020B0604020202020204" pitchFamily="34" charset="0"/>
+              <a:buChar char="•"/>
+            </a:pPr>
+            <a:r>
+              <a:rPr lang="en-US" sz="1600" dirty="0" smtClean="0">
+                <a:solidFill>
+                  <a:srgbClr val="95A5A6"/>
+                </a:solidFill>
+                <a:ea typeface="Open Sans" panose="020B0606030504020204" pitchFamily="34" charset="0"/>
+                <a:cs typeface="Open Sans" panose="020B0606030504020204" pitchFamily="34" charset="0"/>
+              </a:rPr>
+              <a:t>Study 6: An open source software for sleep scoring and analysis</a:t>
+            </a:r>
+          </a:p>
+          <a:p>
+            <a:pPr marL="857250" lvl="1" indent="-400050">
+              <a:spcAft>
+                <a:spcPts val="1800"/>
+              </a:spcAft>
+              <a:buFont typeface="+mj-lt"/>
+              <a:buAutoNum type="romanUcPeriod"/>
+            </a:pPr>
+            <a:r>
+              <a:rPr lang="en-US" sz="1600" dirty="0" smtClean="0">
+                <a:solidFill>
+                  <a:srgbClr val="95A5A6"/>
+                </a:solidFill>
+                <a:ea typeface="Open Sans" panose="020B0606030504020204" pitchFamily="34" charset="0"/>
+                <a:cs typeface="Open Sans" panose="020B0606030504020204" pitchFamily="34" charset="0"/>
+              </a:rPr>
+              <a:t>General conclusion</a:t>
+            </a:r>
+          </a:p>
+          <a:p>
+            <a:pPr>
               <a:spcAft>
                 <a:spcPts val="1200"/>
               </a:spcAft>
             </a:pPr>
-            <a:endParaRPr lang="en-US" b="1" dirty="0" smtClean="0">
+            <a:endParaRPr lang="en-US" dirty="0">
               <a:solidFill>
-                <a:srgbClr val="2C3E50"/>
+                <a:schemeClr val="tx2">
+                  <a:lumMod val="50000"/>
+                </a:schemeClr>
               </a:solidFill>
-              <a:latin typeface="+mj-lt"/>
+              <a:latin typeface="Open Sans" panose="020B0606030504020204" pitchFamily="34" charset="0"/>
+              <a:ea typeface="Open Sans" panose="020B0606030504020204" pitchFamily="34" charset="0"/>
+              <a:cs typeface="Open Sans" panose="020B0606030504020204" pitchFamily="34" charset="0"/>
             </a:endParaRPr>
           </a:p>
-          <a:p>
-            <a:pPr algn="just">
-              <a:spcAft>
-                <a:spcPts val="1200"/>
-              </a:spcAft>
-            </a:pPr>
-            <a:endParaRPr lang="en-US" sz="1600" i="1" dirty="0" smtClean="0">
+        </p:txBody>
+      </p:sp>
+      <p:sp>
+        <p:nvSpPr>
+          <p:cNvPr id="16" name="Rectangle 15"/>
+          <p:cNvSpPr/>
+          <p:nvPr/>
+        </p:nvSpPr>
+        <p:spPr>
+          <a:xfrm>
+            <a:off x="0" y="0"/>
+            <a:ext cx="9144000" cy="259200"/>
+          </a:xfrm>
+          <a:prstGeom prst="rect">
+            <a:avLst/>
+          </a:prstGeom>
+          <a:solidFill>
+            <a:srgbClr val="45607B"/>
+          </a:solidFill>
+          <a:ln>
+            <a:noFill/>
+          </a:ln>
+        </p:spPr>
+        <p:style>
+          <a:lnRef idx="2">
+            <a:schemeClr val="accent1">
+              <a:shade val="50000"/>
+            </a:schemeClr>
+          </a:lnRef>
+          <a:fillRef idx="1">
+            <a:schemeClr val="accent1"/>
+          </a:fillRef>
+          <a:effectRef idx="0">
+            <a:schemeClr val="accent1"/>
+          </a:effectRef>
+          <a:fontRef idx="minor">
+            <a:schemeClr val="lt1"/>
+          </a:fontRef>
+        </p:style>
+        <p:txBody>
+          <a:bodyPr rtlCol="0" anchor="ctr"/>
+          <a:lstStyle/>
+          <a:p>
+            <a:pPr algn="ctr"/>
+            <a:endParaRPr lang="en-US" dirty="0">
               <a:solidFill>
-                <a:srgbClr val="10171E"/>
+                <a:schemeClr val="bg1"/>
               </a:solidFill>
+              <a:latin typeface="Roboto Light" panose="02000000000000000000" pitchFamily="2" charset="0"/>
+              <a:ea typeface="Roboto Light" panose="02000000000000000000" pitchFamily="2" charset="0"/>
             </a:endParaRPr>
           </a:p>
-          <a:p>
-            <a:pPr algn="just">
-              <a:spcAft>
-                <a:spcPts val="1200"/>
-              </a:spcAft>
-            </a:pPr>
-            <a:endParaRPr lang="en-US" sz="1600" i="1" dirty="0">
+        </p:txBody>
+      </p:sp>
+      <p:sp>
+        <p:nvSpPr>
+          <p:cNvPr id="17" name="ZoneTexte 16"/>
+          <p:cNvSpPr txBox="1"/>
+          <p:nvPr/>
+        </p:nvSpPr>
+        <p:spPr>
+          <a:xfrm>
+            <a:off x="0" y="259200"/>
+            <a:ext cx="1828800" cy="261610"/>
+          </a:xfrm>
+          <a:prstGeom prst="rect">
+            <a:avLst/>
+          </a:prstGeom>
+          <a:solidFill>
+            <a:srgbClr val="ECF0F1"/>
+          </a:solidFill>
+        </p:spPr>
+        <p:txBody>
+          <a:bodyPr wrap="square" rtlCol="0">
+            <a:spAutoFit/>
+          </a:bodyPr>
+          <a:lstStyle/>
+          <a:p>
+            <a:pPr algn="ctr"/>
+            <a:r>
+              <a:rPr lang="en-US" sz="1100" b="1" i="1" dirty="0" smtClean="0">
+                <a:solidFill>
+                  <a:srgbClr val="34495E"/>
+                </a:solidFill>
+                <a:latin typeface="Roboto Light" panose="02000000000000000000" pitchFamily="2" charset="0"/>
+                <a:ea typeface="Roboto Light" panose="02000000000000000000" pitchFamily="2" charset="0"/>
+              </a:rPr>
+              <a:t>Introduction</a:t>
+            </a:r>
+            <a:endParaRPr lang="en-US" sz="1100" b="1" i="1" dirty="0">
               <a:solidFill>
-                <a:srgbClr val="10171E"/>
+                <a:srgbClr val="34495E"/>
               </a:solidFill>
+              <a:latin typeface="Roboto Light" panose="02000000000000000000" pitchFamily="2" charset="0"/>
+              <a:ea typeface="Roboto Light" panose="02000000000000000000" pitchFamily="2" charset="0"/>
             </a:endParaRPr>
           </a:p>
-          <a:p>
-            <a:pPr algn="just">
-              <a:spcAft>
-                <a:spcPts val="1200"/>
-              </a:spcAft>
-            </a:pPr>
-            <a:endParaRPr lang="en-US" sz="1600" i="1" dirty="0" smtClean="0">
+        </p:txBody>
+      </p:sp>
+      <p:sp>
+        <p:nvSpPr>
+          <p:cNvPr id="18" name="ZoneTexte 17"/>
+          <p:cNvSpPr txBox="1"/>
+          <p:nvPr/>
+        </p:nvSpPr>
+        <p:spPr>
+          <a:xfrm>
+            <a:off x="1828800" y="258463"/>
+            <a:ext cx="1828800" cy="261610"/>
+          </a:xfrm>
+          <a:prstGeom prst="rect">
+            <a:avLst/>
+          </a:prstGeom>
+          <a:solidFill>
+            <a:srgbClr val="ECF0F1"/>
+          </a:solidFill>
+        </p:spPr>
+        <p:txBody>
+          <a:bodyPr wrap="square" rtlCol="0">
+            <a:spAutoFit/>
+          </a:bodyPr>
+          <a:lstStyle/>
+          <a:p>
+            <a:pPr algn="ctr"/>
+            <a:r>
+              <a:rPr lang="en-US" sz="1100" i="1" dirty="0" smtClean="0">
+                <a:solidFill>
+                  <a:srgbClr val="95A5A6"/>
+                </a:solidFill>
+                <a:latin typeface="Roboto Light" panose="02000000000000000000" pitchFamily="2" charset="0"/>
+                <a:ea typeface="Roboto Light" panose="02000000000000000000" pitchFamily="2" charset="0"/>
+              </a:rPr>
+              <a:t>Dream recall</a:t>
+            </a:r>
+            <a:endParaRPr lang="en-US" sz="1100" i="1" dirty="0">
               <a:solidFill>
-                <a:srgbClr val="10171E"/>
+                <a:srgbClr val="95A5A6"/>
               </a:solidFill>
+              <a:latin typeface="Roboto Light" panose="02000000000000000000" pitchFamily="2" charset="0"/>
+              <a:ea typeface="Roboto Light" panose="02000000000000000000" pitchFamily="2" charset="0"/>
             </a:endParaRPr>
           </a:p>
-          <a:p>
-            <a:pPr algn="just">
-              <a:spcAft>
-                <a:spcPts val="1200"/>
-              </a:spcAft>
-            </a:pPr>
-            <a:endParaRPr lang="en-US" sz="1600" i="1" dirty="0">
+        </p:txBody>
+      </p:sp>
+      <p:sp>
+        <p:nvSpPr>
+          <p:cNvPr id="19" name="ZoneTexte 18"/>
+          <p:cNvSpPr txBox="1"/>
+          <p:nvPr/>
+        </p:nvSpPr>
+        <p:spPr>
+          <a:xfrm>
+            <a:off x="3657600" y="258463"/>
+            <a:ext cx="1828800" cy="261610"/>
+          </a:xfrm>
+          <a:prstGeom prst="rect">
+            <a:avLst/>
+          </a:prstGeom>
+          <a:solidFill>
+            <a:srgbClr val="ECF0F1"/>
+          </a:solidFill>
+        </p:spPr>
+        <p:txBody>
+          <a:bodyPr wrap="square" rtlCol="0">
+            <a:spAutoFit/>
+          </a:bodyPr>
+          <a:lstStyle/>
+          <a:p>
+            <a:pPr algn="ctr"/>
+            <a:r>
+              <a:rPr lang="en-US" sz="1100" i="1" dirty="0" smtClean="0">
+                <a:solidFill>
+                  <a:srgbClr val="95A5A6"/>
+                </a:solidFill>
+                <a:latin typeface="Roboto Light" panose="02000000000000000000" pitchFamily="2" charset="0"/>
+                <a:ea typeface="Roboto Light" panose="02000000000000000000" pitchFamily="2" charset="0"/>
+              </a:rPr>
+              <a:t>Dream content</a:t>
+            </a:r>
+            <a:endParaRPr lang="en-US" sz="1100" i="1" dirty="0">
               <a:solidFill>
-                <a:srgbClr val="10171E"/>
+                <a:srgbClr val="95A5A6"/>
               </a:solidFill>
+              <a:latin typeface="Roboto Light" panose="02000000000000000000" pitchFamily="2" charset="0"/>
+              <a:ea typeface="Roboto Light" panose="02000000000000000000" pitchFamily="2" charset="0"/>
             </a:endParaRPr>
           </a:p>
-          <a:p>
-            <a:pPr algn="just">
-              <a:spcAft>
-                <a:spcPts val="1200"/>
-              </a:spcAft>
-            </a:pPr>
-            <a:endParaRPr lang="en-US" sz="1600" i="1" dirty="0" smtClean="0">
+        </p:txBody>
+      </p:sp>
+      <p:sp>
+        <p:nvSpPr>
+          <p:cNvPr id="20" name="ZoneTexte 19"/>
+          <p:cNvSpPr txBox="1"/>
+          <p:nvPr/>
+        </p:nvSpPr>
+        <p:spPr>
+          <a:xfrm>
+            <a:off x="5486400" y="258463"/>
+            <a:ext cx="1828800" cy="261610"/>
+          </a:xfrm>
+          <a:prstGeom prst="rect">
+            <a:avLst/>
+          </a:prstGeom>
+          <a:solidFill>
+            <a:srgbClr val="ECF0F1"/>
+          </a:solidFill>
+        </p:spPr>
+        <p:txBody>
+          <a:bodyPr wrap="square" rtlCol="0">
+            <a:spAutoFit/>
+          </a:bodyPr>
+          <a:lstStyle/>
+          <a:p>
+            <a:pPr algn="ctr"/>
+            <a:r>
+              <a:rPr lang="en-US" sz="1100" i="1" dirty="0" smtClean="0">
+                <a:solidFill>
+                  <a:srgbClr val="95A5A6"/>
+                </a:solidFill>
+                <a:latin typeface="Roboto Light" panose="02000000000000000000" pitchFamily="2" charset="0"/>
+                <a:ea typeface="Roboto Light" panose="02000000000000000000" pitchFamily="2" charset="0"/>
+              </a:rPr>
+              <a:t>Software</a:t>
+            </a:r>
+            <a:endParaRPr lang="en-US" sz="1100" i="1" dirty="0">
               <a:solidFill>
-                <a:srgbClr val="10171E"/>
+                <a:srgbClr val="95A5A6"/>
               </a:solidFill>
+              <a:latin typeface="Roboto Light" panose="02000000000000000000" pitchFamily="2" charset="0"/>
+              <a:ea typeface="Roboto Light" panose="02000000000000000000" pitchFamily="2" charset="0"/>
             </a:endParaRPr>
           </a:p>
-          <a:p>
-            <a:pPr algn="just">
-              <a:spcAft>
-                <a:spcPts val="1200"/>
-              </a:spcAft>
-            </a:pPr>
-            <a:endParaRPr lang="en-US" sz="1600" dirty="0" smtClean="0">
+        </p:txBody>
+      </p:sp>
+      <p:sp>
+        <p:nvSpPr>
+          <p:cNvPr id="21" name="ZoneTexte 20"/>
+          <p:cNvSpPr txBox="1"/>
+          <p:nvPr/>
+        </p:nvSpPr>
+        <p:spPr>
+          <a:xfrm>
+            <a:off x="7315200" y="258463"/>
+            <a:ext cx="1828800" cy="261610"/>
+          </a:xfrm>
+          <a:prstGeom prst="rect">
+            <a:avLst/>
+          </a:prstGeom>
+          <a:solidFill>
+            <a:srgbClr val="ECF0F1"/>
+          </a:solidFill>
+        </p:spPr>
+        <p:txBody>
+          <a:bodyPr wrap="square" rtlCol="0">
+            <a:spAutoFit/>
+          </a:bodyPr>
+          <a:lstStyle/>
+          <a:p>
+            <a:pPr algn="ctr"/>
+            <a:r>
+              <a:rPr lang="en-US" sz="1100" i="1" dirty="0" smtClean="0">
+                <a:solidFill>
+                  <a:srgbClr val="95A5A6"/>
+                </a:solidFill>
+                <a:latin typeface="Roboto Light" panose="02000000000000000000" pitchFamily="2" charset="0"/>
+                <a:ea typeface="Roboto Light" panose="02000000000000000000" pitchFamily="2" charset="0"/>
+              </a:rPr>
+              <a:t>Conclusion</a:t>
+            </a:r>
+            <a:endParaRPr lang="en-US" sz="1100" i="1" dirty="0">
               <a:solidFill>
-                <a:srgbClr val="10171E"/>
+                <a:srgbClr val="95A5A6"/>
               </a:solidFill>
+              <a:latin typeface="Roboto Light" panose="02000000000000000000" pitchFamily="2" charset="0"/>
+              <a:ea typeface="Roboto Light" panose="02000000000000000000" pitchFamily="2" charset="0"/>
             </a:endParaRPr>
           </a:p>
         </p:txBody>
       </p:sp>
       <p:sp>
         <p:nvSpPr>
-          <p:cNvPr id="4" name="Espace réservé du numéro de diapositive 3"/>
+          <p:cNvPr id="22" name="Espace réservé du numéro de diapositive 3"/>
           <p:cNvSpPr>
             <a:spLocks noGrp="1"/>
           </p:cNvSpPr>
@@ -7084,15 +7563,14 @@
           <a:lstStyle/>
           <a:p>
             <a:pPr algn="ctr"/>
-            <a:fld id="{35FF5DC1-B1C3-4575-9516-BF75EB359694}" type="slidenum">
-              <a:rPr lang="en-US" sz="1100" smtClean="0">
+            <a:r>
+              <a:rPr lang="en-US" sz="1100" dirty="0" smtClean="0">
                 <a:solidFill>
                   <a:srgbClr val="7F8C8D"/>
                 </a:solidFill>
               </a:rPr>
-              <a:pPr algn="ctr"/>
-              <a:t>10</a:t>
-            </a:fld>
+              <a:t>5</a:t>
+            </a:r>
             <a:endParaRPr lang="en-US" sz="1100" dirty="0">
               <a:solidFill>
                 <a:srgbClr val="7F8C8D"/>
@@ -7103,7 +7581,7 @@
       </p:sp>
       <p:cxnSp>
         <p:nvCxnSpPr>
-          <p:cNvPr id="6" name="Connecteur droit 5"/>
+          <p:cNvPr id="23" name="Connecteur droit 22"/>
           <p:cNvCxnSpPr/>
           <p:nvPr/>
         </p:nvCxnSpPr>
@@ -7138,7 +7616,7 @@
       </p:cxnSp>
       <p:sp>
         <p:nvSpPr>
-          <p:cNvPr id="7" name="ZoneTexte 6"/>
+          <p:cNvPr id="24" name="ZoneTexte 23"/>
           <p:cNvSpPr txBox="1"/>
           <p:nvPr/>
         </p:nvSpPr>
@@ -7167,8 +7645,354 @@
                 <a:latin typeface="Roboto Medium" panose="02000000000000000000" pitchFamily="2" charset="0"/>
                 <a:ea typeface="Roboto Medium" panose="02000000000000000000" pitchFamily="2" charset="0"/>
               </a:rPr>
-              <a:t>II. Mechanisms of dream recall frequency </a:t>
-            </a:r>
+              <a:t>Outline</a:t>
+            </a:r>
+            <a:endParaRPr lang="en-US" sz="1100" dirty="0">
+              <a:solidFill>
+                <a:srgbClr val="7F8C8D"/>
+              </a:solidFill>
+              <a:latin typeface="Roboto" pitchFamily="2" charset="0"/>
+              <a:ea typeface="Roboto" pitchFamily="2" charset="0"/>
+            </a:endParaRPr>
+          </a:p>
+        </p:txBody>
+      </p:sp>
+      <p:sp>
+        <p:nvSpPr>
+          <p:cNvPr id="25" name="ZoneTexte 24"/>
+          <p:cNvSpPr txBox="1"/>
+          <p:nvPr/>
+        </p:nvSpPr>
+        <p:spPr>
+          <a:xfrm>
+            <a:off x="284615" y="6471880"/>
+            <a:ext cx="3893227" cy="261610"/>
+          </a:xfrm>
+          <a:prstGeom prst="rect">
+            <a:avLst/>
+          </a:prstGeom>
+          <a:noFill/>
+        </p:spPr>
+        <p:txBody>
+          <a:bodyPr wrap="square" rtlCol="0">
+            <a:spAutoFit/>
+          </a:bodyPr>
+          <a:lstStyle/>
+          <a:p>
+            <a:r>
+              <a:rPr lang="en-US" sz="1100" dirty="0" smtClean="0">
+                <a:solidFill>
+                  <a:srgbClr val="7F8C8D"/>
+                </a:solidFill>
+                <a:latin typeface="Roboto Light" panose="02000000000000000000" pitchFamily="2" charset="0"/>
+                <a:ea typeface="Roboto Light" panose="02000000000000000000" pitchFamily="2" charset="0"/>
+              </a:rPr>
+              <a:t>R. Vallat – Ph.D. Oral Defense – December 8</a:t>
+            </a:r>
+            <a:r>
+              <a:rPr lang="en-US" sz="1100" baseline="30000" dirty="0" smtClean="0">
+                <a:solidFill>
+                  <a:srgbClr val="7F8C8D"/>
+                </a:solidFill>
+                <a:latin typeface="Roboto Light" panose="02000000000000000000" pitchFamily="2" charset="0"/>
+                <a:ea typeface="Roboto Light" panose="02000000000000000000" pitchFamily="2" charset="0"/>
+              </a:rPr>
+              <a:t>th</a:t>
+            </a:r>
+            <a:r>
+              <a:rPr lang="en-US" sz="1100" dirty="0" smtClean="0">
+                <a:solidFill>
+                  <a:srgbClr val="7F8C8D"/>
+                </a:solidFill>
+                <a:latin typeface="Roboto Light" panose="02000000000000000000" pitchFamily="2" charset="0"/>
+                <a:ea typeface="Roboto Light" panose="02000000000000000000" pitchFamily="2" charset="0"/>
+              </a:rPr>
+              <a:t> 2017</a:t>
+            </a:r>
+            <a:endParaRPr lang="en-US" sz="1100" dirty="0">
+              <a:solidFill>
+                <a:srgbClr val="7F8C8D"/>
+              </a:solidFill>
+              <a:latin typeface="Roboto Light" panose="02000000000000000000" pitchFamily="2" charset="0"/>
+              <a:ea typeface="Roboto Light" panose="02000000000000000000" pitchFamily="2" charset="0"/>
+            </a:endParaRPr>
+          </a:p>
+        </p:txBody>
+      </p:sp>
+    </p:spTree>
+    <p:extLst>
+      <p:ext uri="{BB962C8B-B14F-4D97-AF65-F5344CB8AC3E}">
+        <p14:creationId xmlns:p14="http://schemas.microsoft.com/office/powerpoint/2010/main" val="1937816580"/>
+      </p:ext>
+    </p:extLst>
+  </p:cSld>
+  <p:clrMapOvr>
+    <a:masterClrMapping/>
+  </p:clrMapOvr>
+  <p:timing>
+    <p:tnLst>
+      <p:par>
+        <p:cTn id="1" dur="indefinite" restart="never" nodeType="tmRoot"/>
+      </p:par>
+    </p:tnLst>
+  </p:timing>
+</p:sld>
+</file>
+
+<file path=ppt/slides/slide11.xml><?xml version="1.0" encoding="utf-8"?>
+<p:sld xmlns:a="http://schemas.openxmlformats.org/drawingml/2006/main" xmlns:r="http://schemas.openxmlformats.org/officeDocument/2006/relationships" xmlns:p="http://schemas.openxmlformats.org/presentationml/2006/main">
+  <p:cSld>
+    <p:spTree>
+      <p:nvGrpSpPr>
+        <p:cNvPr id="1" name=""/>
+        <p:cNvGrpSpPr/>
+        <p:nvPr/>
+      </p:nvGrpSpPr>
+      <p:grpSpPr>
+        <a:xfrm>
+          <a:off x="0" y="0"/>
+          <a:ext cx="0" cy="0"/>
+          <a:chOff x="0" y="0"/>
+          <a:chExt cx="0" cy="0"/>
+        </a:xfrm>
+      </p:grpSpPr>
+      <p:sp>
+        <p:nvSpPr>
+          <p:cNvPr id="13" name="Rectangle 12"/>
+          <p:cNvSpPr/>
+          <p:nvPr/>
+        </p:nvSpPr>
+        <p:spPr>
+          <a:xfrm>
+            <a:off x="611188" y="800100"/>
+            <a:ext cx="7921625" cy="5508625"/>
+          </a:xfrm>
+          <a:prstGeom prst="rect">
+            <a:avLst/>
+          </a:prstGeom>
+          <a:noFill/>
+          <a:ln>
+            <a:noFill/>
+          </a:ln>
+        </p:spPr>
+        <p:style>
+          <a:lnRef idx="2">
+            <a:schemeClr val="accent1">
+              <a:shade val="50000"/>
+            </a:schemeClr>
+          </a:lnRef>
+          <a:fillRef idx="1">
+            <a:schemeClr val="accent1"/>
+          </a:fillRef>
+          <a:effectRef idx="0">
+            <a:schemeClr val="accent1"/>
+          </a:effectRef>
+          <a:fontRef idx="minor">
+            <a:schemeClr val="lt1"/>
+          </a:fontRef>
+        </p:style>
+        <p:txBody>
+          <a:bodyPr rtlCol="0" anchor="t"/>
+          <a:lstStyle/>
+          <a:p>
+            <a:pPr>
+              <a:spcAft>
+                <a:spcPts val="1200"/>
+              </a:spcAft>
+            </a:pPr>
+            <a:r>
+              <a:rPr lang="en-US" b="1" dirty="0" smtClean="0">
+                <a:solidFill>
+                  <a:srgbClr val="2C3E50"/>
+                </a:solidFill>
+                <a:latin typeface="+mj-lt"/>
+              </a:rPr>
+              <a:t>EEG-fMRI Paradigm</a:t>
+            </a:r>
+          </a:p>
+          <a:p>
+            <a:pPr algn="just">
+              <a:spcAft>
+                <a:spcPts val="1200"/>
+              </a:spcAft>
+            </a:pPr>
+            <a:endParaRPr lang="en-US" b="1" dirty="0" smtClean="0">
+              <a:solidFill>
+                <a:srgbClr val="2C3E50"/>
+              </a:solidFill>
+              <a:latin typeface="+mj-lt"/>
+            </a:endParaRPr>
+          </a:p>
+          <a:p>
+            <a:pPr algn="just">
+              <a:spcAft>
+                <a:spcPts val="1200"/>
+              </a:spcAft>
+            </a:pPr>
+            <a:endParaRPr lang="en-US" sz="1600" i="1" dirty="0" smtClean="0">
+              <a:solidFill>
+                <a:srgbClr val="10171E"/>
+              </a:solidFill>
+            </a:endParaRPr>
+          </a:p>
+          <a:p>
+            <a:pPr algn="just">
+              <a:spcAft>
+                <a:spcPts val="1200"/>
+              </a:spcAft>
+            </a:pPr>
+            <a:endParaRPr lang="en-US" sz="1600" i="1" dirty="0">
+              <a:solidFill>
+                <a:srgbClr val="10171E"/>
+              </a:solidFill>
+            </a:endParaRPr>
+          </a:p>
+          <a:p>
+            <a:pPr algn="just">
+              <a:spcAft>
+                <a:spcPts val="1200"/>
+              </a:spcAft>
+            </a:pPr>
+            <a:endParaRPr lang="en-US" sz="1600" i="1" dirty="0" smtClean="0">
+              <a:solidFill>
+                <a:srgbClr val="10171E"/>
+              </a:solidFill>
+            </a:endParaRPr>
+          </a:p>
+          <a:p>
+            <a:pPr algn="just">
+              <a:spcAft>
+                <a:spcPts val="1200"/>
+              </a:spcAft>
+            </a:pPr>
+            <a:endParaRPr lang="en-US" sz="1600" i="1" dirty="0">
+              <a:solidFill>
+                <a:srgbClr val="10171E"/>
+              </a:solidFill>
+            </a:endParaRPr>
+          </a:p>
+          <a:p>
+            <a:pPr algn="just">
+              <a:spcAft>
+                <a:spcPts val="1200"/>
+              </a:spcAft>
+            </a:pPr>
+            <a:endParaRPr lang="en-US" sz="1600" i="1" dirty="0" smtClean="0">
+              <a:solidFill>
+                <a:srgbClr val="10171E"/>
+              </a:solidFill>
+            </a:endParaRPr>
+          </a:p>
+          <a:p>
+            <a:pPr algn="just">
+              <a:spcAft>
+                <a:spcPts val="1200"/>
+              </a:spcAft>
+            </a:pPr>
+            <a:endParaRPr lang="en-US" sz="1600" dirty="0" smtClean="0">
+              <a:solidFill>
+                <a:srgbClr val="10171E"/>
+              </a:solidFill>
+            </a:endParaRPr>
+          </a:p>
+        </p:txBody>
+      </p:sp>
+      <p:sp>
+        <p:nvSpPr>
+          <p:cNvPr id="4" name="Espace réservé du numéro de diapositive 3"/>
+          <p:cNvSpPr>
+            <a:spLocks noGrp="1"/>
+          </p:cNvSpPr>
+          <p:nvPr>
+            <p:ph type="sldNum" sz="quarter" idx="12"/>
+          </p:nvPr>
+        </p:nvSpPr>
+        <p:spPr>
+          <a:xfrm>
+            <a:off x="8532813" y="6420123"/>
+            <a:ext cx="611187" cy="365125"/>
+          </a:xfrm>
+        </p:spPr>
+        <p:txBody>
+          <a:bodyPr/>
+          <a:lstStyle/>
+          <a:p>
+            <a:pPr algn="ctr"/>
+            <a:fld id="{35FF5DC1-B1C3-4575-9516-BF75EB359694}" type="slidenum">
+              <a:rPr lang="en-US" sz="1100" smtClean="0">
+                <a:solidFill>
+                  <a:srgbClr val="7F8C8D"/>
+                </a:solidFill>
+              </a:rPr>
+              <a:pPr algn="ctr"/>
+              <a:t>11</a:t>
+            </a:fld>
+            <a:endParaRPr lang="en-US" sz="1100" dirty="0">
+              <a:solidFill>
+                <a:srgbClr val="7F8C8D"/>
+              </a:solidFill>
+            </a:endParaRPr>
+          </a:p>
+        </p:txBody>
+      </p:sp>
+      <p:cxnSp>
+        <p:nvCxnSpPr>
+          <p:cNvPr id="6" name="Connecteur droit 5"/>
+          <p:cNvCxnSpPr/>
+          <p:nvPr/>
+        </p:nvCxnSpPr>
+        <p:spPr>
+          <a:xfrm flipH="1" flipV="1">
+            <a:off x="8521927" y="6318000"/>
+            <a:ext cx="0" cy="540000"/>
+          </a:xfrm>
+          <a:prstGeom prst="line">
+            <a:avLst/>
+          </a:prstGeom>
+          <a:ln w="28575">
+            <a:solidFill>
+              <a:srgbClr val="7F8C8D"/>
+            </a:solidFill>
+          </a:ln>
+        </p:spPr>
+        <p:style>
+          <a:lnRef idx="1">
+            <a:schemeClr val="dk1"/>
+          </a:lnRef>
+          <a:fillRef idx="0">
+            <a:schemeClr val="dk1"/>
+          </a:fillRef>
+          <a:effectRef idx="0">
+            <a:schemeClr val="dk1"/>
+          </a:effectRef>
+          <a:fontRef idx="minor">
+            <a:schemeClr val="tx1"/>
+          </a:fontRef>
+        </p:style>
+      </p:cxnSp>
+      <p:sp>
+        <p:nvSpPr>
+          <p:cNvPr id="7" name="ZoneTexte 6"/>
+          <p:cNvSpPr txBox="1"/>
+          <p:nvPr/>
+        </p:nvSpPr>
+        <p:spPr>
+          <a:xfrm>
+            <a:off x="4572000" y="6471881"/>
+            <a:ext cx="3893227" cy="261610"/>
+          </a:xfrm>
+          <a:prstGeom prst="rect">
+            <a:avLst/>
+          </a:prstGeom>
+          <a:noFill/>
+        </p:spPr>
+        <p:txBody>
+          <a:bodyPr wrap="square" rtlCol="0">
+            <a:spAutoFit/>
+          </a:bodyPr>
+          <a:lstStyle/>
+          <a:p>
+            <a:pPr algn="r"/>
             <a:r>
               <a:rPr lang="en-US" sz="1100" dirty="0" smtClean="0">
                 <a:solidFill>
@@ -7177,7 +8001,7 @@
                 <a:latin typeface="Roboto Medium" panose="02000000000000000000" pitchFamily="2" charset="0"/>
                 <a:ea typeface="Roboto Medium" panose="02000000000000000000" pitchFamily="2" charset="0"/>
               </a:rPr>
-              <a:t>– </a:t>
+              <a:t>II. Mechanisms of dream recall frequency – </a:t>
             </a:r>
             <a:r>
               <a:rPr lang="en-US" sz="1100" dirty="0" smtClean="0">
@@ -7856,16 +8680,7 @@
                 </a:solidFill>
                 <a:ea typeface="Roboto" pitchFamily="2" charset="0"/>
               </a:rPr>
-              <a:t>(SR Research, EyeLink</a:t>
-            </a:r>
-            <a:r>
-              <a:rPr lang="en-US" sz="1200" dirty="0" smtClean="0">
-                <a:solidFill>
-                  <a:srgbClr val="2C3E50"/>
-                </a:solidFill>
-                <a:ea typeface="Roboto" pitchFamily="2" charset="0"/>
-              </a:rPr>
-              <a:t>)</a:t>
+              <a:t>(SR Research, EyeLink)</a:t>
             </a:r>
           </a:p>
           <a:p>
@@ -7908,7 +8723,7 @@
 </p:sld>
 </file>
 
-<file path=ppt/slides/slide11.xml><?xml version="1.0" encoding="utf-8"?>
+<file path=ppt/slides/slide12.xml><?xml version="1.0" encoding="utf-8"?>
 <p:sld xmlns:a="http://schemas.openxmlformats.org/drawingml/2006/main" xmlns:r="http://schemas.openxmlformats.org/officeDocument/2006/relationships" xmlns:p="http://schemas.openxmlformats.org/presentationml/2006/main">
   <p:cSld>
     <p:spTree>
@@ -8513,7 +9328,7 @@
                 <a:ea typeface="Open Sans" panose="020B0606030504020204" pitchFamily="34" charset="0"/>
                 <a:cs typeface="Open Sans" panose="020B0606030504020204" pitchFamily="34" charset="0"/>
               </a:rPr>
-              <a:t>Questions</a:t>
+              <a:t>Outline</a:t>
             </a:r>
             <a:endParaRPr lang="en-US" b="1" dirty="0">
               <a:solidFill>
@@ -8525,12 +9340,12 @@
             </a:endParaRPr>
           </a:p>
           <a:p>
-            <a:pPr marL="800100" lvl="1" indent="-342900">
+            <a:pPr marL="857250" lvl="1" indent="-400050">
               <a:spcAft>
-                <a:spcPts val="2400"/>
+                <a:spcPts val="3000"/>
               </a:spcAft>
               <a:buFont typeface="+mj-lt"/>
-              <a:buAutoNum type="arabicPeriod"/>
+              <a:buAutoNum type="romanUcPeriod"/>
             </a:pPr>
             <a:r>
               <a:rPr lang="en-US" sz="1600" dirty="0" smtClean="0">
@@ -8540,16 +9355,23 @@
                 <a:ea typeface="Open Sans" panose="020B0606030504020204" pitchFamily="34" charset="0"/>
                 <a:cs typeface="Open Sans" panose="020B0606030504020204" pitchFamily="34" charset="0"/>
               </a:rPr>
-              <a:t>What is dreaming?</a:t>
-            </a:r>
-          </a:p>
-          <a:p>
-            <a:pPr marL="800100" lvl="1" indent="-342900">
+              <a:t>General introduction on dreaming</a:t>
+            </a:r>
+            <a:endParaRPr lang="en-US" sz="1600" dirty="0" smtClean="0">
+              <a:solidFill>
+                <a:srgbClr val="34495E"/>
+              </a:solidFill>
+              <a:ea typeface="Open Sans" panose="020B0606030504020204" pitchFamily="34" charset="0"/>
+              <a:cs typeface="Open Sans" panose="020B0606030504020204" pitchFamily="34" charset="0"/>
+            </a:endParaRPr>
+          </a:p>
+          <a:p>
+            <a:pPr marL="857250" lvl="1" indent="-400050">
               <a:spcAft>
-                <a:spcPts val="2400"/>
+                <a:spcPts val="600"/>
               </a:spcAft>
               <a:buFont typeface="+mj-lt"/>
-              <a:buAutoNum type="arabicPeriod"/>
+              <a:buAutoNum type="romanUcPeriod"/>
             </a:pPr>
             <a:r>
               <a:rPr lang="en-US" sz="1600" dirty="0" smtClean="0">
@@ -8559,16 +9381,65 @@
                 <a:ea typeface="Open Sans" panose="020B0606030504020204" pitchFamily="34" charset="0"/>
                 <a:cs typeface="Open Sans" panose="020B0606030504020204" pitchFamily="34" charset="0"/>
               </a:rPr>
-              <a:t>When does it occur during the night?</a:t>
-            </a:r>
-          </a:p>
-          <a:p>
-            <a:pPr marL="800100" lvl="1" indent="-342900">
+              <a:t>Mechanisms of dream recall </a:t>
+            </a:r>
+            <a:r>
+              <a:rPr lang="en-US" sz="1600" dirty="0" smtClean="0">
+                <a:solidFill>
+                  <a:srgbClr val="34495E"/>
+                </a:solidFill>
+                <a:ea typeface="Open Sans" panose="020B0606030504020204" pitchFamily="34" charset="0"/>
+                <a:cs typeface="Open Sans" panose="020B0606030504020204" pitchFamily="34" charset="0"/>
+              </a:rPr>
+              <a:t>frequency (DRF)</a:t>
+            </a:r>
+          </a:p>
+          <a:p>
+            <a:pPr marL="1200150" lvl="2" indent="-285750">
               <a:spcAft>
-                <a:spcPts val="2400"/>
+                <a:spcPts val="3000"/>
+              </a:spcAft>
+              <a:buFont typeface="Arial" panose="020B0604020202020204" pitchFamily="34" charset="0"/>
+              <a:buChar char="•"/>
+            </a:pPr>
+            <a:r>
+              <a:rPr lang="en-US" sz="1600" dirty="0" smtClean="0">
+                <a:solidFill>
+                  <a:srgbClr val="34495E"/>
+                </a:solidFill>
+                <a:ea typeface="Open Sans" panose="020B0606030504020204" pitchFamily="34" charset="0"/>
+                <a:cs typeface="Open Sans" panose="020B0606030504020204" pitchFamily="34" charset="0"/>
+              </a:rPr>
+              <a:t>Studies </a:t>
+            </a:r>
+            <a:r>
+              <a:rPr lang="en-US" sz="1600" dirty="0">
+                <a:solidFill>
+                  <a:srgbClr val="34495E"/>
+                </a:solidFill>
+                <a:ea typeface="Open Sans" panose="020B0606030504020204" pitchFamily="34" charset="0"/>
+                <a:cs typeface="Open Sans" panose="020B0606030504020204" pitchFamily="34" charset="0"/>
+              </a:rPr>
+              <a:t>1–4 </a:t>
+            </a:r>
+            <a:r>
+              <a:rPr lang="en-US" sz="1600" dirty="0" smtClean="0">
+                <a:solidFill>
+                  <a:srgbClr val="34495E"/>
+                </a:solidFill>
+                <a:ea typeface="Open Sans" panose="020B0606030504020204" pitchFamily="34" charset="0"/>
+                <a:cs typeface="Open Sans" panose="020B0606030504020204" pitchFamily="34" charset="0"/>
+              </a:rPr>
+              <a:t>		</a:t>
+            </a:r>
+          </a:p>
+          <a:p>
+            <a:pPr marL="857250" lvl="1" indent="-400050">
+              <a:spcAft>
+                <a:spcPts val="600"/>
               </a:spcAft>
               <a:buFont typeface="+mj-lt"/>
-              <a:buAutoNum type="arabicPeriod"/>
+              <a:buAutoNum type="romanUcPeriod"/>
             </a:pPr>
             <a:r>
               <a:rPr lang="en-US" sz="1600" dirty="0" smtClean="0">
@@ -8578,16 +9449,45 @@
                 <a:ea typeface="Open Sans" panose="020B0606030504020204" pitchFamily="34" charset="0"/>
                 <a:cs typeface="Open Sans" panose="020B0606030504020204" pitchFamily="34" charset="0"/>
               </a:rPr>
-              <a:t>Do dreams have a function?</a:t>
-            </a:r>
-          </a:p>
-          <a:p>
-            <a:pPr marL="800100" lvl="1" indent="-342900">
+              <a:t>Dream </a:t>
+            </a:r>
+            <a:r>
+              <a:rPr lang="en-US" sz="1600" dirty="0" smtClean="0">
+                <a:solidFill>
+                  <a:srgbClr val="34495E"/>
+                </a:solidFill>
+                <a:ea typeface="Open Sans" panose="020B0606030504020204" pitchFamily="34" charset="0"/>
+                <a:cs typeface="Open Sans" panose="020B0606030504020204" pitchFamily="34" charset="0"/>
+              </a:rPr>
+              <a:t>content and dream function</a:t>
+            </a:r>
+          </a:p>
+          <a:p>
+            <a:pPr marL="1200150" lvl="2" indent="-285750">
               <a:spcAft>
-                <a:spcPts val="2400"/>
+                <a:spcPts val="3000"/>
+              </a:spcAft>
+              <a:buFont typeface="Arial" panose="020B0604020202020204" pitchFamily="34" charset="0"/>
+              <a:buChar char="•"/>
+            </a:pPr>
+            <a:r>
+              <a:rPr lang="en-US" sz="1600" dirty="0" smtClean="0">
+                <a:solidFill>
+                  <a:srgbClr val="34495E"/>
+                </a:solidFill>
+                <a:ea typeface="Open Sans" panose="020B0606030504020204" pitchFamily="34" charset="0"/>
+                <a:cs typeface="Open Sans" panose="020B0606030504020204" pitchFamily="34" charset="0"/>
+              </a:rPr>
+              <a:t>Study 5</a:t>
+            </a:r>
+          </a:p>
+          <a:p>
+            <a:pPr marL="857250" lvl="1" indent="-400050">
+              <a:spcAft>
+                <a:spcPts val="600"/>
               </a:spcAft>
               <a:buFont typeface="+mj-lt"/>
-              <a:buAutoNum type="arabicPeriod"/>
+              <a:buAutoNum type="romanUcPeriod"/>
             </a:pPr>
             <a:r>
               <a:rPr lang="en-US" sz="1600" dirty="0" smtClean="0">
@@ -8597,21 +9497,90 @@
                 <a:ea typeface="Open Sans" panose="020B0606030504020204" pitchFamily="34" charset="0"/>
                 <a:cs typeface="Open Sans" panose="020B0606030504020204" pitchFamily="34" charset="0"/>
               </a:rPr>
-              <a:t>Why is there such variability in dream recall?</a:t>
-            </a:r>
-          </a:p>
-          <a:p>
-            <a:pPr marL="1257300" lvl="2" indent="-342900">
+              <a:t>Methodological </a:t>
+            </a:r>
+            <a:r>
+              <a:rPr lang="en-US" sz="1600" dirty="0" smtClean="0">
+                <a:solidFill>
+                  <a:srgbClr val="34495E"/>
+                </a:solidFill>
+                <a:ea typeface="Open Sans" panose="020B0606030504020204" pitchFamily="34" charset="0"/>
+                <a:cs typeface="Open Sans" panose="020B0606030504020204" pitchFamily="34" charset="0"/>
+              </a:rPr>
+              <a:t>development</a:t>
+            </a:r>
+          </a:p>
+          <a:p>
+            <a:pPr marL="1200150" lvl="2" indent="-285750">
+              <a:spcAft>
+                <a:spcPts val="3000"/>
+              </a:spcAft>
+              <a:buFont typeface="Arial" panose="020B0604020202020204" pitchFamily="34" charset="0"/>
+              <a:buChar char="•"/>
+            </a:pPr>
+            <a:r>
+              <a:rPr lang="en-US" sz="1600" dirty="0" smtClean="0">
+                <a:solidFill>
+                  <a:srgbClr val="34495E"/>
+                </a:solidFill>
+                <a:ea typeface="Open Sans" panose="020B0606030504020204" pitchFamily="34" charset="0"/>
+                <a:cs typeface="Open Sans" panose="020B0606030504020204" pitchFamily="34" charset="0"/>
+              </a:rPr>
+              <a:t>Study </a:t>
+            </a:r>
+            <a:r>
+              <a:rPr lang="en-US" sz="1600" dirty="0" smtClean="0">
+                <a:solidFill>
+                  <a:srgbClr val="34495E"/>
+                </a:solidFill>
+                <a:ea typeface="Open Sans" panose="020B0606030504020204" pitchFamily="34" charset="0"/>
+                <a:cs typeface="Open Sans" panose="020B0606030504020204" pitchFamily="34" charset="0"/>
+              </a:rPr>
+              <a:t>6</a:t>
+            </a:r>
+          </a:p>
+          <a:p>
+            <a:pPr marL="857250" lvl="1" indent="-400050">
               <a:spcAft>
                 <a:spcPts val="1800"/>
               </a:spcAft>
               <a:buFont typeface="+mj-lt"/>
-              <a:buAutoNum type="arabicPeriod"/>
+              <a:buAutoNum type="romanUcPeriod"/>
             </a:pPr>
-            <a:endParaRPr lang="en-US" sz="1600" dirty="0" smtClean="0">
+            <a:r>
+              <a:rPr lang="en-US" sz="1600" dirty="0" smtClean="0">
+                <a:solidFill>
+                  <a:srgbClr val="34495E"/>
+                </a:solidFill>
+                <a:ea typeface="Open Sans" panose="020B0606030504020204" pitchFamily="34" charset="0"/>
+                <a:cs typeface="Open Sans" panose="020B0606030504020204" pitchFamily="34" charset="0"/>
+              </a:rPr>
+              <a:t>General </a:t>
+            </a:r>
+            <a:r>
+              <a:rPr lang="en-US" sz="1600" dirty="0" smtClean="0">
+                <a:solidFill>
+                  <a:srgbClr val="34495E"/>
+                </a:solidFill>
+                <a:ea typeface="Open Sans" panose="020B0606030504020204" pitchFamily="34" charset="0"/>
+                <a:cs typeface="Open Sans" panose="020B0606030504020204" pitchFamily="34" charset="0"/>
+              </a:rPr>
+              <a:t>conclusion</a:t>
+            </a:r>
+          </a:p>
+          <a:p>
+            <a:pPr>
+              <a:spcAft>
+                <a:spcPts val="1200"/>
+              </a:spcAft>
+            </a:pPr>
+            <a:endParaRPr lang="en-US" dirty="0">
               <a:solidFill>
-                <a:srgbClr val="34495E"/>
+                <a:schemeClr val="tx2">
+                  <a:lumMod val="50000"/>
+                </a:schemeClr>
               </a:solidFill>
+              <a:latin typeface="Open Sans" panose="020B0606030504020204" pitchFamily="34" charset="0"/>
               <a:ea typeface="Open Sans" panose="020B0606030504020204" pitchFamily="34" charset="0"/>
               <a:cs typeface="Open Sans" panose="020B0606030504020204" pitchFamily="34" charset="0"/>
             </a:endParaRPr>
@@ -8696,59 +9665,14 @@
           <a:p>
             <a:pPr algn="ctr"/>
             <a:r>
-              <a:rPr lang="en-US" sz="1100" b="1" i="1" dirty="0" smtClean="0">
-                <a:solidFill>
-                  <a:srgbClr val="34495E"/>
+              <a:rPr lang="en-US" sz="1100" i="1" dirty="0" smtClean="0">
+                <a:solidFill>
+                  <a:srgbClr val="95A5A6"/>
                 </a:solidFill>
                 <a:latin typeface="Roboto Light" panose="02000000000000000000" pitchFamily="2" charset="0"/>
                 <a:ea typeface="Roboto Light" panose="02000000000000000000" pitchFamily="2" charset="0"/>
               </a:rPr>
               <a:t>Introduction</a:t>
-            </a:r>
-            <a:endParaRPr lang="en-US" sz="1100" b="1" i="1" dirty="0">
-              <a:solidFill>
-                <a:srgbClr val="34495E"/>
-              </a:solidFill>
-              <a:latin typeface="Roboto Light" panose="02000000000000000000" pitchFamily="2" charset="0"/>
-              <a:ea typeface="Roboto Light" panose="02000000000000000000" pitchFamily="2" charset="0"/>
-            </a:endParaRPr>
-          </a:p>
-        </p:txBody>
-      </p:sp>
-      <p:sp>
-        <p:nvSpPr>
-          <p:cNvPr id="18" name="ZoneTexte 17"/>
-          <p:cNvSpPr txBox="1"/>
-          <p:nvPr/>
-        </p:nvSpPr>
-        <p:spPr>
-          <a:xfrm>
-            <a:off x="1828800" y="258463"/>
-            <a:ext cx="1828800" cy="261610"/>
-          </a:xfrm>
-          <a:prstGeom prst="rect">
-            <a:avLst/>
-          </a:prstGeom>
-          <a:solidFill>
-            <a:srgbClr val="ECF0F1"/>
-          </a:solidFill>
-        </p:spPr>
-        <p:txBody>
-          <a:bodyPr wrap="square" rtlCol="0">
-            <a:spAutoFit/>
-          </a:bodyPr>
-          <a:lstStyle/>
-          <a:p>
-            <a:pPr algn="ctr"/>
-            <a:r>
-              <a:rPr lang="en-US" sz="1100" i="1" dirty="0" smtClean="0">
-                <a:solidFill>
-                  <a:srgbClr val="95A5A6"/>
-                </a:solidFill>
-                <a:latin typeface="Roboto Light" panose="02000000000000000000" pitchFamily="2" charset="0"/>
-                <a:ea typeface="Roboto Light" panose="02000000000000000000" pitchFamily="2" charset="0"/>
-              </a:rPr>
-              <a:t>Dream recall</a:t>
             </a:r>
             <a:endParaRPr lang="en-US" sz="1100" i="1" dirty="0">
               <a:solidFill>
@@ -8762,13 +9686,13 @@
       </p:sp>
       <p:sp>
         <p:nvSpPr>
-          <p:cNvPr id="19" name="ZoneTexte 18"/>
+          <p:cNvPr id="18" name="ZoneTexte 17"/>
           <p:cNvSpPr txBox="1"/>
           <p:nvPr/>
         </p:nvSpPr>
         <p:spPr>
           <a:xfrm>
-            <a:off x="3657600" y="258463"/>
+            <a:off x="1828800" y="258463"/>
             <a:ext cx="1828800" cy="261610"/>
           </a:xfrm>
           <a:prstGeom prst="rect">
@@ -8793,7 +9717,7 @@
                 <a:latin typeface="Roboto Light" panose="02000000000000000000" pitchFamily="2" charset="0"/>
                 <a:ea typeface="Roboto Light" panose="02000000000000000000" pitchFamily="2" charset="0"/>
               </a:rPr>
-              <a:t>Dream content</a:t>
+              <a:t>Dream recall</a:t>
             </a:r>
             <a:endParaRPr lang="en-US" sz="1100" i="1" dirty="0">
               <a:solidFill>
@@ -8807,13 +9731,13 @@
       </p:sp>
       <p:sp>
         <p:nvSpPr>
-          <p:cNvPr id="20" name="ZoneTexte 19"/>
+          <p:cNvPr id="19" name="ZoneTexte 18"/>
           <p:cNvSpPr txBox="1"/>
           <p:nvPr/>
         </p:nvSpPr>
         <p:spPr>
           <a:xfrm>
-            <a:off x="5486400" y="258463"/>
+            <a:off x="3657600" y="258463"/>
             <a:ext cx="1828800" cy="261610"/>
           </a:xfrm>
           <a:prstGeom prst="rect">
@@ -8838,7 +9762,7 @@
                 <a:latin typeface="Roboto Light" panose="02000000000000000000" pitchFamily="2" charset="0"/>
                 <a:ea typeface="Roboto Light" panose="02000000000000000000" pitchFamily="2" charset="0"/>
               </a:rPr>
-              <a:t>Software</a:t>
+              <a:t>Dream content</a:t>
             </a:r>
             <a:endParaRPr lang="en-US" sz="1100" i="1" dirty="0">
               <a:solidFill>
@@ -8852,13 +9776,13 @@
       </p:sp>
       <p:sp>
         <p:nvSpPr>
-          <p:cNvPr id="21" name="ZoneTexte 20"/>
+          <p:cNvPr id="20" name="ZoneTexte 19"/>
           <p:cNvSpPr txBox="1"/>
           <p:nvPr/>
         </p:nvSpPr>
         <p:spPr>
           <a:xfrm>
-            <a:off x="7315200" y="258463"/>
+            <a:off x="5486400" y="258463"/>
             <a:ext cx="1828800" cy="261610"/>
           </a:xfrm>
           <a:prstGeom prst="rect">
@@ -8883,7 +9807,7 @@
                 <a:latin typeface="Roboto Light" panose="02000000000000000000" pitchFamily="2" charset="0"/>
                 <a:ea typeface="Roboto Light" panose="02000000000000000000" pitchFamily="2" charset="0"/>
               </a:rPr>
-              <a:t>Conclusion</a:t>
+              <a:t>Software</a:t>
             </a:r>
             <a:endParaRPr lang="en-US" sz="1100" i="1" dirty="0">
               <a:solidFill>
@@ -8897,6 +9821,51 @@
       </p:sp>
       <p:sp>
         <p:nvSpPr>
+          <p:cNvPr id="21" name="ZoneTexte 20"/>
+          <p:cNvSpPr txBox="1"/>
+          <p:nvPr/>
+        </p:nvSpPr>
+        <p:spPr>
+          <a:xfrm>
+            <a:off x="7315200" y="258463"/>
+            <a:ext cx="1828800" cy="261610"/>
+          </a:xfrm>
+          <a:prstGeom prst="rect">
+            <a:avLst/>
+          </a:prstGeom>
+          <a:solidFill>
+            <a:srgbClr val="ECF0F1"/>
+          </a:solidFill>
+        </p:spPr>
+        <p:txBody>
+          <a:bodyPr wrap="square" rtlCol="0">
+            <a:spAutoFit/>
+          </a:bodyPr>
+          <a:lstStyle/>
+          <a:p>
+            <a:pPr algn="ctr"/>
+            <a:r>
+              <a:rPr lang="en-US" sz="1100" i="1" dirty="0" smtClean="0">
+                <a:solidFill>
+                  <a:srgbClr val="95A5A6"/>
+                </a:solidFill>
+                <a:latin typeface="Roboto Light" panose="02000000000000000000" pitchFamily="2" charset="0"/>
+                <a:ea typeface="Roboto Light" panose="02000000000000000000" pitchFamily="2" charset="0"/>
+              </a:rPr>
+              <a:t>Conclusion</a:t>
+            </a:r>
+            <a:endParaRPr lang="en-US" sz="1100" i="1" dirty="0">
+              <a:solidFill>
+                <a:srgbClr val="95A5A6"/>
+              </a:solidFill>
+              <a:latin typeface="Roboto Light" panose="02000000000000000000" pitchFamily="2" charset="0"/>
+              <a:ea typeface="Roboto Light" panose="02000000000000000000" pitchFamily="2" charset="0"/>
+            </a:endParaRPr>
+          </a:p>
+        </p:txBody>
+      </p:sp>
+      <p:sp>
+        <p:nvSpPr>
           <p:cNvPr id="22" name="Espace réservé du numéro de diapositive 3"/>
           <p:cNvSpPr>
             <a:spLocks noGrp="1"/>
@@ -8922,7 +9891,7 @@
                   <a:srgbClr val="7F8C8D"/>
                 </a:solidFill>
               </a:rPr>
-              <a:t>3</a:t>
+              <a:t>2</a:t>
             </a:r>
             <a:endParaRPr lang="en-US" sz="1100" dirty="0">
               <a:solidFill>
@@ -9068,6 +10037,356 @@
               </a:solidFill>
               <a:latin typeface="Roboto Light" panose="02000000000000000000" pitchFamily="2" charset="0"/>
               <a:ea typeface="Roboto Light" panose="02000000000000000000" pitchFamily="2" charset="0"/>
+            </a:endParaRPr>
+          </a:p>
+        </p:txBody>
+      </p:sp>
+    </p:spTree>
+    <p:extLst>
+      <p:ext uri="{BB962C8B-B14F-4D97-AF65-F5344CB8AC3E}">
+        <p14:creationId xmlns:p14="http://schemas.microsoft.com/office/powerpoint/2010/main" val="3572973569"/>
+      </p:ext>
+    </p:extLst>
+  </p:cSld>
+  <p:clrMapOvr>
+    <a:masterClrMapping/>
+  </p:clrMapOvr>
+  <p:timing>
+    <p:tnLst>
+      <p:par>
+        <p:cTn id="1" dur="indefinite" restart="never" nodeType="tmRoot"/>
+      </p:par>
+    </p:tnLst>
+  </p:timing>
+</p:sld>
+</file>
+
+<file path=ppt/slides/slide3.xml><?xml version="1.0" encoding="utf-8"?>
+<p:sld xmlns:a="http://schemas.openxmlformats.org/drawingml/2006/main" xmlns:r="http://schemas.openxmlformats.org/officeDocument/2006/relationships" xmlns:p="http://schemas.openxmlformats.org/presentationml/2006/main">
+  <p:cSld>
+    <p:spTree>
+      <p:nvGrpSpPr>
+        <p:cNvPr id="1" name=""/>
+        <p:cNvGrpSpPr/>
+        <p:nvPr/>
+      </p:nvGrpSpPr>
+      <p:grpSpPr>
+        <a:xfrm>
+          <a:off x="0" y="0"/>
+          <a:ext cx="0" cy="0"/>
+          <a:chOff x="0" y="0"/>
+          <a:chExt cx="0" cy="0"/>
+        </a:xfrm>
+      </p:grpSpPr>
+      <p:sp>
+        <p:nvSpPr>
+          <p:cNvPr id="13" name="Rectangle 12"/>
+          <p:cNvSpPr/>
+          <p:nvPr/>
+        </p:nvSpPr>
+        <p:spPr>
+          <a:xfrm>
+            <a:off x="4572000" y="2022021"/>
+            <a:ext cx="3960813" cy="2813957"/>
+          </a:xfrm>
+          <a:prstGeom prst="rect">
+            <a:avLst/>
+          </a:prstGeom>
+          <a:noFill/>
+          <a:ln>
+            <a:noFill/>
+          </a:ln>
+        </p:spPr>
+        <p:style>
+          <a:lnRef idx="2">
+            <a:schemeClr val="accent1">
+              <a:shade val="50000"/>
+            </a:schemeClr>
+          </a:lnRef>
+          <a:fillRef idx="1">
+            <a:schemeClr val="accent1"/>
+          </a:fillRef>
+          <a:effectRef idx="0">
+            <a:schemeClr val="accent1"/>
+          </a:effectRef>
+          <a:fontRef idx="minor">
+            <a:schemeClr val="lt1"/>
+          </a:fontRef>
+        </p:style>
+        <p:txBody>
+          <a:bodyPr rtlCol="0" anchor="t"/>
+          <a:lstStyle/>
+          <a:p>
+            <a:pPr algn="ctr">
+              <a:spcAft>
+                <a:spcPts val="2400"/>
+              </a:spcAft>
+            </a:pPr>
+            <a:r>
+              <a:rPr lang="en-US" b="1" dirty="0" smtClean="0">
+                <a:solidFill>
+                  <a:srgbClr val="34495E"/>
+                </a:solidFill>
+                <a:latin typeface="+mj-lt"/>
+                <a:ea typeface="Open Sans" panose="020B0606030504020204" pitchFamily="34" charset="0"/>
+                <a:cs typeface="Open Sans" panose="020B0606030504020204" pitchFamily="34" charset="0"/>
+              </a:rPr>
+              <a:t>INTRODUCTION</a:t>
+            </a:r>
+            <a:endParaRPr lang="en-US" b="1" dirty="0">
+              <a:solidFill>
+                <a:srgbClr val="34495E"/>
+              </a:solidFill>
+              <a:latin typeface="+mj-lt"/>
+              <a:ea typeface="Open Sans" panose="020B0606030504020204" pitchFamily="34" charset="0"/>
+              <a:cs typeface="Open Sans" panose="020B0606030504020204" pitchFamily="34" charset="0"/>
+            </a:endParaRPr>
+          </a:p>
+          <a:p>
+            <a:pPr marL="342900" indent="-342900">
+              <a:spcAft>
+                <a:spcPts val="1800"/>
+              </a:spcAft>
+              <a:buFont typeface="+mj-lt"/>
+              <a:buAutoNum type="arabicPeriod"/>
+            </a:pPr>
+            <a:r>
+              <a:rPr lang="en-US" sz="1600" dirty="0" smtClean="0">
+                <a:solidFill>
+                  <a:srgbClr val="34495E"/>
+                </a:solidFill>
+                <a:ea typeface="Open Sans" panose="020B0606030504020204" pitchFamily="34" charset="0"/>
+                <a:cs typeface="Open Sans" panose="020B0606030504020204" pitchFamily="34" charset="0"/>
+              </a:rPr>
+              <a:t>What is dreaming?</a:t>
+            </a:r>
+          </a:p>
+          <a:p>
+            <a:pPr marL="342900" indent="-342900">
+              <a:spcAft>
+                <a:spcPts val="1800"/>
+              </a:spcAft>
+              <a:buFont typeface="+mj-lt"/>
+              <a:buAutoNum type="arabicPeriod"/>
+            </a:pPr>
+            <a:r>
+              <a:rPr lang="en-US" sz="1600" dirty="0" smtClean="0">
+                <a:solidFill>
+                  <a:srgbClr val="34495E"/>
+                </a:solidFill>
+                <a:ea typeface="Open Sans" panose="020B0606030504020204" pitchFamily="34" charset="0"/>
+                <a:cs typeface="Open Sans" panose="020B0606030504020204" pitchFamily="34" charset="0"/>
+              </a:rPr>
+              <a:t>When does it occur during </a:t>
+            </a:r>
+            <a:r>
+              <a:rPr lang="en-US" sz="1600" dirty="0" smtClean="0">
+                <a:solidFill>
+                  <a:srgbClr val="34495E"/>
+                </a:solidFill>
+                <a:ea typeface="Open Sans" panose="020B0606030504020204" pitchFamily="34" charset="0"/>
+                <a:cs typeface="Open Sans" panose="020B0606030504020204" pitchFamily="34" charset="0"/>
+              </a:rPr>
+              <a:t>sleep?</a:t>
+            </a:r>
+            <a:endParaRPr lang="en-US" sz="1600" dirty="0" smtClean="0">
+              <a:solidFill>
+                <a:srgbClr val="34495E"/>
+              </a:solidFill>
+              <a:ea typeface="Open Sans" panose="020B0606030504020204" pitchFamily="34" charset="0"/>
+              <a:cs typeface="Open Sans" panose="020B0606030504020204" pitchFamily="34" charset="0"/>
+            </a:endParaRPr>
+          </a:p>
+          <a:p>
+            <a:pPr marL="342900" indent="-342900">
+              <a:spcAft>
+                <a:spcPts val="1800"/>
+              </a:spcAft>
+              <a:buFont typeface="+mj-lt"/>
+              <a:buAutoNum type="arabicPeriod"/>
+            </a:pPr>
+            <a:r>
+              <a:rPr lang="en-US" sz="1600" dirty="0" smtClean="0">
+                <a:solidFill>
+                  <a:srgbClr val="34495E"/>
+                </a:solidFill>
+                <a:ea typeface="Open Sans" panose="020B0606030504020204" pitchFamily="34" charset="0"/>
+                <a:cs typeface="Open Sans" panose="020B0606030504020204" pitchFamily="34" charset="0"/>
+              </a:rPr>
+              <a:t>Does it have a function?</a:t>
+            </a:r>
+            <a:endParaRPr lang="en-US" sz="1600" dirty="0" smtClean="0">
+              <a:solidFill>
+                <a:srgbClr val="34495E"/>
+              </a:solidFill>
+              <a:ea typeface="Open Sans" panose="020B0606030504020204" pitchFamily="34" charset="0"/>
+              <a:cs typeface="Open Sans" panose="020B0606030504020204" pitchFamily="34" charset="0"/>
+            </a:endParaRPr>
+          </a:p>
+          <a:p>
+            <a:pPr marL="342900" indent="-342900">
+              <a:spcAft>
+                <a:spcPts val="1800"/>
+              </a:spcAft>
+              <a:buFont typeface="+mj-lt"/>
+              <a:buAutoNum type="arabicPeriod"/>
+            </a:pPr>
+            <a:r>
+              <a:rPr lang="en-US" sz="1600" dirty="0" smtClean="0">
+                <a:solidFill>
+                  <a:srgbClr val="34495E"/>
+                </a:solidFill>
+                <a:ea typeface="Open Sans" panose="020B0606030504020204" pitchFamily="34" charset="0"/>
+                <a:cs typeface="Open Sans" panose="020B0606030504020204" pitchFamily="34" charset="0"/>
+              </a:rPr>
+              <a:t>Why </a:t>
+            </a:r>
+            <a:r>
+              <a:rPr lang="en-US" sz="1600" dirty="0" smtClean="0">
+                <a:solidFill>
+                  <a:srgbClr val="34495E"/>
+                </a:solidFill>
+                <a:ea typeface="Open Sans" panose="020B0606030504020204" pitchFamily="34" charset="0"/>
+                <a:cs typeface="Open Sans" panose="020B0606030504020204" pitchFamily="34" charset="0"/>
+              </a:rPr>
+              <a:t>such variability in dream recall?</a:t>
+            </a:r>
+            <a:endParaRPr lang="en-US" sz="1600" dirty="0" smtClean="0">
+              <a:solidFill>
+                <a:srgbClr val="34495E"/>
+              </a:solidFill>
+              <a:ea typeface="Open Sans" panose="020B0606030504020204" pitchFamily="34" charset="0"/>
+              <a:cs typeface="Open Sans" panose="020B0606030504020204" pitchFamily="34" charset="0"/>
+            </a:endParaRPr>
+          </a:p>
+          <a:p>
+            <a:pPr marL="1257300" lvl="2" indent="-342900">
+              <a:spcAft>
+                <a:spcPts val="1800"/>
+              </a:spcAft>
+              <a:buFont typeface="+mj-lt"/>
+              <a:buAutoNum type="arabicPeriod"/>
+            </a:pPr>
+            <a:endParaRPr lang="en-US" sz="1600" dirty="0" smtClean="0">
+              <a:solidFill>
+                <a:srgbClr val="34495E"/>
+              </a:solidFill>
+              <a:ea typeface="Open Sans" panose="020B0606030504020204" pitchFamily="34" charset="0"/>
+              <a:cs typeface="Open Sans" panose="020B0606030504020204" pitchFamily="34" charset="0"/>
+            </a:endParaRPr>
+          </a:p>
+        </p:txBody>
+      </p:sp>
+      <p:pic>
+        <p:nvPicPr>
+          <p:cNvPr id="2" name="Image 1"/>
+          <p:cNvPicPr>
+            <a:picLocks noChangeAspect="1"/>
+          </p:cNvPicPr>
+          <p:nvPr/>
+        </p:nvPicPr>
+        <p:blipFill>
+          <a:blip r:embed="rId2">
+            <a:extLst>
+              <a:ext uri="{28A0092B-C50C-407E-A947-70E740481C1C}">
+                <a14:useLocalDpi xmlns:a14="http://schemas.microsoft.com/office/drawing/2010/main" val="0"/>
+              </a:ext>
+            </a:extLst>
+          </a:blip>
+          <a:stretch>
+            <a:fillRect/>
+          </a:stretch>
+        </p:blipFill>
+        <p:spPr>
+          <a:xfrm>
+            <a:off x="611188" y="417942"/>
+            <a:ext cx="3809812" cy="5652000"/>
+          </a:xfrm>
+          <a:prstGeom prst="rect">
+            <a:avLst/>
+          </a:prstGeom>
+        </p:spPr>
+      </p:pic>
+      <p:sp>
+        <p:nvSpPr>
+          <p:cNvPr id="14" name="ZoneTexte 13"/>
+          <p:cNvSpPr txBox="1"/>
+          <p:nvPr/>
+        </p:nvSpPr>
+        <p:spPr>
+          <a:xfrm>
+            <a:off x="749320" y="6146142"/>
+            <a:ext cx="3533548" cy="430887"/>
+          </a:xfrm>
+          <a:prstGeom prst="rect">
+            <a:avLst/>
+          </a:prstGeom>
+          <a:noFill/>
+        </p:spPr>
+        <p:txBody>
+          <a:bodyPr wrap="square" rtlCol="0">
+            <a:spAutoFit/>
+          </a:bodyPr>
+          <a:lstStyle/>
+          <a:p>
+            <a:r>
+              <a:rPr lang="fr-FR" sz="1100" dirty="0" smtClean="0">
+                <a:solidFill>
+                  <a:srgbClr val="2C3E50"/>
+                </a:solidFill>
+                <a:latin typeface="Roboto Medium" panose="02000000000000000000" pitchFamily="2" charset="0"/>
+                <a:ea typeface="Roboto Medium" panose="02000000000000000000" pitchFamily="2" charset="0"/>
+              </a:rPr>
+              <a:t>— Jean-Jacques </a:t>
+            </a:r>
+            <a:r>
+              <a:rPr lang="fr-FR" sz="1100" dirty="0" smtClean="0">
+                <a:solidFill>
+                  <a:srgbClr val="2C3E50"/>
+                </a:solidFill>
+                <a:latin typeface="Roboto Medium" panose="02000000000000000000" pitchFamily="2" charset="0"/>
+                <a:ea typeface="Roboto Medium" panose="02000000000000000000" pitchFamily="2" charset="0"/>
+              </a:rPr>
+              <a:t>Grandville </a:t>
+            </a:r>
+          </a:p>
+          <a:p>
+            <a:r>
+              <a:rPr lang="fr-FR" sz="1100" dirty="0" smtClean="0">
+                <a:solidFill>
+                  <a:srgbClr val="2C3E50"/>
+                </a:solidFill>
+                <a:latin typeface="Roboto" pitchFamily="2" charset="0"/>
+                <a:ea typeface="Roboto" pitchFamily="2" charset="0"/>
+              </a:rPr>
+              <a:t>Second rêve: </a:t>
+            </a:r>
+            <a:r>
+              <a:rPr lang="fr-FR" sz="1100" i="1" dirty="0" smtClean="0">
+                <a:solidFill>
+                  <a:srgbClr val="2C3E50"/>
+                </a:solidFill>
+                <a:latin typeface="Roboto" pitchFamily="2" charset="0"/>
+                <a:ea typeface="Roboto" pitchFamily="2" charset="0"/>
+              </a:rPr>
+              <a:t>une promenade dans le ciel</a:t>
+            </a:r>
+            <a:r>
+              <a:rPr lang="fr-FR" sz="1100" dirty="0" smtClean="0">
+                <a:solidFill>
+                  <a:srgbClr val="2C3E50"/>
+                </a:solidFill>
+                <a:latin typeface="Roboto" pitchFamily="2" charset="0"/>
+                <a:ea typeface="Roboto" pitchFamily="2" charset="0"/>
+              </a:rPr>
+              <a:t>. 1847</a:t>
+            </a:r>
+            <a:endParaRPr lang="fr-FR" sz="1100" dirty="0">
+              <a:solidFill>
+                <a:srgbClr val="2C3E50"/>
+              </a:solidFill>
+              <a:latin typeface="Roboto" pitchFamily="2" charset="0"/>
+              <a:ea typeface="Roboto" pitchFamily="2" charset="0"/>
             </a:endParaRPr>
           </a:p>
         </p:txBody>
@@ -9092,7 +10411,7 @@
 </p:sld>
 </file>
 
-<file path=ppt/slides/slide3.xml><?xml version="1.0" encoding="utf-8"?>
+<file path=ppt/slides/slide4.xml><?xml version="1.0" encoding="utf-8"?>
 <p:sld xmlns:a="http://schemas.openxmlformats.org/drawingml/2006/main" xmlns:r="http://schemas.openxmlformats.org/officeDocument/2006/relationships" xmlns:p="http://schemas.openxmlformats.org/presentationml/2006/main">
   <p:cSld>
     <p:spTree>
@@ -10166,7 +11485,7 @@
 </p:sld>
 </file>
 
-<file path=ppt/slides/slide4.xml><?xml version="1.0" encoding="utf-8"?>
+<file path=ppt/slides/slide5.xml><?xml version="1.0" encoding="utf-8"?>
 <p:sld xmlns:a="http://schemas.openxmlformats.org/drawingml/2006/main" xmlns:r="http://schemas.openxmlformats.org/officeDocument/2006/relationships" xmlns:p="http://schemas.openxmlformats.org/presentationml/2006/main">
   <p:cSld>
     <p:spTree>
@@ -10888,7 +12207,7 @@
 </p:sld>
 </file>
 
-<file path=ppt/slides/slide5.xml><?xml version="1.0" encoding="utf-8"?>
+<file path=ppt/slides/slide6.xml><?xml version="1.0" encoding="utf-8"?>
 <p:sld xmlns:a="http://schemas.openxmlformats.org/drawingml/2006/main" xmlns:r="http://schemas.openxmlformats.org/officeDocument/2006/relationships" xmlns:p="http://schemas.openxmlformats.org/presentationml/2006/main">
   <p:cSld>
     <p:spTree>
@@ -11769,11 +13088,6 @@
               </a:rPr>
               <a:t>Paul Valery</a:t>
             </a:r>
-            <a:endParaRPr lang="en-US" sz="1600" b="1" dirty="0" smtClean="0">
-              <a:solidFill>
-                <a:srgbClr val="233548"/>
-              </a:solidFill>
-            </a:endParaRPr>
           </a:p>
           <a:p>
             <a:pPr algn="r">
@@ -11860,7 +13174,7 @@
 </p:sld>
 </file>
 
-<file path=ppt/slides/slide6.xml><?xml version="1.0" encoding="utf-8"?>
+<file path=ppt/slides/slide7.xml><?xml version="1.0" encoding="utf-8"?>
 <p:sld xmlns:a="http://schemas.openxmlformats.org/drawingml/2006/main" xmlns:r="http://schemas.openxmlformats.org/officeDocument/2006/relationships" xmlns:p="http://schemas.openxmlformats.org/presentationml/2006/main">
   <p:cSld>
     <p:spTree>
@@ -12753,836 +14067,6 @@
     <p:extLst>
       <p:ext uri="{BB962C8B-B14F-4D97-AF65-F5344CB8AC3E}">
         <p14:creationId xmlns:p14="http://schemas.microsoft.com/office/powerpoint/2010/main" val="2597447392"/>
-      </p:ext>
-    </p:extLst>
-  </p:cSld>
-  <p:clrMapOvr>
-    <a:masterClrMapping/>
-  </p:clrMapOvr>
-  <p:timing>
-    <p:tnLst>
-      <p:par>
-        <p:cTn id="1" dur="indefinite" restart="never" nodeType="tmRoot"/>
-      </p:par>
-    </p:tnLst>
-  </p:timing>
-</p:sld>
-</file>
-
-<file path=ppt/slides/slide7.xml><?xml version="1.0" encoding="utf-8"?>
-<p:sld xmlns:a="http://schemas.openxmlformats.org/drawingml/2006/main" xmlns:r="http://schemas.openxmlformats.org/officeDocument/2006/relationships" xmlns:p="http://schemas.openxmlformats.org/presentationml/2006/main">
-  <p:cSld>
-    <p:spTree>
-      <p:nvGrpSpPr>
-        <p:cNvPr id="1" name=""/>
-        <p:cNvGrpSpPr/>
-        <p:nvPr/>
-      </p:nvGrpSpPr>
-      <p:grpSpPr>
-        <a:xfrm>
-          <a:off x="0" y="0"/>
-          <a:ext cx="0" cy="0"/>
-          <a:chOff x="0" y="0"/>
-          <a:chExt cx="0" cy="0"/>
-        </a:xfrm>
-      </p:grpSpPr>
-      <p:sp>
-        <p:nvSpPr>
-          <p:cNvPr id="13" name="Rectangle 12"/>
-          <p:cNvSpPr/>
-          <p:nvPr/>
-        </p:nvSpPr>
-        <p:spPr>
-          <a:xfrm>
-            <a:off x="611188" y="800100"/>
-            <a:ext cx="7921625" cy="5508625"/>
-          </a:xfrm>
-          <a:prstGeom prst="rect">
-            <a:avLst/>
-          </a:prstGeom>
-          <a:noFill/>
-          <a:ln>
-            <a:noFill/>
-          </a:ln>
-        </p:spPr>
-        <p:style>
-          <a:lnRef idx="2">
-            <a:schemeClr val="accent1">
-              <a:shade val="50000"/>
-            </a:schemeClr>
-          </a:lnRef>
-          <a:fillRef idx="1">
-            <a:schemeClr val="accent1"/>
-          </a:fillRef>
-          <a:effectRef idx="0">
-            <a:schemeClr val="accent1"/>
-          </a:effectRef>
-          <a:fontRef idx="minor">
-            <a:schemeClr val="lt1"/>
-          </a:fontRef>
-        </p:style>
-        <p:txBody>
-          <a:bodyPr rtlCol="0" anchor="t"/>
-          <a:lstStyle/>
-          <a:p>
-            <a:pPr>
-              <a:spcAft>
-                <a:spcPts val="1800"/>
-              </a:spcAft>
-            </a:pPr>
-            <a:r>
-              <a:rPr lang="en-US" b="1" dirty="0" smtClean="0">
-                <a:solidFill>
-                  <a:srgbClr val="34495E"/>
-                </a:solidFill>
-                <a:latin typeface="+mj-lt"/>
-                <a:ea typeface="Open Sans" panose="020B0606030504020204" pitchFamily="34" charset="0"/>
-                <a:cs typeface="Open Sans" panose="020B0606030504020204" pitchFamily="34" charset="0"/>
-              </a:rPr>
-              <a:t>Outline</a:t>
-            </a:r>
-            <a:endParaRPr lang="en-US" b="1" dirty="0">
-              <a:solidFill>
-                <a:srgbClr val="34495E"/>
-              </a:solidFill>
-              <a:latin typeface="+mj-lt"/>
-              <a:ea typeface="Open Sans" panose="020B0606030504020204" pitchFamily="34" charset="0"/>
-              <a:cs typeface="Open Sans" panose="020B0606030504020204" pitchFamily="34" charset="0"/>
-            </a:endParaRPr>
-          </a:p>
-          <a:p>
-            <a:pPr marL="857250" lvl="1" indent="-400050">
-              <a:spcAft>
-                <a:spcPts val="1800"/>
-              </a:spcAft>
-              <a:buFont typeface="+mj-lt"/>
-              <a:buAutoNum type="romanUcPeriod"/>
-            </a:pPr>
-            <a:r>
-              <a:rPr lang="en-US" sz="1600" dirty="0" smtClean="0">
-                <a:solidFill>
-                  <a:srgbClr val="34495E"/>
-                </a:solidFill>
-                <a:ea typeface="Open Sans" panose="020B0606030504020204" pitchFamily="34" charset="0"/>
-                <a:cs typeface="Open Sans" panose="020B0606030504020204" pitchFamily="34" charset="0"/>
-              </a:rPr>
-              <a:t>General introduction</a:t>
-            </a:r>
-          </a:p>
-          <a:p>
-            <a:pPr marL="857250" lvl="1" indent="-400050">
-              <a:spcAft>
-                <a:spcPts val="600"/>
-              </a:spcAft>
-              <a:buFont typeface="+mj-lt"/>
-              <a:buAutoNum type="romanUcPeriod"/>
-            </a:pPr>
-            <a:r>
-              <a:rPr lang="en-US" sz="1600" dirty="0" smtClean="0">
-                <a:solidFill>
-                  <a:srgbClr val="34495E"/>
-                </a:solidFill>
-                <a:ea typeface="Open Sans" panose="020B0606030504020204" pitchFamily="34" charset="0"/>
-                <a:cs typeface="Open Sans" panose="020B0606030504020204" pitchFamily="34" charset="0"/>
-              </a:rPr>
-              <a:t>Mechanisms of dream recall </a:t>
-            </a:r>
-            <a:endParaRPr lang="en-US" sz="1600" dirty="0" smtClean="0">
-              <a:solidFill>
-                <a:srgbClr val="34495E"/>
-              </a:solidFill>
-              <a:ea typeface="Open Sans" panose="020B0606030504020204" pitchFamily="34" charset="0"/>
-              <a:cs typeface="Open Sans" panose="020B0606030504020204" pitchFamily="34" charset="0"/>
-            </a:endParaRPr>
-          </a:p>
-          <a:p>
-            <a:pPr marL="1200150" lvl="2" indent="-285750">
-              <a:spcAft>
-                <a:spcPts val="600"/>
-              </a:spcAft>
-              <a:buFont typeface="Arial" panose="020B0604020202020204" pitchFamily="34" charset="0"/>
-              <a:buChar char="•"/>
-            </a:pPr>
-            <a:r>
-              <a:rPr lang="en-US" sz="1600" dirty="0" smtClean="0">
-                <a:solidFill>
-                  <a:srgbClr val="34495E"/>
-                </a:solidFill>
-                <a:ea typeface="Open Sans" panose="020B0606030504020204" pitchFamily="34" charset="0"/>
-                <a:cs typeface="Open Sans" panose="020B0606030504020204" pitchFamily="34" charset="0"/>
-              </a:rPr>
-              <a:t>Study </a:t>
-            </a:r>
-            <a:r>
-              <a:rPr lang="en-US" sz="1600" dirty="0" smtClean="0">
-                <a:solidFill>
-                  <a:srgbClr val="34495E"/>
-                </a:solidFill>
-                <a:ea typeface="Open Sans" panose="020B0606030504020204" pitchFamily="34" charset="0"/>
-                <a:cs typeface="Open Sans" panose="020B0606030504020204" pitchFamily="34" charset="0"/>
-              </a:rPr>
-              <a:t>1: DRF and arousals	</a:t>
-            </a:r>
-          </a:p>
-          <a:p>
-            <a:pPr marL="1200150" lvl="2" indent="-285750">
-              <a:spcAft>
-                <a:spcPts val="600"/>
-              </a:spcAft>
-              <a:buFont typeface="Arial" panose="020B0604020202020204" pitchFamily="34" charset="0"/>
-              <a:buChar char="•"/>
-            </a:pPr>
-            <a:r>
-              <a:rPr lang="en-US" sz="1600" dirty="0" smtClean="0">
-                <a:solidFill>
-                  <a:srgbClr val="34495E"/>
-                </a:solidFill>
-                <a:ea typeface="Open Sans" panose="020B0606030504020204" pitchFamily="34" charset="0"/>
-                <a:cs typeface="Open Sans" panose="020B0606030504020204" pitchFamily="34" charset="0"/>
-              </a:rPr>
-              <a:t>Study 2: DRF and sleep inertia		</a:t>
-            </a:r>
-            <a:r>
-              <a:rPr lang="en-US" sz="1600" i="1" dirty="0" smtClean="0">
-                <a:solidFill>
-                  <a:srgbClr val="34495E"/>
-                </a:solidFill>
-                <a:latin typeface="HelveticaNeueLT Std Lt" panose="020B0403020202020204" pitchFamily="34" charset="0"/>
-                <a:ea typeface="Open Sans" panose="020B0606030504020204" pitchFamily="34" charset="0"/>
-                <a:cs typeface="Open Sans" panose="020B0606030504020204" pitchFamily="34" charset="0"/>
-              </a:rPr>
-              <a:t>        </a:t>
-            </a:r>
-          </a:p>
-          <a:p>
-            <a:pPr marL="1200150" lvl="2" indent="-285750">
-              <a:spcAft>
-                <a:spcPts val="600"/>
-              </a:spcAft>
-              <a:buFont typeface="Arial" panose="020B0604020202020204" pitchFamily="34" charset="0"/>
-              <a:buChar char="•"/>
-            </a:pPr>
-            <a:r>
-              <a:rPr lang="en-US" sz="1600" dirty="0" smtClean="0">
-                <a:solidFill>
-                  <a:srgbClr val="34495E"/>
-                </a:solidFill>
-                <a:ea typeface="Open Sans" panose="020B0606030504020204" pitchFamily="34" charset="0"/>
-                <a:cs typeface="Open Sans" panose="020B0606030504020204" pitchFamily="34" charset="0"/>
-              </a:rPr>
-              <a:t>Study 3: DRF and the default mode network			</a:t>
-            </a:r>
-          </a:p>
-          <a:p>
-            <a:pPr marL="1200150" lvl="2" indent="-285750">
-              <a:spcAft>
-                <a:spcPts val="600"/>
-              </a:spcAft>
-              <a:buFont typeface="Arial" panose="020B0604020202020204" pitchFamily="34" charset="0"/>
-              <a:buChar char="•"/>
-            </a:pPr>
-            <a:r>
-              <a:rPr lang="en-US" sz="1600" dirty="0" smtClean="0">
-                <a:solidFill>
-                  <a:srgbClr val="34495E"/>
-                </a:solidFill>
-                <a:ea typeface="Open Sans" panose="020B0606030504020204" pitchFamily="34" charset="0"/>
-                <a:cs typeface="Open Sans" panose="020B0606030504020204" pitchFamily="34" charset="0"/>
-              </a:rPr>
-              <a:t>Study 4: DRF in the student population </a:t>
-            </a:r>
-          </a:p>
-          <a:p>
-            <a:pPr marL="1200150" lvl="2" indent="-285750">
-              <a:spcAft>
-                <a:spcPts val="1800"/>
-              </a:spcAft>
-              <a:buFont typeface="Arial" panose="020B0604020202020204" pitchFamily="34" charset="0"/>
-              <a:buChar char="•"/>
-            </a:pPr>
-            <a:r>
-              <a:rPr lang="en-US" sz="1600" dirty="0" smtClean="0">
-                <a:solidFill>
-                  <a:srgbClr val="34495E"/>
-                </a:solidFill>
-                <a:ea typeface="Open Sans" panose="020B0606030504020204" pitchFamily="34" charset="0"/>
-                <a:cs typeface="Open Sans" panose="020B0606030504020204" pitchFamily="34" charset="0"/>
-              </a:rPr>
-              <a:t>Conclusion		</a:t>
-            </a:r>
-          </a:p>
-          <a:p>
-            <a:pPr marL="857250" lvl="1" indent="-400050">
-              <a:spcAft>
-                <a:spcPts val="600"/>
-              </a:spcAft>
-              <a:buFont typeface="+mj-lt"/>
-              <a:buAutoNum type="romanUcPeriod"/>
-            </a:pPr>
-            <a:r>
-              <a:rPr lang="en-US" sz="1600" dirty="0" smtClean="0">
-                <a:solidFill>
-                  <a:srgbClr val="34495E"/>
-                </a:solidFill>
-                <a:ea typeface="Open Sans" panose="020B0606030504020204" pitchFamily="34" charset="0"/>
-                <a:cs typeface="Open Sans" panose="020B0606030504020204" pitchFamily="34" charset="0"/>
-              </a:rPr>
-              <a:t>Dream content and dream function</a:t>
-            </a:r>
-          </a:p>
-          <a:p>
-            <a:pPr marL="1200150" lvl="2" indent="-285750">
-              <a:spcAft>
-                <a:spcPts val="1800"/>
-              </a:spcAft>
-              <a:buFont typeface="Arial" panose="020B0604020202020204" pitchFamily="34" charset="0"/>
-              <a:buChar char="•"/>
-            </a:pPr>
-            <a:r>
-              <a:rPr lang="en-US" sz="1600" dirty="0" smtClean="0">
-                <a:solidFill>
-                  <a:srgbClr val="34495E"/>
-                </a:solidFill>
-                <a:ea typeface="Open Sans" panose="020B0606030504020204" pitchFamily="34" charset="0"/>
-                <a:cs typeface="Open Sans" panose="020B0606030504020204" pitchFamily="34" charset="0"/>
-              </a:rPr>
-              <a:t>Study 5: The link between waking-life and dream content </a:t>
-            </a:r>
-          </a:p>
-          <a:p>
-            <a:pPr marL="857250" lvl="1" indent="-400050">
-              <a:spcAft>
-                <a:spcPts val="600"/>
-              </a:spcAft>
-              <a:buFont typeface="+mj-lt"/>
-              <a:buAutoNum type="romanUcPeriod"/>
-            </a:pPr>
-            <a:r>
-              <a:rPr lang="en-US" sz="1600" dirty="0" smtClean="0">
-                <a:solidFill>
-                  <a:srgbClr val="34495E"/>
-                </a:solidFill>
-                <a:ea typeface="Open Sans" panose="020B0606030504020204" pitchFamily="34" charset="0"/>
-                <a:cs typeface="Open Sans" panose="020B0606030504020204" pitchFamily="34" charset="0"/>
-              </a:rPr>
-              <a:t>Methodological development</a:t>
-            </a:r>
-          </a:p>
-          <a:p>
-            <a:pPr marL="1200150" lvl="2" indent="-285750">
-              <a:spcAft>
-                <a:spcPts val="1800"/>
-              </a:spcAft>
-              <a:buFont typeface="Arial" panose="020B0604020202020204" pitchFamily="34" charset="0"/>
-              <a:buChar char="•"/>
-            </a:pPr>
-            <a:r>
-              <a:rPr lang="en-US" sz="1600" dirty="0" smtClean="0">
-                <a:solidFill>
-                  <a:srgbClr val="34495E"/>
-                </a:solidFill>
-                <a:ea typeface="Open Sans" panose="020B0606030504020204" pitchFamily="34" charset="0"/>
-                <a:cs typeface="Open Sans" panose="020B0606030504020204" pitchFamily="34" charset="0"/>
-              </a:rPr>
-              <a:t>Study 6: An open source software for sleep scoring and analysis</a:t>
-            </a:r>
-          </a:p>
-          <a:p>
-            <a:pPr marL="857250" lvl="1" indent="-400050">
-              <a:spcAft>
-                <a:spcPts val="1800"/>
-              </a:spcAft>
-              <a:buFont typeface="+mj-lt"/>
-              <a:buAutoNum type="romanUcPeriod"/>
-            </a:pPr>
-            <a:r>
-              <a:rPr lang="en-US" sz="1600" dirty="0" smtClean="0">
-                <a:solidFill>
-                  <a:srgbClr val="34495E"/>
-                </a:solidFill>
-                <a:ea typeface="Open Sans" panose="020B0606030504020204" pitchFamily="34" charset="0"/>
-                <a:cs typeface="Open Sans" panose="020B0606030504020204" pitchFamily="34" charset="0"/>
-              </a:rPr>
-              <a:t>General conclusion</a:t>
-            </a:r>
-          </a:p>
-          <a:p>
-            <a:pPr>
-              <a:spcAft>
-                <a:spcPts val="1200"/>
-              </a:spcAft>
-            </a:pPr>
-            <a:endParaRPr lang="en-US" dirty="0">
-              <a:solidFill>
-                <a:schemeClr val="tx2">
-                  <a:lumMod val="50000"/>
-                </a:schemeClr>
-              </a:solidFill>
-              <a:latin typeface="Open Sans" panose="020B0606030504020204" pitchFamily="34" charset="0"/>
-              <a:ea typeface="Open Sans" panose="020B0606030504020204" pitchFamily="34" charset="0"/>
-              <a:cs typeface="Open Sans" panose="020B0606030504020204" pitchFamily="34" charset="0"/>
-            </a:endParaRPr>
-          </a:p>
-        </p:txBody>
-      </p:sp>
-      <p:sp>
-        <p:nvSpPr>
-          <p:cNvPr id="16" name="Rectangle 15"/>
-          <p:cNvSpPr/>
-          <p:nvPr/>
-        </p:nvSpPr>
-        <p:spPr>
-          <a:xfrm>
-            <a:off x="0" y="0"/>
-            <a:ext cx="9144000" cy="259200"/>
-          </a:xfrm>
-          <a:prstGeom prst="rect">
-            <a:avLst/>
-          </a:prstGeom>
-          <a:solidFill>
-            <a:srgbClr val="45607B"/>
-          </a:solidFill>
-          <a:ln>
-            <a:noFill/>
-          </a:ln>
-        </p:spPr>
-        <p:style>
-          <a:lnRef idx="2">
-            <a:schemeClr val="accent1">
-              <a:shade val="50000"/>
-            </a:schemeClr>
-          </a:lnRef>
-          <a:fillRef idx="1">
-            <a:schemeClr val="accent1"/>
-          </a:fillRef>
-          <a:effectRef idx="0">
-            <a:schemeClr val="accent1"/>
-          </a:effectRef>
-          <a:fontRef idx="minor">
-            <a:schemeClr val="lt1"/>
-          </a:fontRef>
-        </p:style>
-        <p:txBody>
-          <a:bodyPr rtlCol="0" anchor="ctr"/>
-          <a:lstStyle/>
-          <a:p>
-            <a:pPr algn="ctr"/>
-            <a:endParaRPr lang="en-US" dirty="0">
-              <a:solidFill>
-                <a:schemeClr val="bg1"/>
-              </a:solidFill>
-              <a:latin typeface="Roboto Light" panose="02000000000000000000" pitchFamily="2" charset="0"/>
-              <a:ea typeface="Roboto Light" panose="02000000000000000000" pitchFamily="2" charset="0"/>
-            </a:endParaRPr>
-          </a:p>
-        </p:txBody>
-      </p:sp>
-      <p:sp>
-        <p:nvSpPr>
-          <p:cNvPr id="17" name="ZoneTexte 16"/>
-          <p:cNvSpPr txBox="1"/>
-          <p:nvPr/>
-        </p:nvSpPr>
-        <p:spPr>
-          <a:xfrm>
-            <a:off x="0" y="259200"/>
-            <a:ext cx="1828800" cy="261610"/>
-          </a:xfrm>
-          <a:prstGeom prst="rect">
-            <a:avLst/>
-          </a:prstGeom>
-          <a:solidFill>
-            <a:srgbClr val="ECF0F1"/>
-          </a:solidFill>
-        </p:spPr>
-        <p:txBody>
-          <a:bodyPr wrap="square" rtlCol="0">
-            <a:spAutoFit/>
-          </a:bodyPr>
-          <a:lstStyle/>
-          <a:p>
-            <a:pPr algn="ctr"/>
-            <a:r>
-              <a:rPr lang="en-US" sz="1100" b="1" i="1" dirty="0" smtClean="0">
-                <a:solidFill>
-                  <a:srgbClr val="34495E"/>
-                </a:solidFill>
-                <a:latin typeface="Roboto Light" panose="02000000000000000000" pitchFamily="2" charset="0"/>
-                <a:ea typeface="Roboto Light" panose="02000000000000000000" pitchFamily="2" charset="0"/>
-              </a:rPr>
-              <a:t>Introduction</a:t>
-            </a:r>
-            <a:endParaRPr lang="en-US" sz="1100" b="1" i="1" dirty="0">
-              <a:solidFill>
-                <a:srgbClr val="34495E"/>
-              </a:solidFill>
-              <a:latin typeface="Roboto Light" panose="02000000000000000000" pitchFamily="2" charset="0"/>
-              <a:ea typeface="Roboto Light" panose="02000000000000000000" pitchFamily="2" charset="0"/>
-            </a:endParaRPr>
-          </a:p>
-        </p:txBody>
-      </p:sp>
-      <p:sp>
-        <p:nvSpPr>
-          <p:cNvPr id="18" name="ZoneTexte 17"/>
-          <p:cNvSpPr txBox="1"/>
-          <p:nvPr/>
-        </p:nvSpPr>
-        <p:spPr>
-          <a:xfrm>
-            <a:off x="1828800" y="258463"/>
-            <a:ext cx="1828800" cy="261610"/>
-          </a:xfrm>
-          <a:prstGeom prst="rect">
-            <a:avLst/>
-          </a:prstGeom>
-          <a:solidFill>
-            <a:srgbClr val="ECF0F1"/>
-          </a:solidFill>
-        </p:spPr>
-        <p:txBody>
-          <a:bodyPr wrap="square" rtlCol="0">
-            <a:spAutoFit/>
-          </a:bodyPr>
-          <a:lstStyle/>
-          <a:p>
-            <a:pPr algn="ctr"/>
-            <a:r>
-              <a:rPr lang="en-US" sz="1100" i="1" dirty="0" smtClean="0">
-                <a:solidFill>
-                  <a:srgbClr val="95A5A6"/>
-                </a:solidFill>
-                <a:latin typeface="Roboto Light" panose="02000000000000000000" pitchFamily="2" charset="0"/>
-                <a:ea typeface="Roboto Light" panose="02000000000000000000" pitchFamily="2" charset="0"/>
-              </a:rPr>
-              <a:t>Dream recall</a:t>
-            </a:r>
-            <a:endParaRPr lang="en-US" sz="1100" i="1" dirty="0">
-              <a:solidFill>
-                <a:srgbClr val="95A5A6"/>
-              </a:solidFill>
-              <a:latin typeface="Roboto Light" panose="02000000000000000000" pitchFamily="2" charset="0"/>
-              <a:ea typeface="Roboto Light" panose="02000000000000000000" pitchFamily="2" charset="0"/>
-            </a:endParaRPr>
-          </a:p>
-        </p:txBody>
-      </p:sp>
-      <p:sp>
-        <p:nvSpPr>
-          <p:cNvPr id="19" name="ZoneTexte 18"/>
-          <p:cNvSpPr txBox="1"/>
-          <p:nvPr/>
-        </p:nvSpPr>
-        <p:spPr>
-          <a:xfrm>
-            <a:off x="3657600" y="258463"/>
-            <a:ext cx="1828800" cy="261610"/>
-          </a:xfrm>
-          <a:prstGeom prst="rect">
-            <a:avLst/>
-          </a:prstGeom>
-          <a:solidFill>
-            <a:srgbClr val="ECF0F1"/>
-          </a:solidFill>
-        </p:spPr>
-        <p:txBody>
-          <a:bodyPr wrap="square" rtlCol="0">
-            <a:spAutoFit/>
-          </a:bodyPr>
-          <a:lstStyle/>
-          <a:p>
-            <a:pPr algn="ctr"/>
-            <a:r>
-              <a:rPr lang="en-US" sz="1100" i="1" dirty="0" smtClean="0">
-                <a:solidFill>
-                  <a:srgbClr val="95A5A6"/>
-                </a:solidFill>
-                <a:latin typeface="Roboto Light" panose="02000000000000000000" pitchFamily="2" charset="0"/>
-                <a:ea typeface="Roboto Light" panose="02000000000000000000" pitchFamily="2" charset="0"/>
-              </a:rPr>
-              <a:t>Dream content</a:t>
-            </a:r>
-            <a:endParaRPr lang="en-US" sz="1100" i="1" dirty="0">
-              <a:solidFill>
-                <a:srgbClr val="95A5A6"/>
-              </a:solidFill>
-              <a:latin typeface="Roboto Light" panose="02000000000000000000" pitchFamily="2" charset="0"/>
-              <a:ea typeface="Roboto Light" panose="02000000000000000000" pitchFamily="2" charset="0"/>
-            </a:endParaRPr>
-          </a:p>
-        </p:txBody>
-      </p:sp>
-      <p:sp>
-        <p:nvSpPr>
-          <p:cNvPr id="20" name="ZoneTexte 19"/>
-          <p:cNvSpPr txBox="1"/>
-          <p:nvPr/>
-        </p:nvSpPr>
-        <p:spPr>
-          <a:xfrm>
-            <a:off x="5486400" y="258463"/>
-            <a:ext cx="1828800" cy="261610"/>
-          </a:xfrm>
-          <a:prstGeom prst="rect">
-            <a:avLst/>
-          </a:prstGeom>
-          <a:solidFill>
-            <a:srgbClr val="ECF0F1"/>
-          </a:solidFill>
-        </p:spPr>
-        <p:txBody>
-          <a:bodyPr wrap="square" rtlCol="0">
-            <a:spAutoFit/>
-          </a:bodyPr>
-          <a:lstStyle/>
-          <a:p>
-            <a:pPr algn="ctr"/>
-            <a:r>
-              <a:rPr lang="en-US" sz="1100" i="1" dirty="0" smtClean="0">
-                <a:solidFill>
-                  <a:srgbClr val="95A5A6"/>
-                </a:solidFill>
-                <a:latin typeface="Roboto Light" panose="02000000000000000000" pitchFamily="2" charset="0"/>
-                <a:ea typeface="Roboto Light" panose="02000000000000000000" pitchFamily="2" charset="0"/>
-              </a:rPr>
-              <a:t>Software</a:t>
-            </a:r>
-            <a:endParaRPr lang="en-US" sz="1100" i="1" dirty="0">
-              <a:solidFill>
-                <a:srgbClr val="95A5A6"/>
-              </a:solidFill>
-              <a:latin typeface="Roboto Light" panose="02000000000000000000" pitchFamily="2" charset="0"/>
-              <a:ea typeface="Roboto Light" panose="02000000000000000000" pitchFamily="2" charset="0"/>
-            </a:endParaRPr>
-          </a:p>
-        </p:txBody>
-      </p:sp>
-      <p:sp>
-        <p:nvSpPr>
-          <p:cNvPr id="21" name="ZoneTexte 20"/>
-          <p:cNvSpPr txBox="1"/>
-          <p:nvPr/>
-        </p:nvSpPr>
-        <p:spPr>
-          <a:xfrm>
-            <a:off x="7315200" y="258463"/>
-            <a:ext cx="1828800" cy="261610"/>
-          </a:xfrm>
-          <a:prstGeom prst="rect">
-            <a:avLst/>
-          </a:prstGeom>
-          <a:solidFill>
-            <a:srgbClr val="ECF0F1"/>
-          </a:solidFill>
-        </p:spPr>
-        <p:txBody>
-          <a:bodyPr wrap="square" rtlCol="0">
-            <a:spAutoFit/>
-          </a:bodyPr>
-          <a:lstStyle/>
-          <a:p>
-            <a:pPr algn="ctr"/>
-            <a:r>
-              <a:rPr lang="en-US" sz="1100" i="1" dirty="0" smtClean="0">
-                <a:solidFill>
-                  <a:srgbClr val="95A5A6"/>
-                </a:solidFill>
-                <a:latin typeface="Roboto Light" panose="02000000000000000000" pitchFamily="2" charset="0"/>
-                <a:ea typeface="Roboto Light" panose="02000000000000000000" pitchFamily="2" charset="0"/>
-              </a:rPr>
-              <a:t>Conclusion</a:t>
-            </a:r>
-            <a:endParaRPr lang="en-US" sz="1100" i="1" dirty="0">
-              <a:solidFill>
-                <a:srgbClr val="95A5A6"/>
-              </a:solidFill>
-              <a:latin typeface="Roboto Light" panose="02000000000000000000" pitchFamily="2" charset="0"/>
-              <a:ea typeface="Roboto Light" panose="02000000000000000000" pitchFamily="2" charset="0"/>
-            </a:endParaRPr>
-          </a:p>
-        </p:txBody>
-      </p:sp>
-      <p:sp>
-        <p:nvSpPr>
-          <p:cNvPr id="22" name="Espace réservé du numéro de diapositive 3"/>
-          <p:cNvSpPr>
-            <a:spLocks noGrp="1"/>
-          </p:cNvSpPr>
-          <p:nvPr>
-            <p:ph type="sldNum" sz="quarter" idx="12"/>
-          </p:nvPr>
-        </p:nvSpPr>
-        <p:spPr>
-          <a:xfrm>
-            <a:off x="8532813" y="6420123"/>
-            <a:ext cx="611187" cy="365125"/>
-          </a:xfrm>
-        </p:spPr>
-        <p:txBody>
-          <a:bodyPr/>
-          <a:lstStyle/>
-          <a:p>
-            <a:pPr algn="ctr"/>
-            <a:r>
-              <a:rPr lang="en-US" sz="1100" dirty="0" smtClean="0">
-                <a:solidFill>
-                  <a:srgbClr val="7F8C8D"/>
-                </a:solidFill>
-              </a:rPr>
-              <a:t>3</a:t>
-            </a:r>
-            <a:endParaRPr lang="en-US" sz="1100" dirty="0">
-              <a:solidFill>
-                <a:srgbClr val="7F8C8D"/>
-              </a:solidFill>
-            </a:endParaRPr>
-          </a:p>
-        </p:txBody>
-      </p:sp>
-      <p:cxnSp>
-        <p:nvCxnSpPr>
-          <p:cNvPr id="23" name="Connecteur droit 22"/>
-          <p:cNvCxnSpPr/>
-          <p:nvPr/>
-        </p:nvCxnSpPr>
-        <p:spPr>
-          <a:xfrm flipH="1" flipV="1">
-            <a:off x="8521927" y="6318000"/>
-            <a:ext cx="0" cy="540000"/>
-          </a:xfrm>
-          <a:prstGeom prst="line">
-            <a:avLst/>
-          </a:prstGeom>
-          <a:ln w="28575">
-            <a:solidFill>
-              <a:srgbClr val="7F8C8D"/>
-            </a:solidFill>
-          </a:ln>
-        </p:spPr>
-        <p:style>
-          <a:lnRef idx="1">
-            <a:schemeClr val="dk1"/>
-          </a:lnRef>
-          <a:fillRef idx="0">
-            <a:schemeClr val="dk1"/>
-          </a:fillRef>
-          <a:effectRef idx="0">
-            <a:schemeClr val="dk1"/>
-          </a:effectRef>
-          <a:fontRef idx="minor">
-            <a:schemeClr val="tx1"/>
-          </a:fontRef>
-        </p:style>
-      </p:cxnSp>
-      <p:sp>
-        <p:nvSpPr>
-          <p:cNvPr id="24" name="ZoneTexte 23"/>
-          <p:cNvSpPr txBox="1"/>
-          <p:nvPr/>
-        </p:nvSpPr>
-        <p:spPr>
-          <a:xfrm>
-            <a:off x="4572000" y="6471881"/>
-            <a:ext cx="3893227" cy="261610"/>
-          </a:xfrm>
-          <a:prstGeom prst="rect">
-            <a:avLst/>
-          </a:prstGeom>
-          <a:noFill/>
-        </p:spPr>
-        <p:txBody>
-          <a:bodyPr wrap="square" rtlCol="0">
-            <a:spAutoFit/>
-          </a:bodyPr>
-          <a:lstStyle/>
-          <a:p>
-            <a:pPr algn="r"/>
-            <a:r>
-              <a:rPr lang="en-US" sz="1100" dirty="0" smtClean="0">
-                <a:solidFill>
-                  <a:srgbClr val="7F8C8D"/>
-                </a:solidFill>
-                <a:latin typeface="Roboto Medium" panose="02000000000000000000" pitchFamily="2" charset="0"/>
-                <a:ea typeface="Roboto Medium" panose="02000000000000000000" pitchFamily="2" charset="0"/>
-              </a:rPr>
-              <a:t>Outline</a:t>
-            </a:r>
-            <a:endParaRPr lang="en-US" sz="1100" dirty="0">
-              <a:solidFill>
-                <a:srgbClr val="7F8C8D"/>
-              </a:solidFill>
-              <a:latin typeface="Roboto" pitchFamily="2" charset="0"/>
-              <a:ea typeface="Roboto" pitchFamily="2" charset="0"/>
-            </a:endParaRPr>
-          </a:p>
-        </p:txBody>
-      </p:sp>
-      <p:sp>
-        <p:nvSpPr>
-          <p:cNvPr id="25" name="ZoneTexte 24"/>
-          <p:cNvSpPr txBox="1"/>
-          <p:nvPr/>
-        </p:nvSpPr>
-        <p:spPr>
-          <a:xfrm>
-            <a:off x="284615" y="6471880"/>
-            <a:ext cx="3893227" cy="261610"/>
-          </a:xfrm>
-          <a:prstGeom prst="rect">
-            <a:avLst/>
-          </a:prstGeom>
-          <a:noFill/>
-        </p:spPr>
-        <p:txBody>
-          <a:bodyPr wrap="square" rtlCol="0">
-            <a:spAutoFit/>
-          </a:bodyPr>
-          <a:lstStyle/>
-          <a:p>
-            <a:r>
-              <a:rPr lang="en-US" sz="1100" dirty="0" smtClean="0">
-                <a:solidFill>
-                  <a:srgbClr val="7F8C8D"/>
-                </a:solidFill>
-                <a:latin typeface="Roboto Light" panose="02000000000000000000" pitchFamily="2" charset="0"/>
-                <a:ea typeface="Roboto Light" panose="02000000000000000000" pitchFamily="2" charset="0"/>
-              </a:rPr>
-              <a:t>R. Vallat – Ph.D. Oral Defense – December 8</a:t>
-            </a:r>
-            <a:r>
-              <a:rPr lang="en-US" sz="1100" baseline="30000" dirty="0" smtClean="0">
-                <a:solidFill>
-                  <a:srgbClr val="7F8C8D"/>
-                </a:solidFill>
-                <a:latin typeface="Roboto Light" panose="02000000000000000000" pitchFamily="2" charset="0"/>
-                <a:ea typeface="Roboto Light" panose="02000000000000000000" pitchFamily="2" charset="0"/>
-              </a:rPr>
-              <a:t>th</a:t>
-            </a:r>
-            <a:r>
-              <a:rPr lang="en-US" sz="1100" dirty="0" smtClean="0">
-                <a:solidFill>
-                  <a:srgbClr val="7F8C8D"/>
-                </a:solidFill>
-                <a:latin typeface="Roboto Light" panose="02000000000000000000" pitchFamily="2" charset="0"/>
-                <a:ea typeface="Roboto Light" panose="02000000000000000000" pitchFamily="2" charset="0"/>
-              </a:rPr>
-              <a:t> 2017</a:t>
-            </a:r>
-            <a:endParaRPr lang="en-US" sz="1100" dirty="0">
-              <a:solidFill>
-                <a:srgbClr val="7F8C8D"/>
-              </a:solidFill>
-              <a:latin typeface="Roboto Light" panose="02000000000000000000" pitchFamily="2" charset="0"/>
-              <a:ea typeface="Roboto Light" panose="02000000000000000000" pitchFamily="2" charset="0"/>
-            </a:endParaRPr>
-          </a:p>
-        </p:txBody>
-      </p:sp>
-    </p:spTree>
-    <p:extLst>
-      <p:ext uri="{BB962C8B-B14F-4D97-AF65-F5344CB8AC3E}">
-        <p14:creationId xmlns:p14="http://schemas.microsoft.com/office/powerpoint/2010/main" val="944712357"/>
       </p:ext>
     </p:extLst>
   </p:cSld>
@@ -13655,6 +14139,819 @@
           <a:bodyPr rtlCol="0" anchor="t"/>
           <a:lstStyle/>
           <a:p>
+            <a:pPr>
+              <a:spcAft>
+                <a:spcPts val="1800"/>
+              </a:spcAft>
+            </a:pPr>
+            <a:r>
+              <a:rPr lang="en-US" b="1" dirty="0" smtClean="0">
+                <a:solidFill>
+                  <a:srgbClr val="34495E"/>
+                </a:solidFill>
+                <a:latin typeface="+mj-lt"/>
+                <a:ea typeface="Open Sans" panose="020B0606030504020204" pitchFamily="34" charset="0"/>
+                <a:cs typeface="Open Sans" panose="020B0606030504020204" pitchFamily="34" charset="0"/>
+              </a:rPr>
+              <a:t>Outline</a:t>
+            </a:r>
+            <a:endParaRPr lang="en-US" b="1" dirty="0">
+              <a:solidFill>
+                <a:srgbClr val="34495E"/>
+              </a:solidFill>
+              <a:latin typeface="+mj-lt"/>
+              <a:ea typeface="Open Sans" panose="020B0606030504020204" pitchFamily="34" charset="0"/>
+              <a:cs typeface="Open Sans" panose="020B0606030504020204" pitchFamily="34" charset="0"/>
+            </a:endParaRPr>
+          </a:p>
+          <a:p>
+            <a:pPr marL="857250" lvl="1" indent="-400050">
+              <a:spcAft>
+                <a:spcPts val="1800"/>
+              </a:spcAft>
+              <a:buFont typeface="+mj-lt"/>
+              <a:buAutoNum type="romanUcPeriod"/>
+            </a:pPr>
+            <a:r>
+              <a:rPr lang="en-US" sz="1600" dirty="0" smtClean="0">
+                <a:solidFill>
+                  <a:srgbClr val="34495E"/>
+                </a:solidFill>
+                <a:ea typeface="Open Sans" panose="020B0606030504020204" pitchFamily="34" charset="0"/>
+                <a:cs typeface="Open Sans" panose="020B0606030504020204" pitchFamily="34" charset="0"/>
+              </a:rPr>
+              <a:t>General introduction</a:t>
+            </a:r>
+          </a:p>
+          <a:p>
+            <a:pPr marL="857250" lvl="1" indent="-400050">
+              <a:spcAft>
+                <a:spcPts val="600"/>
+              </a:spcAft>
+              <a:buFont typeface="+mj-lt"/>
+              <a:buAutoNum type="romanUcPeriod"/>
+            </a:pPr>
+            <a:r>
+              <a:rPr lang="en-US" sz="1600" dirty="0" smtClean="0">
+                <a:solidFill>
+                  <a:srgbClr val="34495E"/>
+                </a:solidFill>
+                <a:ea typeface="Open Sans" panose="020B0606030504020204" pitchFamily="34" charset="0"/>
+                <a:cs typeface="Open Sans" panose="020B0606030504020204" pitchFamily="34" charset="0"/>
+              </a:rPr>
+              <a:t>Mechanisms of dream recall </a:t>
+            </a:r>
+          </a:p>
+          <a:p>
+            <a:pPr marL="1200150" lvl="2" indent="-285750">
+              <a:spcAft>
+                <a:spcPts val="600"/>
+              </a:spcAft>
+              <a:buFont typeface="Arial" panose="020B0604020202020204" pitchFamily="34" charset="0"/>
+              <a:buChar char="•"/>
+            </a:pPr>
+            <a:r>
+              <a:rPr lang="en-US" sz="1600" dirty="0" smtClean="0">
+                <a:solidFill>
+                  <a:srgbClr val="34495E"/>
+                </a:solidFill>
+                <a:ea typeface="Open Sans" panose="020B0606030504020204" pitchFamily="34" charset="0"/>
+                <a:cs typeface="Open Sans" panose="020B0606030504020204" pitchFamily="34" charset="0"/>
+              </a:rPr>
+              <a:t>Study 1: DRF and arousals	</a:t>
+            </a:r>
+          </a:p>
+          <a:p>
+            <a:pPr marL="1200150" lvl="2" indent="-285750">
+              <a:spcAft>
+                <a:spcPts val="600"/>
+              </a:spcAft>
+              <a:buFont typeface="Arial" panose="020B0604020202020204" pitchFamily="34" charset="0"/>
+              <a:buChar char="•"/>
+            </a:pPr>
+            <a:r>
+              <a:rPr lang="en-US" sz="1600" dirty="0" smtClean="0">
+                <a:solidFill>
+                  <a:srgbClr val="34495E"/>
+                </a:solidFill>
+                <a:ea typeface="Open Sans" panose="020B0606030504020204" pitchFamily="34" charset="0"/>
+                <a:cs typeface="Open Sans" panose="020B0606030504020204" pitchFamily="34" charset="0"/>
+              </a:rPr>
+              <a:t>Study 2: DRF and sleep inertia		</a:t>
+            </a:r>
+            <a:r>
+              <a:rPr lang="en-US" sz="1600" i="1" dirty="0" smtClean="0">
+                <a:solidFill>
+                  <a:srgbClr val="34495E"/>
+                </a:solidFill>
+                <a:latin typeface="HelveticaNeueLT Std Lt" panose="020B0403020202020204" pitchFamily="34" charset="0"/>
+                <a:ea typeface="Open Sans" panose="020B0606030504020204" pitchFamily="34" charset="0"/>
+                <a:cs typeface="Open Sans" panose="020B0606030504020204" pitchFamily="34" charset="0"/>
+              </a:rPr>
+              <a:t>        </a:t>
+            </a:r>
+          </a:p>
+          <a:p>
+            <a:pPr marL="1200150" lvl="2" indent="-285750">
+              <a:spcAft>
+                <a:spcPts val="600"/>
+              </a:spcAft>
+              <a:buFont typeface="Arial" panose="020B0604020202020204" pitchFamily="34" charset="0"/>
+              <a:buChar char="•"/>
+            </a:pPr>
+            <a:r>
+              <a:rPr lang="en-US" sz="1600" dirty="0" smtClean="0">
+                <a:solidFill>
+                  <a:srgbClr val="34495E"/>
+                </a:solidFill>
+                <a:ea typeface="Open Sans" panose="020B0606030504020204" pitchFamily="34" charset="0"/>
+                <a:cs typeface="Open Sans" panose="020B0606030504020204" pitchFamily="34" charset="0"/>
+              </a:rPr>
+              <a:t>Study 3: DRF and the default mode network			</a:t>
+            </a:r>
+          </a:p>
+          <a:p>
+            <a:pPr marL="1200150" lvl="2" indent="-285750">
+              <a:spcAft>
+                <a:spcPts val="600"/>
+              </a:spcAft>
+              <a:buFont typeface="Arial" panose="020B0604020202020204" pitchFamily="34" charset="0"/>
+              <a:buChar char="•"/>
+            </a:pPr>
+            <a:r>
+              <a:rPr lang="en-US" sz="1600" dirty="0" smtClean="0">
+                <a:solidFill>
+                  <a:srgbClr val="34495E"/>
+                </a:solidFill>
+                <a:ea typeface="Open Sans" panose="020B0606030504020204" pitchFamily="34" charset="0"/>
+                <a:cs typeface="Open Sans" panose="020B0606030504020204" pitchFamily="34" charset="0"/>
+              </a:rPr>
+              <a:t>Study 4: DRF in the student population </a:t>
+            </a:r>
+          </a:p>
+          <a:p>
+            <a:pPr marL="1200150" lvl="2" indent="-285750">
+              <a:spcAft>
+                <a:spcPts val="1800"/>
+              </a:spcAft>
+              <a:buFont typeface="Arial" panose="020B0604020202020204" pitchFamily="34" charset="0"/>
+              <a:buChar char="•"/>
+            </a:pPr>
+            <a:r>
+              <a:rPr lang="en-US" sz="1600" dirty="0" smtClean="0">
+                <a:solidFill>
+                  <a:srgbClr val="34495E"/>
+                </a:solidFill>
+                <a:ea typeface="Open Sans" panose="020B0606030504020204" pitchFamily="34" charset="0"/>
+                <a:cs typeface="Open Sans" panose="020B0606030504020204" pitchFamily="34" charset="0"/>
+              </a:rPr>
+              <a:t>Conclusion		</a:t>
+            </a:r>
+          </a:p>
+          <a:p>
+            <a:pPr marL="857250" lvl="1" indent="-400050">
+              <a:spcAft>
+                <a:spcPts val="600"/>
+              </a:spcAft>
+              <a:buFont typeface="+mj-lt"/>
+              <a:buAutoNum type="romanUcPeriod"/>
+            </a:pPr>
+            <a:r>
+              <a:rPr lang="en-US" sz="1600" dirty="0" smtClean="0">
+                <a:solidFill>
+                  <a:srgbClr val="34495E"/>
+                </a:solidFill>
+                <a:ea typeface="Open Sans" panose="020B0606030504020204" pitchFamily="34" charset="0"/>
+                <a:cs typeface="Open Sans" panose="020B0606030504020204" pitchFamily="34" charset="0"/>
+              </a:rPr>
+              <a:t>Dream content and dream function</a:t>
+            </a:r>
+          </a:p>
+          <a:p>
+            <a:pPr marL="1200150" lvl="2" indent="-285750">
+              <a:spcAft>
+                <a:spcPts val="1800"/>
+              </a:spcAft>
+              <a:buFont typeface="Arial" panose="020B0604020202020204" pitchFamily="34" charset="0"/>
+              <a:buChar char="•"/>
+            </a:pPr>
+            <a:r>
+              <a:rPr lang="en-US" sz="1600" dirty="0" smtClean="0">
+                <a:solidFill>
+                  <a:srgbClr val="34495E"/>
+                </a:solidFill>
+                <a:ea typeface="Open Sans" panose="020B0606030504020204" pitchFamily="34" charset="0"/>
+                <a:cs typeface="Open Sans" panose="020B0606030504020204" pitchFamily="34" charset="0"/>
+              </a:rPr>
+              <a:t>Study 5: The link between waking-life and dream content </a:t>
+            </a:r>
+          </a:p>
+          <a:p>
+            <a:pPr marL="857250" lvl="1" indent="-400050">
+              <a:spcAft>
+                <a:spcPts val="600"/>
+              </a:spcAft>
+              <a:buFont typeface="+mj-lt"/>
+              <a:buAutoNum type="romanUcPeriod"/>
+            </a:pPr>
+            <a:r>
+              <a:rPr lang="en-US" sz="1600" dirty="0" smtClean="0">
+                <a:solidFill>
+                  <a:srgbClr val="34495E"/>
+                </a:solidFill>
+                <a:ea typeface="Open Sans" panose="020B0606030504020204" pitchFamily="34" charset="0"/>
+                <a:cs typeface="Open Sans" panose="020B0606030504020204" pitchFamily="34" charset="0"/>
+              </a:rPr>
+              <a:t>Methodological development</a:t>
+            </a:r>
+          </a:p>
+          <a:p>
+            <a:pPr marL="1200150" lvl="2" indent="-285750">
+              <a:spcAft>
+                <a:spcPts val="1800"/>
+              </a:spcAft>
+              <a:buFont typeface="Arial" panose="020B0604020202020204" pitchFamily="34" charset="0"/>
+              <a:buChar char="•"/>
+            </a:pPr>
+            <a:r>
+              <a:rPr lang="en-US" sz="1600" dirty="0" smtClean="0">
+                <a:solidFill>
+                  <a:srgbClr val="34495E"/>
+                </a:solidFill>
+                <a:ea typeface="Open Sans" panose="020B0606030504020204" pitchFamily="34" charset="0"/>
+                <a:cs typeface="Open Sans" panose="020B0606030504020204" pitchFamily="34" charset="0"/>
+              </a:rPr>
+              <a:t>Study 6: An open source software for sleep scoring and analysis</a:t>
+            </a:r>
+          </a:p>
+          <a:p>
+            <a:pPr marL="857250" lvl="1" indent="-400050">
+              <a:spcAft>
+                <a:spcPts val="1800"/>
+              </a:spcAft>
+              <a:buFont typeface="+mj-lt"/>
+              <a:buAutoNum type="romanUcPeriod"/>
+            </a:pPr>
+            <a:r>
+              <a:rPr lang="en-US" sz="1600" dirty="0" smtClean="0">
+                <a:solidFill>
+                  <a:srgbClr val="34495E"/>
+                </a:solidFill>
+                <a:ea typeface="Open Sans" panose="020B0606030504020204" pitchFamily="34" charset="0"/>
+                <a:cs typeface="Open Sans" panose="020B0606030504020204" pitchFamily="34" charset="0"/>
+              </a:rPr>
+              <a:t>General conclusion</a:t>
+            </a:r>
+          </a:p>
+          <a:p>
+            <a:pPr>
+              <a:spcAft>
+                <a:spcPts val="1200"/>
+              </a:spcAft>
+            </a:pPr>
+            <a:endParaRPr lang="en-US" dirty="0">
+              <a:solidFill>
+                <a:schemeClr val="tx2">
+                  <a:lumMod val="50000"/>
+                </a:schemeClr>
+              </a:solidFill>
+              <a:latin typeface="Open Sans" panose="020B0606030504020204" pitchFamily="34" charset="0"/>
+              <a:ea typeface="Open Sans" panose="020B0606030504020204" pitchFamily="34" charset="0"/>
+              <a:cs typeface="Open Sans" panose="020B0606030504020204" pitchFamily="34" charset="0"/>
+            </a:endParaRPr>
+          </a:p>
+        </p:txBody>
+      </p:sp>
+      <p:sp>
+        <p:nvSpPr>
+          <p:cNvPr id="16" name="Rectangle 15"/>
+          <p:cNvSpPr/>
+          <p:nvPr/>
+        </p:nvSpPr>
+        <p:spPr>
+          <a:xfrm>
+            <a:off x="0" y="0"/>
+            <a:ext cx="9144000" cy="259200"/>
+          </a:xfrm>
+          <a:prstGeom prst="rect">
+            <a:avLst/>
+          </a:prstGeom>
+          <a:solidFill>
+            <a:srgbClr val="45607B"/>
+          </a:solidFill>
+          <a:ln>
+            <a:noFill/>
+          </a:ln>
+        </p:spPr>
+        <p:style>
+          <a:lnRef idx="2">
+            <a:schemeClr val="accent1">
+              <a:shade val="50000"/>
+            </a:schemeClr>
+          </a:lnRef>
+          <a:fillRef idx="1">
+            <a:schemeClr val="accent1"/>
+          </a:fillRef>
+          <a:effectRef idx="0">
+            <a:schemeClr val="accent1"/>
+          </a:effectRef>
+          <a:fontRef idx="minor">
+            <a:schemeClr val="lt1"/>
+          </a:fontRef>
+        </p:style>
+        <p:txBody>
+          <a:bodyPr rtlCol="0" anchor="ctr"/>
+          <a:lstStyle/>
+          <a:p>
+            <a:pPr algn="ctr"/>
+            <a:endParaRPr lang="en-US" dirty="0">
+              <a:solidFill>
+                <a:schemeClr val="bg1"/>
+              </a:solidFill>
+              <a:latin typeface="Roboto Light" panose="02000000000000000000" pitchFamily="2" charset="0"/>
+              <a:ea typeface="Roboto Light" panose="02000000000000000000" pitchFamily="2" charset="0"/>
+            </a:endParaRPr>
+          </a:p>
+        </p:txBody>
+      </p:sp>
+      <p:sp>
+        <p:nvSpPr>
+          <p:cNvPr id="17" name="ZoneTexte 16"/>
+          <p:cNvSpPr txBox="1"/>
+          <p:nvPr/>
+        </p:nvSpPr>
+        <p:spPr>
+          <a:xfrm>
+            <a:off x="0" y="259200"/>
+            <a:ext cx="1828800" cy="261610"/>
+          </a:xfrm>
+          <a:prstGeom prst="rect">
+            <a:avLst/>
+          </a:prstGeom>
+          <a:solidFill>
+            <a:srgbClr val="ECF0F1"/>
+          </a:solidFill>
+        </p:spPr>
+        <p:txBody>
+          <a:bodyPr wrap="square" rtlCol="0">
+            <a:spAutoFit/>
+          </a:bodyPr>
+          <a:lstStyle/>
+          <a:p>
+            <a:pPr algn="ctr"/>
+            <a:r>
+              <a:rPr lang="en-US" sz="1100" b="1" i="1" dirty="0" smtClean="0">
+                <a:solidFill>
+                  <a:srgbClr val="34495E"/>
+                </a:solidFill>
+                <a:latin typeface="Roboto Light" panose="02000000000000000000" pitchFamily="2" charset="0"/>
+                <a:ea typeface="Roboto Light" panose="02000000000000000000" pitchFamily="2" charset="0"/>
+              </a:rPr>
+              <a:t>Introduction</a:t>
+            </a:r>
+            <a:endParaRPr lang="en-US" sz="1100" b="1" i="1" dirty="0">
+              <a:solidFill>
+                <a:srgbClr val="34495E"/>
+              </a:solidFill>
+              <a:latin typeface="Roboto Light" panose="02000000000000000000" pitchFamily="2" charset="0"/>
+              <a:ea typeface="Roboto Light" panose="02000000000000000000" pitchFamily="2" charset="0"/>
+            </a:endParaRPr>
+          </a:p>
+        </p:txBody>
+      </p:sp>
+      <p:sp>
+        <p:nvSpPr>
+          <p:cNvPr id="18" name="ZoneTexte 17"/>
+          <p:cNvSpPr txBox="1"/>
+          <p:nvPr/>
+        </p:nvSpPr>
+        <p:spPr>
+          <a:xfrm>
+            <a:off x="1828800" y="258463"/>
+            <a:ext cx="1828800" cy="261610"/>
+          </a:xfrm>
+          <a:prstGeom prst="rect">
+            <a:avLst/>
+          </a:prstGeom>
+          <a:solidFill>
+            <a:srgbClr val="ECF0F1"/>
+          </a:solidFill>
+        </p:spPr>
+        <p:txBody>
+          <a:bodyPr wrap="square" rtlCol="0">
+            <a:spAutoFit/>
+          </a:bodyPr>
+          <a:lstStyle/>
+          <a:p>
+            <a:pPr algn="ctr"/>
+            <a:r>
+              <a:rPr lang="en-US" sz="1100" i="1" dirty="0" smtClean="0">
+                <a:solidFill>
+                  <a:srgbClr val="95A5A6"/>
+                </a:solidFill>
+                <a:latin typeface="Roboto Light" panose="02000000000000000000" pitchFamily="2" charset="0"/>
+                <a:ea typeface="Roboto Light" panose="02000000000000000000" pitchFamily="2" charset="0"/>
+              </a:rPr>
+              <a:t>Dream recall</a:t>
+            </a:r>
+            <a:endParaRPr lang="en-US" sz="1100" i="1" dirty="0">
+              <a:solidFill>
+                <a:srgbClr val="95A5A6"/>
+              </a:solidFill>
+              <a:latin typeface="Roboto Light" panose="02000000000000000000" pitchFamily="2" charset="0"/>
+              <a:ea typeface="Roboto Light" panose="02000000000000000000" pitchFamily="2" charset="0"/>
+            </a:endParaRPr>
+          </a:p>
+        </p:txBody>
+      </p:sp>
+      <p:sp>
+        <p:nvSpPr>
+          <p:cNvPr id="19" name="ZoneTexte 18"/>
+          <p:cNvSpPr txBox="1"/>
+          <p:nvPr/>
+        </p:nvSpPr>
+        <p:spPr>
+          <a:xfrm>
+            <a:off x="3657600" y="258463"/>
+            <a:ext cx="1828800" cy="261610"/>
+          </a:xfrm>
+          <a:prstGeom prst="rect">
+            <a:avLst/>
+          </a:prstGeom>
+          <a:solidFill>
+            <a:srgbClr val="ECF0F1"/>
+          </a:solidFill>
+        </p:spPr>
+        <p:txBody>
+          <a:bodyPr wrap="square" rtlCol="0">
+            <a:spAutoFit/>
+          </a:bodyPr>
+          <a:lstStyle/>
+          <a:p>
+            <a:pPr algn="ctr"/>
+            <a:r>
+              <a:rPr lang="en-US" sz="1100" i="1" dirty="0" smtClean="0">
+                <a:solidFill>
+                  <a:srgbClr val="95A5A6"/>
+                </a:solidFill>
+                <a:latin typeface="Roboto Light" panose="02000000000000000000" pitchFamily="2" charset="0"/>
+                <a:ea typeface="Roboto Light" panose="02000000000000000000" pitchFamily="2" charset="0"/>
+              </a:rPr>
+              <a:t>Dream content</a:t>
+            </a:r>
+            <a:endParaRPr lang="en-US" sz="1100" i="1" dirty="0">
+              <a:solidFill>
+                <a:srgbClr val="95A5A6"/>
+              </a:solidFill>
+              <a:latin typeface="Roboto Light" panose="02000000000000000000" pitchFamily="2" charset="0"/>
+              <a:ea typeface="Roboto Light" panose="02000000000000000000" pitchFamily="2" charset="0"/>
+            </a:endParaRPr>
+          </a:p>
+        </p:txBody>
+      </p:sp>
+      <p:sp>
+        <p:nvSpPr>
+          <p:cNvPr id="20" name="ZoneTexte 19"/>
+          <p:cNvSpPr txBox="1"/>
+          <p:nvPr/>
+        </p:nvSpPr>
+        <p:spPr>
+          <a:xfrm>
+            <a:off x="5486400" y="258463"/>
+            <a:ext cx="1828800" cy="261610"/>
+          </a:xfrm>
+          <a:prstGeom prst="rect">
+            <a:avLst/>
+          </a:prstGeom>
+          <a:solidFill>
+            <a:srgbClr val="ECF0F1"/>
+          </a:solidFill>
+        </p:spPr>
+        <p:txBody>
+          <a:bodyPr wrap="square" rtlCol="0">
+            <a:spAutoFit/>
+          </a:bodyPr>
+          <a:lstStyle/>
+          <a:p>
+            <a:pPr algn="ctr"/>
+            <a:r>
+              <a:rPr lang="en-US" sz="1100" i="1" dirty="0" smtClean="0">
+                <a:solidFill>
+                  <a:srgbClr val="95A5A6"/>
+                </a:solidFill>
+                <a:latin typeface="Roboto Light" panose="02000000000000000000" pitchFamily="2" charset="0"/>
+                <a:ea typeface="Roboto Light" panose="02000000000000000000" pitchFamily="2" charset="0"/>
+              </a:rPr>
+              <a:t>Software</a:t>
+            </a:r>
+            <a:endParaRPr lang="en-US" sz="1100" i="1" dirty="0">
+              <a:solidFill>
+                <a:srgbClr val="95A5A6"/>
+              </a:solidFill>
+              <a:latin typeface="Roboto Light" panose="02000000000000000000" pitchFamily="2" charset="0"/>
+              <a:ea typeface="Roboto Light" panose="02000000000000000000" pitchFamily="2" charset="0"/>
+            </a:endParaRPr>
+          </a:p>
+        </p:txBody>
+      </p:sp>
+      <p:sp>
+        <p:nvSpPr>
+          <p:cNvPr id="21" name="ZoneTexte 20"/>
+          <p:cNvSpPr txBox="1"/>
+          <p:nvPr/>
+        </p:nvSpPr>
+        <p:spPr>
+          <a:xfrm>
+            <a:off x="7315200" y="258463"/>
+            <a:ext cx="1828800" cy="261610"/>
+          </a:xfrm>
+          <a:prstGeom prst="rect">
+            <a:avLst/>
+          </a:prstGeom>
+          <a:solidFill>
+            <a:srgbClr val="ECF0F1"/>
+          </a:solidFill>
+        </p:spPr>
+        <p:txBody>
+          <a:bodyPr wrap="square" rtlCol="0">
+            <a:spAutoFit/>
+          </a:bodyPr>
+          <a:lstStyle/>
+          <a:p>
+            <a:pPr algn="ctr"/>
+            <a:r>
+              <a:rPr lang="en-US" sz="1100" i="1" dirty="0" smtClean="0">
+                <a:solidFill>
+                  <a:srgbClr val="95A5A6"/>
+                </a:solidFill>
+                <a:latin typeface="Roboto Light" panose="02000000000000000000" pitchFamily="2" charset="0"/>
+                <a:ea typeface="Roboto Light" panose="02000000000000000000" pitchFamily="2" charset="0"/>
+              </a:rPr>
+              <a:t>Conclusion</a:t>
+            </a:r>
+            <a:endParaRPr lang="en-US" sz="1100" i="1" dirty="0">
+              <a:solidFill>
+                <a:srgbClr val="95A5A6"/>
+              </a:solidFill>
+              <a:latin typeface="Roboto Light" panose="02000000000000000000" pitchFamily="2" charset="0"/>
+              <a:ea typeface="Roboto Light" panose="02000000000000000000" pitchFamily="2" charset="0"/>
+            </a:endParaRPr>
+          </a:p>
+        </p:txBody>
+      </p:sp>
+      <p:sp>
+        <p:nvSpPr>
+          <p:cNvPr id="22" name="Espace réservé du numéro de diapositive 3"/>
+          <p:cNvSpPr>
+            <a:spLocks noGrp="1"/>
+          </p:cNvSpPr>
+          <p:nvPr>
+            <p:ph type="sldNum" sz="quarter" idx="12"/>
+          </p:nvPr>
+        </p:nvSpPr>
+        <p:spPr>
+          <a:xfrm>
+            <a:off x="8532813" y="6420123"/>
+            <a:ext cx="611187" cy="365125"/>
+          </a:xfrm>
+        </p:spPr>
+        <p:txBody>
+          <a:bodyPr/>
+          <a:lstStyle/>
+          <a:p>
+            <a:pPr algn="ctr"/>
+            <a:r>
+              <a:rPr lang="en-US" sz="1100" dirty="0" smtClean="0">
+                <a:solidFill>
+                  <a:srgbClr val="7F8C8D"/>
+                </a:solidFill>
+              </a:rPr>
+              <a:t>3</a:t>
+            </a:r>
+            <a:endParaRPr lang="en-US" sz="1100" dirty="0">
+              <a:solidFill>
+                <a:srgbClr val="7F8C8D"/>
+              </a:solidFill>
+            </a:endParaRPr>
+          </a:p>
+        </p:txBody>
+      </p:sp>
+      <p:cxnSp>
+        <p:nvCxnSpPr>
+          <p:cNvPr id="23" name="Connecteur droit 22"/>
+          <p:cNvCxnSpPr/>
+          <p:nvPr/>
+        </p:nvCxnSpPr>
+        <p:spPr>
+          <a:xfrm flipH="1" flipV="1">
+            <a:off x="8521927" y="6318000"/>
+            <a:ext cx="0" cy="540000"/>
+          </a:xfrm>
+          <a:prstGeom prst="line">
+            <a:avLst/>
+          </a:prstGeom>
+          <a:ln w="28575">
+            <a:solidFill>
+              <a:srgbClr val="7F8C8D"/>
+            </a:solidFill>
+          </a:ln>
+        </p:spPr>
+        <p:style>
+          <a:lnRef idx="1">
+            <a:schemeClr val="dk1"/>
+          </a:lnRef>
+          <a:fillRef idx="0">
+            <a:schemeClr val="dk1"/>
+          </a:fillRef>
+          <a:effectRef idx="0">
+            <a:schemeClr val="dk1"/>
+          </a:effectRef>
+          <a:fontRef idx="minor">
+            <a:schemeClr val="tx1"/>
+          </a:fontRef>
+        </p:style>
+      </p:cxnSp>
+      <p:sp>
+        <p:nvSpPr>
+          <p:cNvPr id="24" name="ZoneTexte 23"/>
+          <p:cNvSpPr txBox="1"/>
+          <p:nvPr/>
+        </p:nvSpPr>
+        <p:spPr>
+          <a:xfrm>
+            <a:off x="4572000" y="6471881"/>
+            <a:ext cx="3893227" cy="261610"/>
+          </a:xfrm>
+          <a:prstGeom prst="rect">
+            <a:avLst/>
+          </a:prstGeom>
+          <a:noFill/>
+        </p:spPr>
+        <p:txBody>
+          <a:bodyPr wrap="square" rtlCol="0">
+            <a:spAutoFit/>
+          </a:bodyPr>
+          <a:lstStyle/>
+          <a:p>
+            <a:pPr algn="r"/>
+            <a:r>
+              <a:rPr lang="en-US" sz="1100" dirty="0" smtClean="0">
+                <a:solidFill>
+                  <a:srgbClr val="7F8C8D"/>
+                </a:solidFill>
+                <a:latin typeface="Roboto Medium" panose="02000000000000000000" pitchFamily="2" charset="0"/>
+                <a:ea typeface="Roboto Medium" panose="02000000000000000000" pitchFamily="2" charset="0"/>
+              </a:rPr>
+              <a:t>Outline</a:t>
+            </a:r>
+            <a:endParaRPr lang="en-US" sz="1100" dirty="0">
+              <a:solidFill>
+                <a:srgbClr val="7F8C8D"/>
+              </a:solidFill>
+              <a:latin typeface="Roboto" pitchFamily="2" charset="0"/>
+              <a:ea typeface="Roboto" pitchFamily="2" charset="0"/>
+            </a:endParaRPr>
+          </a:p>
+        </p:txBody>
+      </p:sp>
+      <p:sp>
+        <p:nvSpPr>
+          <p:cNvPr id="25" name="ZoneTexte 24"/>
+          <p:cNvSpPr txBox="1"/>
+          <p:nvPr/>
+        </p:nvSpPr>
+        <p:spPr>
+          <a:xfrm>
+            <a:off x="284615" y="6471880"/>
+            <a:ext cx="3893227" cy="261610"/>
+          </a:xfrm>
+          <a:prstGeom prst="rect">
+            <a:avLst/>
+          </a:prstGeom>
+          <a:noFill/>
+        </p:spPr>
+        <p:txBody>
+          <a:bodyPr wrap="square" rtlCol="0">
+            <a:spAutoFit/>
+          </a:bodyPr>
+          <a:lstStyle/>
+          <a:p>
+            <a:r>
+              <a:rPr lang="en-US" sz="1100" dirty="0" smtClean="0">
+                <a:solidFill>
+                  <a:srgbClr val="7F8C8D"/>
+                </a:solidFill>
+                <a:latin typeface="Roboto Light" panose="02000000000000000000" pitchFamily="2" charset="0"/>
+                <a:ea typeface="Roboto Light" panose="02000000000000000000" pitchFamily="2" charset="0"/>
+              </a:rPr>
+              <a:t>R. Vallat – Ph.D. Oral Defense – December 8</a:t>
+            </a:r>
+            <a:r>
+              <a:rPr lang="en-US" sz="1100" baseline="30000" dirty="0" smtClean="0">
+                <a:solidFill>
+                  <a:srgbClr val="7F8C8D"/>
+                </a:solidFill>
+                <a:latin typeface="Roboto Light" panose="02000000000000000000" pitchFamily="2" charset="0"/>
+                <a:ea typeface="Roboto Light" panose="02000000000000000000" pitchFamily="2" charset="0"/>
+              </a:rPr>
+              <a:t>th</a:t>
+            </a:r>
+            <a:r>
+              <a:rPr lang="en-US" sz="1100" dirty="0" smtClean="0">
+                <a:solidFill>
+                  <a:srgbClr val="7F8C8D"/>
+                </a:solidFill>
+                <a:latin typeface="Roboto Light" panose="02000000000000000000" pitchFamily="2" charset="0"/>
+                <a:ea typeface="Roboto Light" panose="02000000000000000000" pitchFamily="2" charset="0"/>
+              </a:rPr>
+              <a:t> 2017</a:t>
+            </a:r>
+            <a:endParaRPr lang="en-US" sz="1100" dirty="0">
+              <a:solidFill>
+                <a:srgbClr val="7F8C8D"/>
+              </a:solidFill>
+              <a:latin typeface="Roboto Light" panose="02000000000000000000" pitchFamily="2" charset="0"/>
+              <a:ea typeface="Roboto Light" panose="02000000000000000000" pitchFamily="2" charset="0"/>
+            </a:endParaRPr>
+          </a:p>
+        </p:txBody>
+      </p:sp>
+    </p:spTree>
+    <p:extLst>
+      <p:ext uri="{BB962C8B-B14F-4D97-AF65-F5344CB8AC3E}">
+        <p14:creationId xmlns:p14="http://schemas.microsoft.com/office/powerpoint/2010/main" val="944712357"/>
+      </p:ext>
+    </p:extLst>
+  </p:cSld>
+  <p:clrMapOvr>
+    <a:masterClrMapping/>
+  </p:clrMapOvr>
+  <p:timing>
+    <p:tnLst>
+      <p:par>
+        <p:cTn id="1" dur="indefinite" restart="never" nodeType="tmRoot"/>
+      </p:par>
+    </p:tnLst>
+  </p:timing>
+</p:sld>
+</file>
+
+<file path=ppt/slides/slide9.xml><?xml version="1.0" encoding="utf-8"?>
+<p:sld xmlns:a="http://schemas.openxmlformats.org/drawingml/2006/main" xmlns:r="http://schemas.openxmlformats.org/officeDocument/2006/relationships" xmlns:p="http://schemas.openxmlformats.org/presentationml/2006/main">
+  <p:cSld>
+    <p:spTree>
+      <p:nvGrpSpPr>
+        <p:cNvPr id="1" name=""/>
+        <p:cNvGrpSpPr/>
+        <p:nvPr/>
+      </p:nvGrpSpPr>
+      <p:grpSpPr>
+        <a:xfrm>
+          <a:off x="0" y="0"/>
+          <a:ext cx="0" cy="0"/>
+          <a:chOff x="0" y="0"/>
+          <a:chExt cx="0" cy="0"/>
+        </a:xfrm>
+      </p:grpSpPr>
+      <p:sp>
+        <p:nvSpPr>
+          <p:cNvPr id="13" name="Rectangle 12"/>
+          <p:cNvSpPr/>
+          <p:nvPr/>
+        </p:nvSpPr>
+        <p:spPr>
+          <a:xfrm>
+            <a:off x="611188" y="800100"/>
+            <a:ext cx="7921625" cy="5508625"/>
+          </a:xfrm>
+          <a:prstGeom prst="rect">
+            <a:avLst/>
+          </a:prstGeom>
+          <a:noFill/>
+          <a:ln>
+            <a:noFill/>
+          </a:ln>
+        </p:spPr>
+        <p:style>
+          <a:lnRef idx="2">
+            <a:schemeClr val="accent1">
+              <a:shade val="50000"/>
+            </a:schemeClr>
+          </a:lnRef>
+          <a:fillRef idx="1">
+            <a:schemeClr val="accent1"/>
+          </a:fillRef>
+          <a:effectRef idx="0">
+            <a:schemeClr val="accent1"/>
+          </a:effectRef>
+          <a:fontRef idx="minor">
+            <a:schemeClr val="lt1"/>
+          </a:fontRef>
+        </p:style>
+        <p:txBody>
+          <a:bodyPr rtlCol="0" anchor="t"/>
+          <a:lstStyle/>
+          <a:p>
             <a:pPr algn="just">
               <a:spcAft>
                 <a:spcPts val="1200"/>
@@ -13814,7 +15111,7 @@
                 </a:solidFill>
               </a:rPr>
               <a:pPr algn="ctr"/>
-              <a:t>8</a:t>
+              <a:t>9</a:t>
             </a:fld>
             <a:endParaRPr lang="en-US" sz="1100" dirty="0">
               <a:solidFill>
@@ -14506,829 +15803,6 @@
     <p:extLst>
       <p:ext uri="{BB962C8B-B14F-4D97-AF65-F5344CB8AC3E}">
         <p14:creationId xmlns:p14="http://schemas.microsoft.com/office/powerpoint/2010/main" val="3325135344"/>
-      </p:ext>
-    </p:extLst>
-  </p:cSld>
-  <p:clrMapOvr>
-    <a:masterClrMapping/>
-  </p:clrMapOvr>
-  <p:timing>
-    <p:tnLst>
-      <p:par>
-        <p:cTn id="1" dur="indefinite" restart="never" nodeType="tmRoot"/>
-      </p:par>
-    </p:tnLst>
-  </p:timing>
-</p:sld>
-</file>
-
-<file path=ppt/slides/slide9.xml><?xml version="1.0" encoding="utf-8"?>
-<p:sld xmlns:a="http://schemas.openxmlformats.org/drawingml/2006/main" xmlns:r="http://schemas.openxmlformats.org/officeDocument/2006/relationships" xmlns:p="http://schemas.openxmlformats.org/presentationml/2006/main">
-  <p:cSld>
-    <p:spTree>
-      <p:nvGrpSpPr>
-        <p:cNvPr id="1" name=""/>
-        <p:cNvGrpSpPr/>
-        <p:nvPr/>
-      </p:nvGrpSpPr>
-      <p:grpSpPr>
-        <a:xfrm>
-          <a:off x="0" y="0"/>
-          <a:ext cx="0" cy="0"/>
-          <a:chOff x="0" y="0"/>
-          <a:chExt cx="0" cy="0"/>
-        </a:xfrm>
-      </p:grpSpPr>
-      <p:sp>
-        <p:nvSpPr>
-          <p:cNvPr id="13" name="Rectangle 12"/>
-          <p:cNvSpPr/>
-          <p:nvPr/>
-        </p:nvSpPr>
-        <p:spPr>
-          <a:xfrm>
-            <a:off x="611188" y="800100"/>
-            <a:ext cx="7921625" cy="5508625"/>
-          </a:xfrm>
-          <a:prstGeom prst="rect">
-            <a:avLst/>
-          </a:prstGeom>
-          <a:noFill/>
-          <a:ln>
-            <a:noFill/>
-          </a:ln>
-        </p:spPr>
-        <p:style>
-          <a:lnRef idx="2">
-            <a:schemeClr val="accent1">
-              <a:shade val="50000"/>
-            </a:schemeClr>
-          </a:lnRef>
-          <a:fillRef idx="1">
-            <a:schemeClr val="accent1"/>
-          </a:fillRef>
-          <a:effectRef idx="0">
-            <a:schemeClr val="accent1"/>
-          </a:effectRef>
-          <a:fontRef idx="minor">
-            <a:schemeClr val="lt1"/>
-          </a:fontRef>
-        </p:style>
-        <p:txBody>
-          <a:bodyPr rtlCol="0" anchor="t"/>
-          <a:lstStyle/>
-          <a:p>
-            <a:pPr>
-              <a:spcAft>
-                <a:spcPts val="1800"/>
-              </a:spcAft>
-            </a:pPr>
-            <a:r>
-              <a:rPr lang="en-US" b="1" dirty="0" smtClean="0">
-                <a:solidFill>
-                  <a:srgbClr val="34495E"/>
-                </a:solidFill>
-                <a:latin typeface="+mj-lt"/>
-                <a:ea typeface="Open Sans" panose="020B0606030504020204" pitchFamily="34" charset="0"/>
-                <a:cs typeface="Open Sans" panose="020B0606030504020204" pitchFamily="34" charset="0"/>
-              </a:rPr>
-              <a:t>Outline</a:t>
-            </a:r>
-            <a:endParaRPr lang="en-US" b="1" dirty="0">
-              <a:solidFill>
-                <a:srgbClr val="34495E"/>
-              </a:solidFill>
-              <a:latin typeface="+mj-lt"/>
-              <a:ea typeface="Open Sans" panose="020B0606030504020204" pitchFamily="34" charset="0"/>
-              <a:cs typeface="Open Sans" panose="020B0606030504020204" pitchFamily="34" charset="0"/>
-            </a:endParaRPr>
-          </a:p>
-          <a:p>
-            <a:pPr marL="857250" lvl="1" indent="-400050">
-              <a:spcAft>
-                <a:spcPts val="1800"/>
-              </a:spcAft>
-              <a:buFont typeface="+mj-lt"/>
-              <a:buAutoNum type="romanUcPeriod"/>
-            </a:pPr>
-            <a:r>
-              <a:rPr lang="en-US" sz="1600" dirty="0" smtClean="0">
-                <a:solidFill>
-                  <a:srgbClr val="95A5A6"/>
-                </a:solidFill>
-                <a:ea typeface="Open Sans" panose="020B0606030504020204" pitchFamily="34" charset="0"/>
-                <a:cs typeface="Open Sans" panose="020B0606030504020204" pitchFamily="34" charset="0"/>
-              </a:rPr>
-              <a:t>General introduction</a:t>
-            </a:r>
-          </a:p>
-          <a:p>
-            <a:pPr marL="857250" lvl="1" indent="-400050">
-              <a:spcAft>
-                <a:spcPts val="600"/>
-              </a:spcAft>
-              <a:buFont typeface="+mj-lt"/>
-              <a:buAutoNum type="romanUcPeriod"/>
-            </a:pPr>
-            <a:r>
-              <a:rPr lang="en-US" sz="1600" b="1" dirty="0" smtClean="0">
-                <a:solidFill>
-                  <a:srgbClr val="34495E"/>
-                </a:solidFill>
-                <a:ea typeface="Open Sans" panose="020B0606030504020204" pitchFamily="34" charset="0"/>
-                <a:cs typeface="Open Sans" panose="020B0606030504020204" pitchFamily="34" charset="0"/>
-              </a:rPr>
-              <a:t>Mechanisms of dream recall frequency (DRF)</a:t>
-            </a:r>
-          </a:p>
-          <a:p>
-            <a:pPr marL="1200150" lvl="2" indent="-285750">
-              <a:spcAft>
-                <a:spcPts val="600"/>
-              </a:spcAft>
-              <a:buFont typeface="Arial" panose="020B0604020202020204" pitchFamily="34" charset="0"/>
-              <a:buChar char="•"/>
-            </a:pPr>
-            <a:r>
-              <a:rPr lang="en-US" sz="1600" dirty="0" smtClean="0">
-                <a:solidFill>
-                  <a:srgbClr val="95A5A6"/>
-                </a:solidFill>
-                <a:ea typeface="Open Sans" panose="020B0606030504020204" pitchFamily="34" charset="0"/>
-                <a:cs typeface="Open Sans" panose="020B0606030504020204" pitchFamily="34" charset="0"/>
-              </a:rPr>
-              <a:t>Study 1: DRF and arousals	</a:t>
-            </a:r>
-          </a:p>
-          <a:p>
-            <a:pPr marL="1200150" lvl="2" indent="-285750">
-              <a:spcAft>
-                <a:spcPts val="600"/>
-              </a:spcAft>
-              <a:buFont typeface="Arial" panose="020B0604020202020204" pitchFamily="34" charset="0"/>
-              <a:buChar char="•"/>
-            </a:pPr>
-            <a:r>
-              <a:rPr lang="en-US" sz="1600" b="1" dirty="0" smtClean="0">
-                <a:solidFill>
-                  <a:srgbClr val="34495E"/>
-                </a:solidFill>
-                <a:ea typeface="Open Sans" panose="020B0606030504020204" pitchFamily="34" charset="0"/>
-                <a:cs typeface="Open Sans" panose="020B0606030504020204" pitchFamily="34" charset="0"/>
-              </a:rPr>
-              <a:t>Study 2: DRF and sleep inertia</a:t>
-            </a:r>
-            <a:r>
-              <a:rPr lang="en-US" sz="1600" dirty="0" smtClean="0">
-                <a:solidFill>
-                  <a:srgbClr val="34495E"/>
-                </a:solidFill>
-                <a:ea typeface="Open Sans" panose="020B0606030504020204" pitchFamily="34" charset="0"/>
-                <a:cs typeface="Open Sans" panose="020B0606030504020204" pitchFamily="34" charset="0"/>
-              </a:rPr>
-              <a:t>		</a:t>
-            </a:r>
-            <a:r>
-              <a:rPr lang="en-US" sz="1600" i="1" dirty="0" smtClean="0">
-                <a:solidFill>
-                  <a:srgbClr val="34495E"/>
-                </a:solidFill>
-                <a:latin typeface="HelveticaNeueLT Std Lt" panose="020B0403020202020204" pitchFamily="34" charset="0"/>
-                <a:ea typeface="Open Sans" panose="020B0606030504020204" pitchFamily="34" charset="0"/>
-                <a:cs typeface="Open Sans" panose="020B0606030504020204" pitchFamily="34" charset="0"/>
-              </a:rPr>
-              <a:t>        </a:t>
-            </a:r>
-          </a:p>
-          <a:p>
-            <a:pPr marL="1200150" lvl="2" indent="-285750">
-              <a:spcAft>
-                <a:spcPts val="600"/>
-              </a:spcAft>
-              <a:buFont typeface="Arial" panose="020B0604020202020204" pitchFamily="34" charset="0"/>
-              <a:buChar char="•"/>
-            </a:pPr>
-            <a:r>
-              <a:rPr lang="en-US" sz="1600" dirty="0" smtClean="0">
-                <a:solidFill>
-                  <a:srgbClr val="95A5A6"/>
-                </a:solidFill>
-                <a:ea typeface="Open Sans" panose="020B0606030504020204" pitchFamily="34" charset="0"/>
-                <a:cs typeface="Open Sans" panose="020B0606030504020204" pitchFamily="34" charset="0"/>
-              </a:rPr>
-              <a:t>Study 3: DRF and the default mode network			</a:t>
-            </a:r>
-          </a:p>
-          <a:p>
-            <a:pPr marL="1200150" lvl="2" indent="-285750">
-              <a:spcAft>
-                <a:spcPts val="600"/>
-              </a:spcAft>
-              <a:buFont typeface="Arial" panose="020B0604020202020204" pitchFamily="34" charset="0"/>
-              <a:buChar char="•"/>
-            </a:pPr>
-            <a:r>
-              <a:rPr lang="en-US" sz="1600" dirty="0" smtClean="0">
-                <a:solidFill>
-                  <a:srgbClr val="95A5A6"/>
-                </a:solidFill>
-                <a:ea typeface="Open Sans" panose="020B0606030504020204" pitchFamily="34" charset="0"/>
-                <a:cs typeface="Open Sans" panose="020B0606030504020204" pitchFamily="34" charset="0"/>
-              </a:rPr>
-              <a:t>Study 4: DRF in the student population </a:t>
-            </a:r>
-          </a:p>
-          <a:p>
-            <a:pPr marL="1200150" lvl="2" indent="-285750">
-              <a:spcAft>
-                <a:spcPts val="1800"/>
-              </a:spcAft>
-              <a:buFont typeface="Arial" panose="020B0604020202020204" pitchFamily="34" charset="0"/>
-              <a:buChar char="•"/>
-            </a:pPr>
-            <a:r>
-              <a:rPr lang="en-US" sz="1600" dirty="0" smtClean="0">
-                <a:solidFill>
-                  <a:srgbClr val="95A5A6"/>
-                </a:solidFill>
-                <a:ea typeface="Open Sans" panose="020B0606030504020204" pitchFamily="34" charset="0"/>
-                <a:cs typeface="Open Sans" panose="020B0606030504020204" pitchFamily="34" charset="0"/>
-              </a:rPr>
-              <a:t>Conclusion		</a:t>
-            </a:r>
-          </a:p>
-          <a:p>
-            <a:pPr marL="857250" lvl="1" indent="-400050">
-              <a:spcAft>
-                <a:spcPts val="600"/>
-              </a:spcAft>
-              <a:buFont typeface="+mj-lt"/>
-              <a:buAutoNum type="romanUcPeriod"/>
-            </a:pPr>
-            <a:r>
-              <a:rPr lang="en-US" sz="1600" dirty="0" smtClean="0">
-                <a:solidFill>
-                  <a:srgbClr val="95A5A6"/>
-                </a:solidFill>
-                <a:ea typeface="Open Sans" panose="020B0606030504020204" pitchFamily="34" charset="0"/>
-                <a:cs typeface="Open Sans" panose="020B0606030504020204" pitchFamily="34" charset="0"/>
-              </a:rPr>
-              <a:t>Dream content and dream function</a:t>
-            </a:r>
-          </a:p>
-          <a:p>
-            <a:pPr marL="1200150" lvl="2" indent="-285750">
-              <a:spcAft>
-                <a:spcPts val="1800"/>
-              </a:spcAft>
-              <a:buFont typeface="Arial" panose="020B0604020202020204" pitchFamily="34" charset="0"/>
-              <a:buChar char="•"/>
-            </a:pPr>
-            <a:r>
-              <a:rPr lang="en-US" sz="1600" dirty="0" smtClean="0">
-                <a:solidFill>
-                  <a:srgbClr val="95A5A6"/>
-                </a:solidFill>
-                <a:ea typeface="Open Sans" panose="020B0606030504020204" pitchFamily="34" charset="0"/>
-                <a:cs typeface="Open Sans" panose="020B0606030504020204" pitchFamily="34" charset="0"/>
-              </a:rPr>
-              <a:t>Study 5: The link between waking-life and dream content </a:t>
-            </a:r>
-          </a:p>
-          <a:p>
-            <a:pPr marL="857250" lvl="1" indent="-400050">
-              <a:spcAft>
-                <a:spcPts val="600"/>
-              </a:spcAft>
-              <a:buFont typeface="+mj-lt"/>
-              <a:buAutoNum type="romanUcPeriod"/>
-            </a:pPr>
-            <a:r>
-              <a:rPr lang="en-US" sz="1600" dirty="0" smtClean="0">
-                <a:solidFill>
-                  <a:srgbClr val="95A5A6"/>
-                </a:solidFill>
-                <a:ea typeface="Open Sans" panose="020B0606030504020204" pitchFamily="34" charset="0"/>
-                <a:cs typeface="Open Sans" panose="020B0606030504020204" pitchFamily="34" charset="0"/>
-              </a:rPr>
-              <a:t>Methodological development</a:t>
-            </a:r>
-          </a:p>
-          <a:p>
-            <a:pPr marL="1200150" lvl="2" indent="-285750">
-              <a:spcAft>
-                <a:spcPts val="1800"/>
-              </a:spcAft>
-              <a:buFont typeface="Arial" panose="020B0604020202020204" pitchFamily="34" charset="0"/>
-              <a:buChar char="•"/>
-            </a:pPr>
-            <a:r>
-              <a:rPr lang="en-US" sz="1600" dirty="0" smtClean="0">
-                <a:solidFill>
-                  <a:srgbClr val="95A5A6"/>
-                </a:solidFill>
-                <a:ea typeface="Open Sans" panose="020B0606030504020204" pitchFamily="34" charset="0"/>
-                <a:cs typeface="Open Sans" panose="020B0606030504020204" pitchFamily="34" charset="0"/>
-              </a:rPr>
-              <a:t>Study 6: An open source software for sleep scoring and analysis</a:t>
-            </a:r>
-          </a:p>
-          <a:p>
-            <a:pPr marL="857250" lvl="1" indent="-400050">
-              <a:spcAft>
-                <a:spcPts val="1800"/>
-              </a:spcAft>
-              <a:buFont typeface="+mj-lt"/>
-              <a:buAutoNum type="romanUcPeriod"/>
-            </a:pPr>
-            <a:r>
-              <a:rPr lang="en-US" sz="1600" dirty="0" smtClean="0">
-                <a:solidFill>
-                  <a:srgbClr val="95A5A6"/>
-                </a:solidFill>
-                <a:ea typeface="Open Sans" panose="020B0606030504020204" pitchFamily="34" charset="0"/>
-                <a:cs typeface="Open Sans" panose="020B0606030504020204" pitchFamily="34" charset="0"/>
-              </a:rPr>
-              <a:t>General conclusion</a:t>
-            </a:r>
-          </a:p>
-          <a:p>
-            <a:pPr>
-              <a:spcAft>
-                <a:spcPts val="1200"/>
-              </a:spcAft>
-            </a:pPr>
-            <a:endParaRPr lang="en-US" dirty="0">
-              <a:solidFill>
-                <a:schemeClr val="tx2">
-                  <a:lumMod val="50000"/>
-                </a:schemeClr>
-              </a:solidFill>
-              <a:latin typeface="Open Sans" panose="020B0606030504020204" pitchFamily="34" charset="0"/>
-              <a:ea typeface="Open Sans" panose="020B0606030504020204" pitchFamily="34" charset="0"/>
-              <a:cs typeface="Open Sans" panose="020B0606030504020204" pitchFamily="34" charset="0"/>
-            </a:endParaRPr>
-          </a:p>
-        </p:txBody>
-      </p:sp>
-      <p:sp>
-        <p:nvSpPr>
-          <p:cNvPr id="16" name="Rectangle 15"/>
-          <p:cNvSpPr/>
-          <p:nvPr/>
-        </p:nvSpPr>
-        <p:spPr>
-          <a:xfrm>
-            <a:off x="0" y="0"/>
-            <a:ext cx="9144000" cy="259200"/>
-          </a:xfrm>
-          <a:prstGeom prst="rect">
-            <a:avLst/>
-          </a:prstGeom>
-          <a:solidFill>
-            <a:srgbClr val="45607B"/>
-          </a:solidFill>
-          <a:ln>
-            <a:noFill/>
-          </a:ln>
-        </p:spPr>
-        <p:style>
-          <a:lnRef idx="2">
-            <a:schemeClr val="accent1">
-              <a:shade val="50000"/>
-            </a:schemeClr>
-          </a:lnRef>
-          <a:fillRef idx="1">
-            <a:schemeClr val="accent1"/>
-          </a:fillRef>
-          <a:effectRef idx="0">
-            <a:schemeClr val="accent1"/>
-          </a:effectRef>
-          <a:fontRef idx="minor">
-            <a:schemeClr val="lt1"/>
-          </a:fontRef>
-        </p:style>
-        <p:txBody>
-          <a:bodyPr rtlCol="0" anchor="ctr"/>
-          <a:lstStyle/>
-          <a:p>
-            <a:pPr algn="ctr"/>
-            <a:endParaRPr lang="en-US" dirty="0">
-              <a:solidFill>
-                <a:schemeClr val="bg1"/>
-              </a:solidFill>
-              <a:latin typeface="Roboto Light" panose="02000000000000000000" pitchFamily="2" charset="0"/>
-              <a:ea typeface="Roboto Light" panose="02000000000000000000" pitchFamily="2" charset="0"/>
-            </a:endParaRPr>
-          </a:p>
-        </p:txBody>
-      </p:sp>
-      <p:sp>
-        <p:nvSpPr>
-          <p:cNvPr id="17" name="ZoneTexte 16"/>
-          <p:cNvSpPr txBox="1"/>
-          <p:nvPr/>
-        </p:nvSpPr>
-        <p:spPr>
-          <a:xfrm>
-            <a:off x="0" y="259200"/>
-            <a:ext cx="1828800" cy="261610"/>
-          </a:xfrm>
-          <a:prstGeom prst="rect">
-            <a:avLst/>
-          </a:prstGeom>
-          <a:solidFill>
-            <a:srgbClr val="ECF0F1"/>
-          </a:solidFill>
-        </p:spPr>
-        <p:txBody>
-          <a:bodyPr wrap="square" rtlCol="0">
-            <a:spAutoFit/>
-          </a:bodyPr>
-          <a:lstStyle/>
-          <a:p>
-            <a:pPr algn="ctr"/>
-            <a:r>
-              <a:rPr lang="en-US" sz="1100" b="1" i="1" dirty="0" smtClean="0">
-                <a:solidFill>
-                  <a:srgbClr val="34495E"/>
-                </a:solidFill>
-                <a:latin typeface="Roboto Light" panose="02000000000000000000" pitchFamily="2" charset="0"/>
-                <a:ea typeface="Roboto Light" panose="02000000000000000000" pitchFamily="2" charset="0"/>
-              </a:rPr>
-              <a:t>Introduction</a:t>
-            </a:r>
-            <a:endParaRPr lang="en-US" sz="1100" b="1" i="1" dirty="0">
-              <a:solidFill>
-                <a:srgbClr val="34495E"/>
-              </a:solidFill>
-              <a:latin typeface="Roboto Light" panose="02000000000000000000" pitchFamily="2" charset="0"/>
-              <a:ea typeface="Roboto Light" panose="02000000000000000000" pitchFamily="2" charset="0"/>
-            </a:endParaRPr>
-          </a:p>
-        </p:txBody>
-      </p:sp>
-      <p:sp>
-        <p:nvSpPr>
-          <p:cNvPr id="18" name="ZoneTexte 17"/>
-          <p:cNvSpPr txBox="1"/>
-          <p:nvPr/>
-        </p:nvSpPr>
-        <p:spPr>
-          <a:xfrm>
-            <a:off x="1828800" y="258463"/>
-            <a:ext cx="1828800" cy="261610"/>
-          </a:xfrm>
-          <a:prstGeom prst="rect">
-            <a:avLst/>
-          </a:prstGeom>
-          <a:solidFill>
-            <a:srgbClr val="ECF0F1"/>
-          </a:solidFill>
-        </p:spPr>
-        <p:txBody>
-          <a:bodyPr wrap="square" rtlCol="0">
-            <a:spAutoFit/>
-          </a:bodyPr>
-          <a:lstStyle/>
-          <a:p>
-            <a:pPr algn="ctr"/>
-            <a:r>
-              <a:rPr lang="en-US" sz="1100" i="1" dirty="0" smtClean="0">
-                <a:solidFill>
-                  <a:srgbClr val="95A5A6"/>
-                </a:solidFill>
-                <a:latin typeface="Roboto Light" panose="02000000000000000000" pitchFamily="2" charset="0"/>
-                <a:ea typeface="Roboto Light" panose="02000000000000000000" pitchFamily="2" charset="0"/>
-              </a:rPr>
-              <a:t>Dream recall</a:t>
-            </a:r>
-            <a:endParaRPr lang="en-US" sz="1100" i="1" dirty="0">
-              <a:solidFill>
-                <a:srgbClr val="95A5A6"/>
-              </a:solidFill>
-              <a:latin typeface="Roboto Light" panose="02000000000000000000" pitchFamily="2" charset="0"/>
-              <a:ea typeface="Roboto Light" panose="02000000000000000000" pitchFamily="2" charset="0"/>
-            </a:endParaRPr>
-          </a:p>
-        </p:txBody>
-      </p:sp>
-      <p:sp>
-        <p:nvSpPr>
-          <p:cNvPr id="19" name="ZoneTexte 18"/>
-          <p:cNvSpPr txBox="1"/>
-          <p:nvPr/>
-        </p:nvSpPr>
-        <p:spPr>
-          <a:xfrm>
-            <a:off x="3657600" y="258463"/>
-            <a:ext cx="1828800" cy="261610"/>
-          </a:xfrm>
-          <a:prstGeom prst="rect">
-            <a:avLst/>
-          </a:prstGeom>
-          <a:solidFill>
-            <a:srgbClr val="ECF0F1"/>
-          </a:solidFill>
-        </p:spPr>
-        <p:txBody>
-          <a:bodyPr wrap="square" rtlCol="0">
-            <a:spAutoFit/>
-          </a:bodyPr>
-          <a:lstStyle/>
-          <a:p>
-            <a:pPr algn="ctr"/>
-            <a:r>
-              <a:rPr lang="en-US" sz="1100" i="1" dirty="0" smtClean="0">
-                <a:solidFill>
-                  <a:srgbClr val="95A5A6"/>
-                </a:solidFill>
-                <a:latin typeface="Roboto Light" panose="02000000000000000000" pitchFamily="2" charset="0"/>
-                <a:ea typeface="Roboto Light" panose="02000000000000000000" pitchFamily="2" charset="0"/>
-              </a:rPr>
-              <a:t>Dream content</a:t>
-            </a:r>
-            <a:endParaRPr lang="en-US" sz="1100" i="1" dirty="0">
-              <a:solidFill>
-                <a:srgbClr val="95A5A6"/>
-              </a:solidFill>
-              <a:latin typeface="Roboto Light" panose="02000000000000000000" pitchFamily="2" charset="0"/>
-              <a:ea typeface="Roboto Light" panose="02000000000000000000" pitchFamily="2" charset="0"/>
-            </a:endParaRPr>
-          </a:p>
-        </p:txBody>
-      </p:sp>
-      <p:sp>
-        <p:nvSpPr>
-          <p:cNvPr id="20" name="ZoneTexte 19"/>
-          <p:cNvSpPr txBox="1"/>
-          <p:nvPr/>
-        </p:nvSpPr>
-        <p:spPr>
-          <a:xfrm>
-            <a:off x="5486400" y="258463"/>
-            <a:ext cx="1828800" cy="261610"/>
-          </a:xfrm>
-          <a:prstGeom prst="rect">
-            <a:avLst/>
-          </a:prstGeom>
-          <a:solidFill>
-            <a:srgbClr val="ECF0F1"/>
-          </a:solidFill>
-        </p:spPr>
-        <p:txBody>
-          <a:bodyPr wrap="square" rtlCol="0">
-            <a:spAutoFit/>
-          </a:bodyPr>
-          <a:lstStyle/>
-          <a:p>
-            <a:pPr algn="ctr"/>
-            <a:r>
-              <a:rPr lang="en-US" sz="1100" i="1" dirty="0" smtClean="0">
-                <a:solidFill>
-                  <a:srgbClr val="95A5A6"/>
-                </a:solidFill>
-                <a:latin typeface="Roboto Light" panose="02000000000000000000" pitchFamily="2" charset="0"/>
-                <a:ea typeface="Roboto Light" panose="02000000000000000000" pitchFamily="2" charset="0"/>
-              </a:rPr>
-              <a:t>Software</a:t>
-            </a:r>
-            <a:endParaRPr lang="en-US" sz="1100" i="1" dirty="0">
-              <a:solidFill>
-                <a:srgbClr val="95A5A6"/>
-              </a:solidFill>
-              <a:latin typeface="Roboto Light" panose="02000000000000000000" pitchFamily="2" charset="0"/>
-              <a:ea typeface="Roboto Light" panose="02000000000000000000" pitchFamily="2" charset="0"/>
-            </a:endParaRPr>
-          </a:p>
-        </p:txBody>
-      </p:sp>
-      <p:sp>
-        <p:nvSpPr>
-          <p:cNvPr id="21" name="ZoneTexte 20"/>
-          <p:cNvSpPr txBox="1"/>
-          <p:nvPr/>
-        </p:nvSpPr>
-        <p:spPr>
-          <a:xfrm>
-            <a:off x="7315200" y="258463"/>
-            <a:ext cx="1828800" cy="261610"/>
-          </a:xfrm>
-          <a:prstGeom prst="rect">
-            <a:avLst/>
-          </a:prstGeom>
-          <a:solidFill>
-            <a:srgbClr val="ECF0F1"/>
-          </a:solidFill>
-        </p:spPr>
-        <p:txBody>
-          <a:bodyPr wrap="square" rtlCol="0">
-            <a:spAutoFit/>
-          </a:bodyPr>
-          <a:lstStyle/>
-          <a:p>
-            <a:pPr algn="ctr"/>
-            <a:r>
-              <a:rPr lang="en-US" sz="1100" i="1" dirty="0" smtClean="0">
-                <a:solidFill>
-                  <a:srgbClr val="95A5A6"/>
-                </a:solidFill>
-                <a:latin typeface="Roboto Light" panose="02000000000000000000" pitchFamily="2" charset="0"/>
-                <a:ea typeface="Roboto Light" panose="02000000000000000000" pitchFamily="2" charset="0"/>
-              </a:rPr>
-              <a:t>Conclusion</a:t>
-            </a:r>
-            <a:endParaRPr lang="en-US" sz="1100" i="1" dirty="0">
-              <a:solidFill>
-                <a:srgbClr val="95A5A6"/>
-              </a:solidFill>
-              <a:latin typeface="Roboto Light" panose="02000000000000000000" pitchFamily="2" charset="0"/>
-              <a:ea typeface="Roboto Light" panose="02000000000000000000" pitchFamily="2" charset="0"/>
-            </a:endParaRPr>
-          </a:p>
-        </p:txBody>
-      </p:sp>
-      <p:sp>
-        <p:nvSpPr>
-          <p:cNvPr id="22" name="Espace réservé du numéro de diapositive 3"/>
-          <p:cNvSpPr>
-            <a:spLocks noGrp="1"/>
-          </p:cNvSpPr>
-          <p:nvPr>
-            <p:ph type="sldNum" sz="quarter" idx="12"/>
-          </p:nvPr>
-        </p:nvSpPr>
-        <p:spPr>
-          <a:xfrm>
-            <a:off x="8532813" y="6420123"/>
-            <a:ext cx="611187" cy="365125"/>
-          </a:xfrm>
-        </p:spPr>
-        <p:txBody>
-          <a:bodyPr/>
-          <a:lstStyle/>
-          <a:p>
-            <a:pPr algn="ctr"/>
-            <a:r>
-              <a:rPr lang="en-US" sz="1100" dirty="0" smtClean="0">
-                <a:solidFill>
-                  <a:srgbClr val="7F8C8D"/>
-                </a:solidFill>
-              </a:rPr>
-              <a:t>5</a:t>
-            </a:r>
-            <a:endParaRPr lang="en-US" sz="1100" dirty="0">
-              <a:solidFill>
-                <a:srgbClr val="7F8C8D"/>
-              </a:solidFill>
-            </a:endParaRPr>
-          </a:p>
-        </p:txBody>
-      </p:sp>
-      <p:cxnSp>
-        <p:nvCxnSpPr>
-          <p:cNvPr id="23" name="Connecteur droit 22"/>
-          <p:cNvCxnSpPr/>
-          <p:nvPr/>
-        </p:nvCxnSpPr>
-        <p:spPr>
-          <a:xfrm flipH="1" flipV="1">
-            <a:off x="8521927" y="6318000"/>
-            <a:ext cx="0" cy="540000"/>
-          </a:xfrm>
-          <a:prstGeom prst="line">
-            <a:avLst/>
-          </a:prstGeom>
-          <a:ln w="28575">
-            <a:solidFill>
-              <a:srgbClr val="7F8C8D"/>
-            </a:solidFill>
-          </a:ln>
-        </p:spPr>
-        <p:style>
-          <a:lnRef idx="1">
-            <a:schemeClr val="dk1"/>
-          </a:lnRef>
-          <a:fillRef idx="0">
-            <a:schemeClr val="dk1"/>
-          </a:fillRef>
-          <a:effectRef idx="0">
-            <a:schemeClr val="dk1"/>
-          </a:effectRef>
-          <a:fontRef idx="minor">
-            <a:schemeClr val="tx1"/>
-          </a:fontRef>
-        </p:style>
-      </p:cxnSp>
-      <p:sp>
-        <p:nvSpPr>
-          <p:cNvPr id="24" name="ZoneTexte 23"/>
-          <p:cNvSpPr txBox="1"/>
-          <p:nvPr/>
-        </p:nvSpPr>
-        <p:spPr>
-          <a:xfrm>
-            <a:off x="4572000" y="6471881"/>
-            <a:ext cx="3893227" cy="261610"/>
-          </a:xfrm>
-          <a:prstGeom prst="rect">
-            <a:avLst/>
-          </a:prstGeom>
-          <a:noFill/>
-        </p:spPr>
-        <p:txBody>
-          <a:bodyPr wrap="square" rtlCol="0">
-            <a:spAutoFit/>
-          </a:bodyPr>
-          <a:lstStyle/>
-          <a:p>
-            <a:pPr algn="r"/>
-            <a:r>
-              <a:rPr lang="en-US" sz="1100" dirty="0" smtClean="0">
-                <a:solidFill>
-                  <a:srgbClr val="7F8C8D"/>
-                </a:solidFill>
-                <a:latin typeface="Roboto Medium" panose="02000000000000000000" pitchFamily="2" charset="0"/>
-                <a:ea typeface="Roboto Medium" panose="02000000000000000000" pitchFamily="2" charset="0"/>
-              </a:rPr>
-              <a:t>Outline</a:t>
-            </a:r>
-            <a:endParaRPr lang="en-US" sz="1100" dirty="0">
-              <a:solidFill>
-                <a:srgbClr val="7F8C8D"/>
-              </a:solidFill>
-              <a:latin typeface="Roboto" pitchFamily="2" charset="0"/>
-              <a:ea typeface="Roboto" pitchFamily="2" charset="0"/>
-            </a:endParaRPr>
-          </a:p>
-        </p:txBody>
-      </p:sp>
-      <p:sp>
-        <p:nvSpPr>
-          <p:cNvPr id="25" name="ZoneTexte 24"/>
-          <p:cNvSpPr txBox="1"/>
-          <p:nvPr/>
-        </p:nvSpPr>
-        <p:spPr>
-          <a:xfrm>
-            <a:off x="284615" y="6471880"/>
-            <a:ext cx="3893227" cy="261610"/>
-          </a:xfrm>
-          <a:prstGeom prst="rect">
-            <a:avLst/>
-          </a:prstGeom>
-          <a:noFill/>
-        </p:spPr>
-        <p:txBody>
-          <a:bodyPr wrap="square" rtlCol="0">
-            <a:spAutoFit/>
-          </a:bodyPr>
-          <a:lstStyle/>
-          <a:p>
-            <a:r>
-              <a:rPr lang="en-US" sz="1100" dirty="0" smtClean="0">
-                <a:solidFill>
-                  <a:srgbClr val="7F8C8D"/>
-                </a:solidFill>
-                <a:latin typeface="Roboto Light" panose="02000000000000000000" pitchFamily="2" charset="0"/>
-                <a:ea typeface="Roboto Light" panose="02000000000000000000" pitchFamily="2" charset="0"/>
-              </a:rPr>
-              <a:t>R. Vallat – Ph.D. Oral Defense – December 8</a:t>
-            </a:r>
-            <a:r>
-              <a:rPr lang="en-US" sz="1100" baseline="30000" dirty="0" smtClean="0">
-                <a:solidFill>
-                  <a:srgbClr val="7F8C8D"/>
-                </a:solidFill>
-                <a:latin typeface="Roboto Light" panose="02000000000000000000" pitchFamily="2" charset="0"/>
-                <a:ea typeface="Roboto Light" panose="02000000000000000000" pitchFamily="2" charset="0"/>
-              </a:rPr>
-              <a:t>th</a:t>
-            </a:r>
-            <a:r>
-              <a:rPr lang="en-US" sz="1100" dirty="0" smtClean="0">
-                <a:solidFill>
-                  <a:srgbClr val="7F8C8D"/>
-                </a:solidFill>
-                <a:latin typeface="Roboto Light" panose="02000000000000000000" pitchFamily="2" charset="0"/>
-                <a:ea typeface="Roboto Light" panose="02000000000000000000" pitchFamily="2" charset="0"/>
-              </a:rPr>
-              <a:t> 2017</a:t>
-            </a:r>
-            <a:endParaRPr lang="en-US" sz="1100" dirty="0">
-              <a:solidFill>
-                <a:srgbClr val="7F8C8D"/>
-              </a:solidFill>
-              <a:latin typeface="Roboto Light" panose="02000000000000000000" pitchFamily="2" charset="0"/>
-              <a:ea typeface="Roboto Light" panose="02000000000000000000" pitchFamily="2" charset="0"/>
-            </a:endParaRPr>
-          </a:p>
-        </p:txBody>
-      </p:sp>
-    </p:spTree>
-    <p:extLst>
-      <p:ext uri="{BB962C8B-B14F-4D97-AF65-F5344CB8AC3E}">
-        <p14:creationId xmlns:p14="http://schemas.microsoft.com/office/powerpoint/2010/main" val="1937816580"/>
       </p:ext>
     </p:extLst>
   </p:cSld>

</xml_diff>